<commit_message>
Updated Polycube overall architecture image
Typos
</commit_message>
<xml_diff>
--- a/Documentation/images/polycube-archi.pptx
+++ b/Documentation/images/polycube-archi.pptx
@@ -5,10 +5,11 @@
     <p:sldMasterId id="2147483648" r:id="rId1"/>
   </p:sldMasterIdLst>
   <p:notesMasterIdLst>
-    <p:notesMasterId r:id="rId3"/>
+    <p:notesMasterId r:id="rId4"/>
   </p:notesMasterIdLst>
   <p:sldIdLst>
-    <p:sldId id="267" r:id="rId2"/>
+    <p:sldId id="268" r:id="rId2"/>
+    <p:sldId id="267" r:id="rId3"/>
   </p:sldIdLst>
   <p:sldSz cx="12192000" cy="6858000"/>
   <p:notesSz cx="6858000" cy="9144000"/>
@@ -197,7 +198,7 @@
           <a:p>
             <a:fld id="{4606F443-0E21-7A4F-BBD0-4AAABE182CF0}" type="datetimeFigureOut">
               <a:rPr lang="en-GB" smtClean="0"/>
-              <a:t>23/10/2018</a:t>
+              <a:t>27/06/2019</a:t>
             </a:fld>
             <a:endParaRPr lang="en-GB"/>
           </a:p>
@@ -459,6 +460,156 @@
       </p:grpSpPr>
       <p:sp>
         <p:nvSpPr>
+          <p:cNvPr id="2" name="Slide Image Placeholder 1"/>
+          <p:cNvSpPr>
+            <a:spLocks noGrp="1" noRot="1" noChangeAspect="1"/>
+          </p:cNvSpPr>
+          <p:nvPr>
+            <p:ph type="sldImg"/>
+          </p:nvPr>
+        </p:nvSpPr>
+        <p:spPr/>
+      </p:sp>
+      <p:sp>
+        <p:nvSpPr>
+          <p:cNvPr id="3" name="Notes Placeholder 2"/>
+          <p:cNvSpPr>
+            <a:spLocks noGrp="1"/>
+          </p:cNvSpPr>
+          <p:nvPr>
+            <p:ph type="body" idx="1"/>
+          </p:nvPr>
+        </p:nvSpPr>
+        <p:spPr/>
+        <p:txBody>
+          <a:bodyPr/>
+          <a:lstStyle/>
+          <a:p>
+            <a:r>
+              <a:rPr lang="en-US" dirty="0" smtClean="0"/>
+              <a:t>Copy the image</a:t>
+            </a:r>
+          </a:p>
+          <a:p>
+            <a:pPr marL="171450" indent="-171450">
+              <a:buFontTx/>
+              <a:buChar char="-"/>
+            </a:pPr>
+            <a:r>
+              <a:rPr lang="en-US" dirty="0" smtClean="0"/>
+              <a:t>Group</a:t>
+            </a:r>
+          </a:p>
+          <a:p>
+            <a:pPr marL="171450" indent="-171450">
+              <a:buFontTx/>
+              <a:buChar char="-"/>
+            </a:pPr>
+            <a:r>
+              <a:rPr lang="en-US" dirty="0" smtClean="0"/>
+              <a:t>Change size (lock aspect ratio)</a:t>
+            </a:r>
+          </a:p>
+          <a:p>
+            <a:pPr marL="171450" indent="-171450">
+              <a:buFontTx/>
+              <a:buChar char="-"/>
+            </a:pPr>
+            <a:r>
+              <a:rPr lang="en-US" dirty="0" smtClean="0"/>
+              <a:t>Resize</a:t>
+            </a:r>
+            <a:r>
+              <a:rPr lang="en-US" baseline="0" dirty="0" smtClean="0"/>
+              <a:t> at about 60% of the previous side</a:t>
+            </a:r>
+          </a:p>
+          <a:p>
+            <a:pPr marL="171450" indent="-171450">
+              <a:buFontTx/>
+              <a:buChar char="-"/>
+            </a:pPr>
+            <a:r>
+              <a:rPr lang="en-US" baseline="0" dirty="0" smtClean="0"/>
+              <a:t>Reduce the font 4 times</a:t>
+            </a:r>
+          </a:p>
+          <a:p>
+            <a:pPr marL="171450" indent="-171450">
+              <a:buFontTx/>
+              <a:buChar char="-"/>
+            </a:pPr>
+            <a:r>
+              <a:rPr lang="en-US" baseline="0" dirty="0" smtClean="0"/>
+              <a:t>Save as </a:t>
+            </a:r>
+            <a:r>
+              <a:rPr lang="en-US" baseline="0" dirty="0" smtClean="0"/>
+              <a:t>PNG</a:t>
+            </a:r>
+            <a:r>
+              <a:rPr lang="en-US" baseline="0" smtClean="0"/>
+              <a:t>: polycube-archi.png</a:t>
+            </a:r>
+            <a:endParaRPr lang="en-US" dirty="0"/>
+          </a:p>
+        </p:txBody>
+      </p:sp>
+      <p:sp>
+        <p:nvSpPr>
+          <p:cNvPr id="4" name="Slide Number Placeholder 3"/>
+          <p:cNvSpPr>
+            <a:spLocks noGrp="1"/>
+          </p:cNvSpPr>
+          <p:nvPr>
+            <p:ph type="sldNum" sz="quarter" idx="10"/>
+          </p:nvPr>
+        </p:nvSpPr>
+        <p:spPr/>
+        <p:txBody>
+          <a:bodyPr/>
+          <a:lstStyle/>
+          <a:p>
+            <a:fld id="{C2FBB739-7834-4ECF-B946-1A6CA4013951}" type="slidenum">
+              <a:rPr lang="en-US" smtClean="0"/>
+              <a:t>1</a:t>
+            </a:fld>
+            <a:endParaRPr lang="en-US"/>
+          </a:p>
+        </p:txBody>
+      </p:sp>
+    </p:spTree>
+    <p:extLst>
+      <p:ext uri="{BB962C8B-B14F-4D97-AF65-F5344CB8AC3E}">
+        <p14:creationId xmlns:p14="http://schemas.microsoft.com/office/powerpoint/2010/main" val="2640631607"/>
+      </p:ext>
+    </p:extLst>
+  </p:cSld>
+  <p:clrMapOvr>
+    <a:masterClrMapping/>
+  </p:clrMapOvr>
+</p:notes>
+</file>
+
+<file path=ppt/notesSlides/notesSlide2.xml><?xml version="1.0" encoding="utf-8"?>
+<p:notes xmlns:a="http://schemas.openxmlformats.org/drawingml/2006/main" xmlns:r="http://schemas.openxmlformats.org/officeDocument/2006/relationships" xmlns:p="http://schemas.openxmlformats.org/presentationml/2006/main">
+  <p:cSld>
+    <p:spTree>
+      <p:nvGrpSpPr>
+        <p:cNvPr id="1" name=""/>
+        <p:cNvGrpSpPr/>
+        <p:nvPr/>
+      </p:nvGrpSpPr>
+      <p:grpSpPr>
+        <a:xfrm>
+          <a:off x="0" y="0"/>
+          <a:ext cx="0" cy="0"/>
+          <a:chOff x="0" y="0"/>
+          <a:chExt cx="0" cy="0"/>
+        </a:xfrm>
+      </p:grpSpPr>
+      <p:sp>
+        <p:nvSpPr>
           <p:cNvPr id="2" name="Segnaposto immagine diapositiva 1"/>
           <p:cNvSpPr>
             <a:spLocks noGrp="1" noRot="1" noChangeAspect="1"/>
@@ -484,6 +635,10 @@
           <a:bodyPr/>
           <a:lstStyle/>
           <a:p>
+            <a:r>
+              <a:rPr lang="en-GB" dirty="0" smtClean="0"/>
+              <a:t>Old picture</a:t>
+            </a:r>
             <a:endParaRPr lang="en-GB" dirty="0"/>
           </a:p>
         </p:txBody>
@@ -505,7 +660,7 @@
           <a:p>
             <a:fld id="{217F19BC-BC2F-1246-91D4-A01AE0BBC45D}" type="slidenum">
               <a:rPr lang="en-GB" smtClean="0"/>
-              <a:t>1</a:t>
+              <a:t>2</a:t>
             </a:fld>
             <a:endParaRPr lang="en-GB"/>
           </a:p>
@@ -673,7 +828,7 @@
           <a:p>
             <a:fld id="{2BA99DCC-A947-414E-960D-6BB4D9D6059E}" type="datetimeFigureOut">
               <a:rPr lang="en-GB" smtClean="0"/>
-              <a:t>23/10/2018</a:t>
+              <a:t>27/06/2019</a:t>
             </a:fld>
             <a:endParaRPr lang="en-GB"/>
           </a:p>
@@ -848,7 +1003,7 @@
           <a:p>
             <a:fld id="{2BA99DCC-A947-414E-960D-6BB4D9D6059E}" type="datetimeFigureOut">
               <a:rPr lang="en-GB" smtClean="0"/>
-              <a:t>23/10/2018</a:t>
+              <a:t>27/06/2019</a:t>
             </a:fld>
             <a:endParaRPr lang="en-GB"/>
           </a:p>
@@ -1033,7 +1188,7 @@
           <a:p>
             <a:fld id="{2BA99DCC-A947-414E-960D-6BB4D9D6059E}" type="datetimeFigureOut">
               <a:rPr lang="en-GB" smtClean="0"/>
-              <a:t>23/10/2018</a:t>
+              <a:t>27/06/2019</a:t>
             </a:fld>
             <a:endParaRPr lang="en-GB"/>
           </a:p>
@@ -1208,7 +1363,7 @@
           <a:p>
             <a:fld id="{2BA99DCC-A947-414E-960D-6BB4D9D6059E}" type="datetimeFigureOut">
               <a:rPr lang="en-GB" smtClean="0"/>
-              <a:t>23/10/2018</a:t>
+              <a:t>27/06/2019</a:t>
             </a:fld>
             <a:endParaRPr lang="en-GB"/>
           </a:p>
@@ -1488,7 +1643,7 @@
           <a:p>
             <a:fld id="{2BA99DCC-A947-414E-960D-6BB4D9D6059E}" type="datetimeFigureOut">
               <a:rPr lang="en-GB" smtClean="0"/>
-              <a:t>23/10/2018</a:t>
+              <a:t>27/06/2019</a:t>
             </a:fld>
             <a:endParaRPr lang="en-GB"/>
           </a:p>
@@ -1706,7 +1861,7 @@
           <a:p>
             <a:fld id="{2BA99DCC-A947-414E-960D-6BB4D9D6059E}" type="datetimeFigureOut">
               <a:rPr lang="en-GB" smtClean="0"/>
-              <a:t>23/10/2018</a:t>
+              <a:t>27/06/2019</a:t>
             </a:fld>
             <a:endParaRPr lang="en-GB"/>
           </a:p>
@@ -2079,7 +2234,7 @@
           <a:p>
             <a:fld id="{2BA99DCC-A947-414E-960D-6BB4D9D6059E}" type="datetimeFigureOut">
               <a:rPr lang="en-GB" smtClean="0"/>
-              <a:t>23/10/2018</a:t>
+              <a:t>27/06/2019</a:t>
             </a:fld>
             <a:endParaRPr lang="en-GB"/>
           </a:p>
@@ -2221,7 +2376,7 @@
           <a:p>
             <a:fld id="{2BA99DCC-A947-414E-960D-6BB4D9D6059E}" type="datetimeFigureOut">
               <a:rPr lang="en-GB" smtClean="0"/>
-              <a:t>23/10/2018</a:t>
+              <a:t>27/06/2019</a:t>
             </a:fld>
             <a:endParaRPr lang="en-GB"/>
           </a:p>
@@ -2334,7 +2489,7 @@
           <a:p>
             <a:fld id="{2BA99DCC-A947-414E-960D-6BB4D9D6059E}" type="datetimeFigureOut">
               <a:rPr lang="en-GB" smtClean="0"/>
-              <a:t>23/10/2018</a:t>
+              <a:t>27/06/2019</a:t>
             </a:fld>
             <a:endParaRPr lang="en-GB"/>
           </a:p>
@@ -2626,7 +2781,7 @@
           <a:p>
             <a:fld id="{2BA99DCC-A947-414E-960D-6BB4D9D6059E}" type="datetimeFigureOut">
               <a:rPr lang="en-GB" smtClean="0"/>
-              <a:t>23/10/2018</a:t>
+              <a:t>27/06/2019</a:t>
             </a:fld>
             <a:endParaRPr lang="en-GB"/>
           </a:p>
@@ -2919,7 +3074,7 @@
           <a:p>
             <a:fld id="{2BA99DCC-A947-414E-960D-6BB4D9D6059E}" type="datetimeFigureOut">
               <a:rPr lang="en-GB" smtClean="0"/>
-              <a:t>23/10/2018</a:t>
+              <a:t>27/06/2019</a:t>
             </a:fld>
             <a:endParaRPr lang="en-GB"/>
           </a:p>
@@ -3137,7 +3292,7 @@
           <a:p>
             <a:fld id="{2BA99DCC-A947-414E-960D-6BB4D9D6059E}" type="datetimeFigureOut">
               <a:rPr lang="en-GB" smtClean="0"/>
-              <a:t>23/10/2018</a:t>
+              <a:t>27/06/2019</a:t>
             </a:fld>
             <a:endParaRPr lang="en-GB"/>
           </a:p>
@@ -3538,6 +3693,4252 @@
 </file>
 
 <file path=ppt/slides/slide1.xml><?xml version="1.0" encoding="utf-8"?>
+<p:sld xmlns:a="http://schemas.openxmlformats.org/drawingml/2006/main" xmlns:r="http://schemas.openxmlformats.org/officeDocument/2006/relationships" xmlns:p="http://schemas.openxmlformats.org/presentationml/2006/main">
+  <p:cSld>
+    <p:spTree>
+      <p:nvGrpSpPr>
+        <p:cNvPr id="1" name=""/>
+        <p:cNvGrpSpPr/>
+        <p:nvPr/>
+      </p:nvGrpSpPr>
+      <p:grpSpPr>
+        <a:xfrm>
+          <a:off x="0" y="0"/>
+          <a:ext cx="0" cy="0"/>
+          <a:chOff x="0" y="0"/>
+          <a:chExt cx="0" cy="0"/>
+        </a:xfrm>
+      </p:grpSpPr>
+      <p:sp>
+        <p:nvSpPr>
+          <p:cNvPr id="4" name="Rettangolo arrotondato 29">
+            <a:extLst>
+              <a:ext uri="{FF2B5EF4-FFF2-40B4-BE49-F238E27FC236}">
+                <a16:creationId xmlns:a16="http://schemas.microsoft.com/office/drawing/2014/main" id="{2007C69B-7EA2-1445-BF19-1AF93AF7BCA4}"/>
+              </a:ext>
+            </a:extLst>
+          </p:cNvPr>
+          <p:cNvSpPr/>
+          <p:nvPr/>
+        </p:nvSpPr>
+        <p:spPr>
+          <a:xfrm>
+            <a:off x="1061050" y="2432708"/>
+            <a:ext cx="4421678" cy="1176136"/>
+          </a:xfrm>
+          <a:prstGeom prst="roundRect">
+            <a:avLst/>
+          </a:prstGeom>
+          <a:solidFill>
+            <a:srgbClr val="CCFFFF"/>
+          </a:solidFill>
+          <a:ln w="12700" cap="flat" cmpd="sng" algn="ctr">
+            <a:solidFill>
+              <a:schemeClr val="accent5">
+                <a:lumMod val="60000"/>
+                <a:lumOff val="40000"/>
+              </a:schemeClr>
+            </a:solidFill>
+            <a:prstDash val="solid"/>
+            <a:miter lim="800000"/>
+          </a:ln>
+          <a:effectLst/>
+        </p:spPr>
+        <p:txBody>
+          <a:bodyPr lIns="0" tIns="0" rIns="0" bIns="0" rtlCol="0" anchor="ctr"/>
+          <a:lstStyle/>
+          <a:p>
+            <a:pPr marL="0" marR="0" lvl="0" indent="0" algn="ctr" defTabSz="914400" eaLnBrk="1" fontAlgn="auto" latinLnBrk="0" hangingPunct="1">
+              <a:lnSpc>
+                <a:spcPct val="100000"/>
+              </a:lnSpc>
+              <a:spcBef>
+                <a:spcPts val="0"/>
+              </a:spcBef>
+              <a:spcAft>
+                <a:spcPts val="0"/>
+              </a:spcAft>
+              <a:buClrTx/>
+              <a:buSzTx/>
+              <a:buFontTx/>
+              <a:buNone/>
+              <a:tabLst/>
+              <a:defRPr/>
+            </a:pPr>
+            <a:endParaRPr kumimoji="0" lang="en-GB" sz="1600" i="0" u="none" strike="noStrike" kern="0" cap="none" spc="0" normalizeH="0" baseline="0" noProof="0" dirty="0">
+              <a:ln>
+                <a:noFill/>
+              </a:ln>
+              <a:solidFill>
+                <a:prstClr val="black"/>
+              </a:solidFill>
+              <a:effectLst/>
+              <a:uLnTx/>
+              <a:uFillTx/>
+              <a:latin typeface="Calibri" panose="020F0502020204030204" pitchFamily="34" charset="0"/>
+              <a:cs typeface="Calibri" panose="020F0502020204030204" pitchFamily="34" charset="0"/>
+            </a:endParaRPr>
+          </a:p>
+          <a:p>
+            <a:pPr marL="0" marR="0" lvl="0" indent="0" algn="ctr" defTabSz="914400" eaLnBrk="1" fontAlgn="auto" latinLnBrk="0" hangingPunct="1">
+              <a:lnSpc>
+                <a:spcPct val="100000"/>
+              </a:lnSpc>
+              <a:spcBef>
+                <a:spcPts val="0"/>
+              </a:spcBef>
+              <a:spcAft>
+                <a:spcPts val="0"/>
+              </a:spcAft>
+              <a:buClrTx/>
+              <a:buSzTx/>
+              <a:buFontTx/>
+              <a:buNone/>
+              <a:tabLst/>
+              <a:defRPr/>
+            </a:pPr>
+            <a:endParaRPr kumimoji="0" lang="en-GB" sz="1600" i="0" u="none" strike="noStrike" kern="0" cap="none" spc="0" normalizeH="0" baseline="0" noProof="0" dirty="0">
+              <a:ln>
+                <a:noFill/>
+              </a:ln>
+              <a:solidFill>
+                <a:prstClr val="black"/>
+              </a:solidFill>
+              <a:effectLst/>
+              <a:uLnTx/>
+              <a:uFillTx/>
+              <a:latin typeface="Calibri" panose="020F0502020204030204" pitchFamily="34" charset="0"/>
+              <a:cs typeface="Calibri" panose="020F0502020204030204" pitchFamily="34" charset="0"/>
+            </a:endParaRPr>
+          </a:p>
+          <a:p>
+            <a:pPr marL="0" marR="0" lvl="0" indent="0" algn="ctr" defTabSz="914400" eaLnBrk="1" fontAlgn="auto" latinLnBrk="0" hangingPunct="1">
+              <a:lnSpc>
+                <a:spcPct val="100000"/>
+              </a:lnSpc>
+              <a:spcBef>
+                <a:spcPts val="0"/>
+              </a:spcBef>
+              <a:spcAft>
+                <a:spcPts val="0"/>
+              </a:spcAft>
+              <a:buClrTx/>
+              <a:buSzTx/>
+              <a:buFontTx/>
+              <a:buNone/>
+              <a:tabLst/>
+              <a:defRPr/>
+            </a:pPr>
+            <a:endParaRPr kumimoji="0" lang="en-GB" sz="1600" i="0" u="none" strike="noStrike" kern="0" cap="none" spc="0" normalizeH="0" baseline="0" noProof="0" dirty="0">
+              <a:ln>
+                <a:noFill/>
+              </a:ln>
+              <a:solidFill>
+                <a:prstClr val="black"/>
+              </a:solidFill>
+              <a:effectLst/>
+              <a:uLnTx/>
+              <a:uFillTx/>
+              <a:latin typeface="Calibri" panose="020F0502020204030204" pitchFamily="34" charset="0"/>
+              <a:cs typeface="Calibri" panose="020F0502020204030204" pitchFamily="34" charset="0"/>
+            </a:endParaRPr>
+          </a:p>
+        </p:txBody>
+      </p:sp>
+      <p:sp>
+        <p:nvSpPr>
+          <p:cNvPr id="5" name="Rettangolo arrotondato 41">
+            <a:extLst>
+              <a:ext uri="{FF2B5EF4-FFF2-40B4-BE49-F238E27FC236}">
+                <a16:creationId xmlns:a16="http://schemas.microsoft.com/office/drawing/2014/main" id="{B9B53821-8AB7-C04C-83C4-8240C4ED65D2}"/>
+              </a:ext>
+            </a:extLst>
+          </p:cNvPr>
+          <p:cNvSpPr/>
+          <p:nvPr/>
+        </p:nvSpPr>
+        <p:spPr>
+          <a:xfrm>
+            <a:off x="2962778" y="732506"/>
+            <a:ext cx="2395546" cy="963558"/>
+          </a:xfrm>
+          <a:prstGeom prst="roundRect">
+            <a:avLst/>
+          </a:prstGeom>
+          <a:solidFill>
+            <a:srgbClr val="FFDB93"/>
+          </a:solidFill>
+          <a:ln w="12700" cap="flat" cmpd="sng" algn="ctr">
+            <a:solidFill>
+              <a:schemeClr val="accent4">
+                <a:lumMod val="75000"/>
+              </a:schemeClr>
+            </a:solidFill>
+            <a:prstDash val="solid"/>
+            <a:miter lim="800000"/>
+          </a:ln>
+          <a:effectLst/>
+        </p:spPr>
+        <p:txBody>
+          <a:bodyPr lIns="0" tIns="0" rIns="0" bIns="0" rtlCol="0" anchor="ctr"/>
+          <a:lstStyle/>
+          <a:p>
+            <a:pPr algn="ctr"/>
+            <a:endParaRPr lang="en-GB" sz="1600" kern="0" dirty="0">
+              <a:solidFill>
+                <a:prstClr val="black"/>
+              </a:solidFill>
+              <a:latin typeface="Calibri" panose="020F0502020204030204" pitchFamily="34" charset="0"/>
+              <a:cs typeface="Calibri" panose="020F0502020204030204" pitchFamily="34" charset="0"/>
+            </a:endParaRPr>
+          </a:p>
+        </p:txBody>
+      </p:sp>
+      <p:sp>
+        <p:nvSpPr>
+          <p:cNvPr id="6" name="Rettangolo arrotondato 13">
+            <a:extLst>
+              <a:ext uri="{FF2B5EF4-FFF2-40B4-BE49-F238E27FC236}">
+                <a16:creationId xmlns:a16="http://schemas.microsoft.com/office/drawing/2014/main" id="{32CE114C-0B20-304A-88FA-FB974438FFBD}"/>
+              </a:ext>
+            </a:extLst>
+          </p:cNvPr>
+          <p:cNvSpPr/>
+          <p:nvPr/>
+        </p:nvSpPr>
+        <p:spPr>
+          <a:xfrm>
+            <a:off x="2250769" y="3075220"/>
+            <a:ext cx="739857" cy="360000"/>
+          </a:xfrm>
+          <a:prstGeom prst="roundRect">
+            <a:avLst/>
+          </a:prstGeom>
+          <a:solidFill>
+            <a:srgbClr val="CCFFFF"/>
+          </a:solidFill>
+          <a:ln w="12700" cap="flat" cmpd="sng" algn="ctr">
+            <a:solidFill>
+              <a:schemeClr val="accent5">
+                <a:lumMod val="60000"/>
+                <a:lumOff val="40000"/>
+              </a:schemeClr>
+            </a:solidFill>
+            <a:prstDash val="solid"/>
+            <a:round/>
+            <a:headEnd type="none" w="med" len="med"/>
+            <a:tailEnd type="none" w="med" len="med"/>
+          </a:ln>
+          <a:effectLst/>
+        </p:spPr>
+        <p:txBody>
+          <a:bodyPr lIns="0" tIns="0" rIns="0" bIns="0" rtlCol="0" anchor="ctr"/>
+          <a:lstStyle/>
+          <a:p>
+            <a:pPr marL="0" marR="0" lvl="0" indent="0" algn="ctr" defTabSz="914400" eaLnBrk="1" fontAlgn="auto" latinLnBrk="0" hangingPunct="1">
+              <a:lnSpc>
+                <a:spcPct val="100000"/>
+              </a:lnSpc>
+              <a:spcBef>
+                <a:spcPts val="0"/>
+              </a:spcBef>
+              <a:spcAft>
+                <a:spcPts val="0"/>
+              </a:spcAft>
+              <a:buClrTx/>
+              <a:buSzTx/>
+              <a:buFontTx/>
+              <a:buNone/>
+              <a:tabLst/>
+              <a:defRPr/>
+            </a:pPr>
+            <a:r>
+              <a:rPr kumimoji="0" lang="en-GB" sz="1400" i="0" u="none" strike="noStrike" kern="0" cap="none" spc="0" normalizeH="0" baseline="0" noProof="0" dirty="0">
+                <a:ln>
+                  <a:noFill/>
+                </a:ln>
+                <a:solidFill>
+                  <a:prstClr val="black"/>
+                </a:solidFill>
+                <a:effectLst/>
+                <a:uLnTx/>
+                <a:uFillTx/>
+                <a:latin typeface="Calibri" panose="020F0502020204030204" pitchFamily="34" charset="0"/>
+                <a:cs typeface="Calibri" panose="020F0502020204030204" pitchFamily="34" charset="0"/>
+              </a:rPr>
+              <a:t>Bridge</a:t>
+            </a:r>
+          </a:p>
+        </p:txBody>
+      </p:sp>
+      <p:sp>
+        <p:nvSpPr>
+          <p:cNvPr id="7" name="Rettangolo arrotondato 15">
+            <a:extLst>
+              <a:ext uri="{FF2B5EF4-FFF2-40B4-BE49-F238E27FC236}">
+                <a16:creationId xmlns:a16="http://schemas.microsoft.com/office/drawing/2014/main" id="{E755A4E8-0EDC-2E4F-8522-1841DED670D7}"/>
+              </a:ext>
+            </a:extLst>
+          </p:cNvPr>
+          <p:cNvSpPr/>
+          <p:nvPr/>
+        </p:nvSpPr>
+        <p:spPr>
+          <a:xfrm>
+            <a:off x="1373916" y="2571915"/>
+            <a:ext cx="896309" cy="360000"/>
+          </a:xfrm>
+          <a:prstGeom prst="roundRect">
+            <a:avLst/>
+          </a:prstGeom>
+          <a:solidFill>
+            <a:srgbClr val="CCFFFF"/>
+          </a:solidFill>
+          <a:ln w="12700" cap="flat" cmpd="sng" algn="ctr">
+            <a:solidFill>
+              <a:schemeClr val="accent5">
+                <a:lumMod val="60000"/>
+                <a:lumOff val="40000"/>
+              </a:schemeClr>
+            </a:solidFill>
+            <a:prstDash val="solid"/>
+            <a:round/>
+            <a:headEnd type="none" w="med" len="med"/>
+            <a:tailEnd type="none" w="med" len="med"/>
+          </a:ln>
+          <a:effectLst/>
+        </p:spPr>
+        <p:txBody>
+          <a:bodyPr lIns="0" tIns="0" rIns="0" bIns="0" rtlCol="0" anchor="ctr"/>
+          <a:lstStyle/>
+          <a:p>
+            <a:pPr marL="0" marR="0" lvl="0" indent="0" algn="ctr" defTabSz="914400" eaLnBrk="1" fontAlgn="auto" latinLnBrk="0" hangingPunct="1">
+              <a:lnSpc>
+                <a:spcPct val="100000"/>
+              </a:lnSpc>
+              <a:spcBef>
+                <a:spcPts val="0"/>
+              </a:spcBef>
+              <a:spcAft>
+                <a:spcPts val="0"/>
+              </a:spcAft>
+              <a:buClrTx/>
+              <a:buSzTx/>
+              <a:buFontTx/>
+              <a:buNone/>
+              <a:tabLst/>
+              <a:defRPr/>
+            </a:pPr>
+            <a:r>
+              <a:rPr kumimoji="0" lang="en-GB" sz="1400" i="0" u="none" strike="noStrike" kern="0" cap="none" spc="0" normalizeH="0" baseline="0" noProof="0" dirty="0">
+                <a:ln>
+                  <a:noFill/>
+                </a:ln>
+                <a:solidFill>
+                  <a:prstClr val="black"/>
+                </a:solidFill>
+                <a:effectLst/>
+                <a:uLnTx/>
+                <a:uFillTx/>
+                <a:latin typeface="Calibri" panose="020F0502020204030204" pitchFamily="34" charset="0"/>
+                <a:cs typeface="Calibri" panose="020F0502020204030204" pitchFamily="34" charset="0"/>
+              </a:rPr>
+              <a:t>Router</a:t>
+            </a:r>
+          </a:p>
+        </p:txBody>
+      </p:sp>
+      <p:sp>
+        <p:nvSpPr>
+          <p:cNvPr id="8" name="Rettangolo arrotondato 16">
+            <a:extLst>
+              <a:ext uri="{FF2B5EF4-FFF2-40B4-BE49-F238E27FC236}">
+                <a16:creationId xmlns:a16="http://schemas.microsoft.com/office/drawing/2014/main" id="{33758A28-DF5E-BC4F-B6CB-1D70B38F22AA}"/>
+              </a:ext>
+            </a:extLst>
+          </p:cNvPr>
+          <p:cNvSpPr/>
+          <p:nvPr/>
+        </p:nvSpPr>
+        <p:spPr>
+          <a:xfrm>
+            <a:off x="4082727" y="2571915"/>
+            <a:ext cx="612782" cy="360000"/>
+          </a:xfrm>
+          <a:prstGeom prst="roundRect">
+            <a:avLst/>
+          </a:prstGeom>
+          <a:solidFill>
+            <a:srgbClr val="CCFFFF"/>
+          </a:solidFill>
+          <a:ln w="12700" cap="flat" cmpd="sng" algn="ctr">
+            <a:solidFill>
+              <a:schemeClr val="accent5">
+                <a:lumMod val="60000"/>
+                <a:lumOff val="40000"/>
+              </a:schemeClr>
+            </a:solidFill>
+            <a:prstDash val="solid"/>
+            <a:round/>
+            <a:headEnd type="none" w="med" len="med"/>
+            <a:tailEnd type="none" w="med" len="med"/>
+          </a:ln>
+          <a:effectLst/>
+        </p:spPr>
+        <p:txBody>
+          <a:bodyPr lIns="0" tIns="0" rIns="0" bIns="0" rtlCol="0" anchor="ctr"/>
+          <a:lstStyle/>
+          <a:p>
+            <a:pPr marL="0" marR="0" lvl="0" indent="0" algn="ctr" defTabSz="914400" eaLnBrk="1" fontAlgn="auto" latinLnBrk="0" hangingPunct="1">
+              <a:lnSpc>
+                <a:spcPct val="100000"/>
+              </a:lnSpc>
+              <a:spcBef>
+                <a:spcPts val="0"/>
+              </a:spcBef>
+              <a:spcAft>
+                <a:spcPts val="0"/>
+              </a:spcAft>
+              <a:buClrTx/>
+              <a:buSzTx/>
+              <a:buFontTx/>
+              <a:buNone/>
+              <a:tabLst/>
+              <a:defRPr/>
+            </a:pPr>
+            <a:r>
+              <a:rPr kumimoji="0" lang="en-GB" sz="1400" i="0" u="none" strike="noStrike" kern="0" cap="none" spc="0" normalizeH="0" baseline="0" noProof="0" dirty="0" smtClean="0">
+                <a:ln>
+                  <a:noFill/>
+                </a:ln>
+                <a:solidFill>
+                  <a:prstClr val="black"/>
+                </a:solidFill>
+                <a:effectLst/>
+                <a:uLnTx/>
+                <a:uFillTx/>
+                <a:latin typeface="Calibri" panose="020F0502020204030204" pitchFamily="34" charset="0"/>
+                <a:cs typeface="Calibri" panose="020F0502020204030204" pitchFamily="34" charset="0"/>
+              </a:rPr>
+              <a:t>NAT</a:t>
+            </a:r>
+            <a:endParaRPr kumimoji="0" lang="en-GB" sz="1400" i="0" u="none" strike="noStrike" kern="0" cap="none" spc="0" normalizeH="0" baseline="0" noProof="0" dirty="0">
+              <a:ln>
+                <a:noFill/>
+              </a:ln>
+              <a:solidFill>
+                <a:prstClr val="black"/>
+              </a:solidFill>
+              <a:effectLst/>
+              <a:uLnTx/>
+              <a:uFillTx/>
+              <a:latin typeface="Calibri" panose="020F0502020204030204" pitchFamily="34" charset="0"/>
+              <a:cs typeface="Calibri" panose="020F0502020204030204" pitchFamily="34" charset="0"/>
+            </a:endParaRPr>
+          </a:p>
+        </p:txBody>
+      </p:sp>
+      <p:sp>
+        <p:nvSpPr>
+          <p:cNvPr id="9" name="Rettangolo arrotondato 17">
+            <a:extLst>
+              <a:ext uri="{FF2B5EF4-FFF2-40B4-BE49-F238E27FC236}">
+                <a16:creationId xmlns:a16="http://schemas.microsoft.com/office/drawing/2014/main" id="{5B58146D-E9D0-E043-88BB-5FAD27DF2B4A}"/>
+              </a:ext>
+            </a:extLst>
+          </p:cNvPr>
+          <p:cNvSpPr/>
+          <p:nvPr/>
+        </p:nvSpPr>
+        <p:spPr>
+          <a:xfrm>
+            <a:off x="3183631" y="3075220"/>
+            <a:ext cx="1476000" cy="360000"/>
+          </a:xfrm>
+          <a:prstGeom prst="roundRect">
+            <a:avLst/>
+          </a:prstGeom>
+          <a:solidFill>
+            <a:srgbClr val="CCFFFF"/>
+          </a:solidFill>
+          <a:ln w="12700" cap="flat" cmpd="sng" algn="ctr">
+            <a:solidFill>
+              <a:schemeClr val="accent5">
+                <a:lumMod val="60000"/>
+                <a:lumOff val="40000"/>
+              </a:schemeClr>
+            </a:solidFill>
+            <a:prstDash val="solid"/>
+            <a:round/>
+            <a:headEnd type="none" w="med" len="med"/>
+            <a:tailEnd type="none" w="med" len="med"/>
+          </a:ln>
+          <a:effectLst/>
+        </p:spPr>
+        <p:txBody>
+          <a:bodyPr lIns="0" tIns="0" rIns="0" bIns="0" rtlCol="0" anchor="ctr"/>
+          <a:lstStyle/>
+          <a:p>
+            <a:pPr marL="0" marR="0" lvl="0" indent="0" algn="ctr" defTabSz="914400" eaLnBrk="1" fontAlgn="auto" latinLnBrk="0" hangingPunct="1">
+              <a:lnSpc>
+                <a:spcPct val="100000"/>
+              </a:lnSpc>
+              <a:spcBef>
+                <a:spcPts val="0"/>
+              </a:spcBef>
+              <a:spcAft>
+                <a:spcPts val="0"/>
+              </a:spcAft>
+              <a:buClrTx/>
+              <a:buSzTx/>
+              <a:buFontTx/>
+              <a:buNone/>
+              <a:tabLst/>
+              <a:defRPr/>
+            </a:pPr>
+            <a:r>
+              <a:rPr kumimoji="0" lang="en-GB" sz="1400" i="0" u="none" strike="noStrike" kern="0" cap="none" spc="0" normalizeH="0" baseline="0" noProof="0" dirty="0">
+                <a:ln>
+                  <a:noFill/>
+                </a:ln>
+                <a:solidFill>
+                  <a:prstClr val="black"/>
+                </a:solidFill>
+                <a:effectLst/>
+                <a:uLnTx/>
+                <a:uFillTx/>
+                <a:latin typeface="Calibri" panose="020F0502020204030204" pitchFamily="34" charset="0"/>
+                <a:cs typeface="Calibri" panose="020F0502020204030204" pitchFamily="34" charset="0"/>
+              </a:rPr>
+              <a:t>DDoS </a:t>
+            </a:r>
+            <a:r>
+              <a:rPr kumimoji="0" lang="en-GB" sz="1400" i="0" u="none" strike="noStrike" kern="0" cap="none" spc="0" normalizeH="0" baseline="0" noProof="0" dirty="0" err="1">
+                <a:ln>
+                  <a:noFill/>
+                </a:ln>
+                <a:solidFill>
+                  <a:prstClr val="black"/>
+                </a:solidFill>
+                <a:effectLst/>
+                <a:uLnTx/>
+                <a:uFillTx/>
+                <a:latin typeface="Calibri" panose="020F0502020204030204" pitchFamily="34" charset="0"/>
+                <a:cs typeface="Calibri" panose="020F0502020204030204" pitchFamily="34" charset="0"/>
+              </a:rPr>
+              <a:t>Mitigator</a:t>
+            </a:r>
+            <a:endParaRPr kumimoji="0" lang="en-GB" sz="1400" i="0" u="none" strike="noStrike" kern="0" cap="none" spc="0" normalizeH="0" baseline="0" noProof="0" dirty="0">
+              <a:ln>
+                <a:noFill/>
+              </a:ln>
+              <a:solidFill>
+                <a:prstClr val="black"/>
+              </a:solidFill>
+              <a:effectLst/>
+              <a:uLnTx/>
+              <a:uFillTx/>
+              <a:latin typeface="Calibri" panose="020F0502020204030204" pitchFamily="34" charset="0"/>
+              <a:cs typeface="Calibri" panose="020F0502020204030204" pitchFamily="34" charset="0"/>
+            </a:endParaRPr>
+          </a:p>
+        </p:txBody>
+      </p:sp>
+      <p:sp>
+        <p:nvSpPr>
+          <p:cNvPr id="10" name="Rettangolo arrotondato 18">
+            <a:extLst>
+              <a:ext uri="{FF2B5EF4-FFF2-40B4-BE49-F238E27FC236}">
+                <a16:creationId xmlns:a16="http://schemas.microsoft.com/office/drawing/2014/main" id="{4931C160-BB41-E643-88D2-CCCE4511A3AC}"/>
+              </a:ext>
+            </a:extLst>
+          </p:cNvPr>
+          <p:cNvSpPr/>
+          <p:nvPr/>
+        </p:nvSpPr>
+        <p:spPr>
+          <a:xfrm>
+            <a:off x="2499139" y="2571915"/>
+            <a:ext cx="1379809" cy="360000"/>
+          </a:xfrm>
+          <a:prstGeom prst="roundRect">
+            <a:avLst/>
+          </a:prstGeom>
+          <a:solidFill>
+            <a:srgbClr val="CCFFFF"/>
+          </a:solidFill>
+          <a:ln w="12700" cap="flat" cmpd="sng" algn="ctr">
+            <a:solidFill>
+              <a:schemeClr val="accent5">
+                <a:lumMod val="60000"/>
+                <a:lumOff val="40000"/>
+              </a:schemeClr>
+            </a:solidFill>
+            <a:prstDash val="solid"/>
+            <a:round/>
+            <a:headEnd type="none" w="med" len="med"/>
+            <a:tailEnd type="none" w="med" len="med"/>
+          </a:ln>
+          <a:effectLst/>
+        </p:spPr>
+        <p:txBody>
+          <a:bodyPr lIns="0" tIns="0" rIns="0" bIns="0" rtlCol="0" anchor="ctr"/>
+          <a:lstStyle/>
+          <a:p>
+            <a:pPr marL="0" marR="0" lvl="0" indent="0" algn="ctr" defTabSz="914400" eaLnBrk="1" fontAlgn="auto" latinLnBrk="0" hangingPunct="1">
+              <a:lnSpc>
+                <a:spcPct val="100000"/>
+              </a:lnSpc>
+              <a:spcBef>
+                <a:spcPts val="0"/>
+              </a:spcBef>
+              <a:spcAft>
+                <a:spcPts val="0"/>
+              </a:spcAft>
+              <a:buClrTx/>
+              <a:buSzTx/>
+              <a:buFontTx/>
+              <a:buNone/>
+              <a:tabLst/>
+              <a:defRPr/>
+            </a:pPr>
+            <a:r>
+              <a:rPr kumimoji="0" lang="en-GB" sz="1400" i="0" u="none" strike="noStrike" kern="0" cap="none" spc="0" normalizeH="0" baseline="0" noProof="0" dirty="0">
+                <a:ln>
+                  <a:noFill/>
+                </a:ln>
+                <a:solidFill>
+                  <a:prstClr val="black"/>
+                </a:solidFill>
+                <a:effectLst/>
+                <a:uLnTx/>
+                <a:uFillTx/>
+                <a:latin typeface="Calibri" panose="020F0502020204030204" pitchFamily="34" charset="0"/>
+                <a:cs typeface="Calibri" panose="020F0502020204030204" pitchFamily="34" charset="0"/>
+              </a:rPr>
+              <a:t>Load Balancer</a:t>
+            </a:r>
+          </a:p>
+        </p:txBody>
+      </p:sp>
+      <p:sp>
+        <p:nvSpPr>
+          <p:cNvPr id="11" name="Rettangolo arrotondato 27">
+            <a:extLst>
+              <a:ext uri="{FF2B5EF4-FFF2-40B4-BE49-F238E27FC236}">
+                <a16:creationId xmlns:a16="http://schemas.microsoft.com/office/drawing/2014/main" id="{6C240745-9D1E-CB42-AC90-1BF748A0FFB4}"/>
+              </a:ext>
+            </a:extLst>
+          </p:cNvPr>
+          <p:cNvSpPr/>
+          <p:nvPr/>
+        </p:nvSpPr>
+        <p:spPr>
+          <a:xfrm>
+            <a:off x="4075235" y="1173253"/>
+            <a:ext cx="1168791" cy="360000"/>
+          </a:xfrm>
+          <a:prstGeom prst="roundRect">
+            <a:avLst/>
+          </a:prstGeom>
+          <a:noFill/>
+          <a:ln w="12700" cap="flat" cmpd="sng" algn="ctr">
+            <a:solidFill>
+              <a:schemeClr val="accent4">
+                <a:lumMod val="75000"/>
+              </a:schemeClr>
+            </a:solidFill>
+            <a:prstDash val="solid"/>
+            <a:round/>
+            <a:headEnd type="none" w="med" len="med"/>
+            <a:tailEnd type="none" w="med" len="med"/>
+          </a:ln>
+          <a:effectLst/>
+        </p:spPr>
+        <p:txBody>
+          <a:bodyPr lIns="0" tIns="0" rIns="0" bIns="0" rtlCol="0" anchor="ctr"/>
+          <a:lstStyle/>
+          <a:p>
+            <a:pPr marL="0" marR="0" lvl="0" indent="0" algn="ctr" defTabSz="914400" eaLnBrk="1" fontAlgn="auto" latinLnBrk="0" hangingPunct="1">
+              <a:lnSpc>
+                <a:spcPct val="100000"/>
+              </a:lnSpc>
+              <a:spcBef>
+                <a:spcPts val="0"/>
+              </a:spcBef>
+              <a:spcAft>
+                <a:spcPts val="0"/>
+              </a:spcAft>
+              <a:buClrTx/>
+              <a:buSzTx/>
+              <a:buFontTx/>
+              <a:buNone/>
+              <a:tabLst/>
+              <a:defRPr/>
+            </a:pPr>
+            <a:r>
+              <a:rPr kumimoji="0" lang="en-GB" sz="1400" i="0" u="none" strike="noStrike" kern="0" cap="none" spc="0" normalizeH="0" baseline="0" noProof="0" dirty="0" err="1">
+                <a:ln>
+                  <a:noFill/>
+                </a:ln>
+                <a:solidFill>
+                  <a:prstClr val="black"/>
+                </a:solidFill>
+                <a:effectLst/>
+                <a:uLnTx/>
+                <a:uFillTx/>
+                <a:latin typeface="Calibri" panose="020F0502020204030204" pitchFamily="34" charset="0"/>
+                <a:cs typeface="Calibri" panose="020F0502020204030204" pitchFamily="34" charset="0"/>
+              </a:rPr>
+              <a:t>pcn-iptables</a:t>
+            </a:r>
+            <a:endParaRPr kumimoji="0" lang="en-GB" sz="1400" i="0" u="none" strike="noStrike" kern="0" cap="none" spc="0" normalizeH="0" baseline="0" noProof="0" dirty="0">
+              <a:ln>
+                <a:noFill/>
+              </a:ln>
+              <a:solidFill>
+                <a:prstClr val="black"/>
+              </a:solidFill>
+              <a:effectLst/>
+              <a:uLnTx/>
+              <a:uFillTx/>
+              <a:latin typeface="Calibri" panose="020F0502020204030204" pitchFamily="34" charset="0"/>
+              <a:cs typeface="Calibri" panose="020F0502020204030204" pitchFamily="34" charset="0"/>
+            </a:endParaRPr>
+          </a:p>
+        </p:txBody>
+      </p:sp>
+      <p:sp>
+        <p:nvSpPr>
+          <p:cNvPr id="12" name="Rettangolo arrotondato 30">
+            <a:extLst>
+              <a:ext uri="{FF2B5EF4-FFF2-40B4-BE49-F238E27FC236}">
+                <a16:creationId xmlns:a16="http://schemas.microsoft.com/office/drawing/2014/main" id="{92ABD1DF-4F25-2C48-B784-2BD34AE65A90}"/>
+              </a:ext>
+            </a:extLst>
+          </p:cNvPr>
+          <p:cNvSpPr/>
+          <p:nvPr/>
+        </p:nvSpPr>
+        <p:spPr>
+          <a:xfrm>
+            <a:off x="3168945" y="1173253"/>
+            <a:ext cx="752609" cy="360000"/>
+          </a:xfrm>
+          <a:prstGeom prst="roundRect">
+            <a:avLst/>
+          </a:prstGeom>
+          <a:noFill/>
+          <a:ln w="12700" cap="flat" cmpd="sng" algn="ctr">
+            <a:solidFill>
+              <a:schemeClr val="accent4">
+                <a:lumMod val="75000"/>
+              </a:schemeClr>
+            </a:solidFill>
+            <a:prstDash val="solid"/>
+            <a:round/>
+            <a:headEnd type="none" w="med" len="med"/>
+            <a:tailEnd type="none" w="med" len="med"/>
+          </a:ln>
+          <a:effectLst/>
+        </p:spPr>
+        <p:txBody>
+          <a:bodyPr lIns="0" tIns="0" rIns="0" bIns="0" rtlCol="0" anchor="ctr"/>
+          <a:lstStyle/>
+          <a:p>
+            <a:pPr marL="0" marR="0" lvl="0" indent="0" algn="ctr" defTabSz="914400" eaLnBrk="1" fontAlgn="auto" latinLnBrk="0" hangingPunct="1">
+              <a:lnSpc>
+                <a:spcPct val="100000"/>
+              </a:lnSpc>
+              <a:spcBef>
+                <a:spcPts val="0"/>
+              </a:spcBef>
+              <a:spcAft>
+                <a:spcPts val="0"/>
+              </a:spcAft>
+              <a:buClrTx/>
+              <a:buSzTx/>
+              <a:buFontTx/>
+              <a:buNone/>
+              <a:tabLst/>
+              <a:defRPr/>
+            </a:pPr>
+            <a:r>
+              <a:rPr kumimoji="0" lang="en-GB" sz="1400" i="0" u="none" strike="noStrike" kern="0" cap="none" spc="0" normalizeH="0" baseline="0" noProof="0" dirty="0">
+                <a:ln>
+                  <a:noFill/>
+                </a:ln>
+                <a:solidFill>
+                  <a:prstClr val="black"/>
+                </a:solidFill>
+                <a:effectLst/>
+                <a:uLnTx/>
+                <a:uFillTx/>
+                <a:latin typeface="Calibri" panose="020F0502020204030204" pitchFamily="34" charset="0"/>
+                <a:cs typeface="Calibri" panose="020F0502020204030204" pitchFamily="34" charset="0"/>
+              </a:rPr>
+              <a:t>pcn-k8s</a:t>
+            </a:r>
+          </a:p>
+        </p:txBody>
+      </p:sp>
+      <p:sp>
+        <p:nvSpPr>
+          <p:cNvPr id="14" name="Rettangolo arrotondato 1">
+            <a:extLst>
+              <a:ext uri="{FF2B5EF4-FFF2-40B4-BE49-F238E27FC236}">
+                <a16:creationId xmlns:a16="http://schemas.microsoft.com/office/drawing/2014/main" id="{2DEA9E37-FB17-BB47-A9ED-8D1F778A45D3}"/>
+              </a:ext>
+            </a:extLst>
+          </p:cNvPr>
+          <p:cNvSpPr/>
+          <p:nvPr/>
+        </p:nvSpPr>
+        <p:spPr>
+          <a:xfrm>
+            <a:off x="224977" y="4561319"/>
+            <a:ext cx="5472000" cy="530226"/>
+          </a:xfrm>
+          <a:prstGeom prst="roundRect">
+            <a:avLst>
+              <a:gd name="adj" fmla="val 20909"/>
+            </a:avLst>
+          </a:prstGeom>
+          <a:solidFill>
+            <a:srgbClr val="FFFF99"/>
+          </a:solidFill>
+          <a:ln w="12700" cap="flat" cmpd="sng" algn="ctr">
+            <a:solidFill>
+              <a:srgbClr val="ED7D31"/>
+            </a:solidFill>
+            <a:prstDash val="solid"/>
+            <a:miter lim="800000"/>
+            <a:headEnd type="none" w="med" len="med"/>
+            <a:tailEnd type="none" w="med" len="med"/>
+          </a:ln>
+          <a:effectLst/>
+        </p:spPr>
+        <p:txBody>
+          <a:bodyPr lIns="0" tIns="0" rIns="0" bIns="0" rtlCol="0" anchor="ctr"/>
+          <a:lstStyle/>
+          <a:p>
+            <a:pPr marL="0" marR="0" lvl="0" indent="0" algn="ctr" defTabSz="914400" eaLnBrk="1" fontAlgn="auto" latinLnBrk="0" hangingPunct="1">
+              <a:lnSpc>
+                <a:spcPct val="100000"/>
+              </a:lnSpc>
+              <a:spcBef>
+                <a:spcPts val="0"/>
+              </a:spcBef>
+              <a:spcAft>
+                <a:spcPts val="0"/>
+              </a:spcAft>
+              <a:buClrTx/>
+              <a:buSzTx/>
+              <a:buFontTx/>
+              <a:buNone/>
+              <a:tabLst/>
+              <a:defRPr/>
+            </a:pPr>
+            <a:endParaRPr kumimoji="0" lang="en-GB" sz="1600" i="0" u="none" strike="noStrike" kern="0" cap="none" spc="0" normalizeH="0" baseline="0" noProof="0" dirty="0">
+              <a:ln>
+                <a:noFill/>
+              </a:ln>
+              <a:solidFill>
+                <a:prstClr val="black"/>
+              </a:solidFill>
+              <a:effectLst/>
+              <a:uLnTx/>
+              <a:uFillTx/>
+              <a:latin typeface="Calibri" panose="020F0502020204030204" pitchFamily="34" charset="0"/>
+              <a:cs typeface="Calibri" panose="020F0502020204030204" pitchFamily="34" charset="0"/>
+            </a:endParaRPr>
+          </a:p>
+        </p:txBody>
+      </p:sp>
+      <p:sp>
+        <p:nvSpPr>
+          <p:cNvPr id="15" name="Rettangolo arrotondato 24">
+            <a:extLst>
+              <a:ext uri="{FF2B5EF4-FFF2-40B4-BE49-F238E27FC236}">
+                <a16:creationId xmlns:a16="http://schemas.microsoft.com/office/drawing/2014/main" id="{5E678B7A-7D20-F046-A80C-8041B6979125}"/>
+              </a:ext>
+            </a:extLst>
+          </p:cNvPr>
+          <p:cNvSpPr/>
+          <p:nvPr/>
+        </p:nvSpPr>
+        <p:spPr>
+          <a:xfrm>
+            <a:off x="1456460" y="4690841"/>
+            <a:ext cx="759371" cy="290409"/>
+          </a:xfrm>
+          <a:prstGeom prst="roundRect">
+            <a:avLst/>
+          </a:prstGeom>
+          <a:solidFill>
+            <a:srgbClr val="FFFF99"/>
+          </a:solidFill>
+          <a:ln w="12700" cap="flat" cmpd="sng" algn="ctr">
+            <a:solidFill>
+              <a:srgbClr val="ED7D31"/>
+            </a:solidFill>
+            <a:prstDash val="solid"/>
+            <a:round/>
+            <a:headEnd type="none" w="med" len="med"/>
+            <a:tailEnd type="none" w="med" len="med"/>
+          </a:ln>
+          <a:effectLst/>
+        </p:spPr>
+        <p:txBody>
+          <a:bodyPr lIns="0" tIns="0" rIns="0" bIns="0" rtlCol="0" anchor="ctr"/>
+          <a:lstStyle/>
+          <a:p>
+            <a:pPr marL="0" marR="0" lvl="0" indent="0" algn="ctr" defTabSz="914400" eaLnBrk="1" fontAlgn="auto" latinLnBrk="0" hangingPunct="1">
+              <a:lnSpc>
+                <a:spcPct val="100000"/>
+              </a:lnSpc>
+              <a:spcBef>
+                <a:spcPts val="0"/>
+              </a:spcBef>
+              <a:spcAft>
+                <a:spcPts val="0"/>
+              </a:spcAft>
+              <a:buClrTx/>
+              <a:buSzTx/>
+              <a:buFontTx/>
+              <a:buNone/>
+              <a:tabLst/>
+              <a:defRPr/>
+            </a:pPr>
+            <a:r>
+              <a:rPr kumimoji="0" lang="en-GB" sz="1400" i="0" u="none" strike="noStrike" kern="0" cap="none" spc="0" normalizeH="0" baseline="0" noProof="0" dirty="0">
+                <a:ln>
+                  <a:noFill/>
+                </a:ln>
+                <a:solidFill>
+                  <a:prstClr val="black"/>
+                </a:solidFill>
+                <a:effectLst/>
+                <a:uLnTx/>
+                <a:uFillTx/>
+                <a:latin typeface="Calibri" panose="020F0502020204030204" pitchFamily="34" charset="0"/>
+                <a:cs typeface="Calibri" panose="020F0502020204030204" pitchFamily="34" charset="0"/>
+              </a:rPr>
+              <a:t>BPF</a:t>
+            </a:r>
+          </a:p>
+        </p:txBody>
+      </p:sp>
+      <p:sp>
+        <p:nvSpPr>
+          <p:cNvPr id="16" name="Rettangolo arrotondato 25">
+            <a:extLst>
+              <a:ext uri="{FF2B5EF4-FFF2-40B4-BE49-F238E27FC236}">
+                <a16:creationId xmlns:a16="http://schemas.microsoft.com/office/drawing/2014/main" id="{6B36296E-DDEA-3344-91C8-8D9F3D793D31}"/>
+              </a:ext>
+            </a:extLst>
+          </p:cNvPr>
+          <p:cNvSpPr/>
+          <p:nvPr/>
+        </p:nvSpPr>
+        <p:spPr>
+          <a:xfrm>
+            <a:off x="3600667" y="4683364"/>
+            <a:ext cx="759371" cy="290409"/>
+          </a:xfrm>
+          <a:prstGeom prst="roundRect">
+            <a:avLst/>
+          </a:prstGeom>
+          <a:solidFill>
+            <a:srgbClr val="FFFF99"/>
+          </a:solidFill>
+          <a:ln w="12700" cap="flat" cmpd="sng" algn="ctr">
+            <a:solidFill>
+              <a:srgbClr val="ED7D31"/>
+            </a:solidFill>
+            <a:prstDash val="solid"/>
+            <a:round/>
+            <a:headEnd type="none" w="med" len="med"/>
+            <a:tailEnd type="none" w="med" len="med"/>
+          </a:ln>
+          <a:effectLst/>
+        </p:spPr>
+        <p:txBody>
+          <a:bodyPr lIns="0" tIns="0" rIns="0" bIns="0" rtlCol="0" anchor="ctr"/>
+          <a:lstStyle/>
+          <a:p>
+            <a:pPr marL="0" marR="0" lvl="0" indent="0" algn="ctr" defTabSz="914400" eaLnBrk="1" fontAlgn="auto" latinLnBrk="0" hangingPunct="1">
+              <a:lnSpc>
+                <a:spcPct val="100000"/>
+              </a:lnSpc>
+              <a:spcBef>
+                <a:spcPts val="0"/>
+              </a:spcBef>
+              <a:spcAft>
+                <a:spcPts val="0"/>
+              </a:spcAft>
+              <a:buClrTx/>
+              <a:buSzTx/>
+              <a:buFontTx/>
+              <a:buNone/>
+              <a:tabLst/>
+              <a:defRPr/>
+            </a:pPr>
+            <a:r>
+              <a:rPr kumimoji="0" lang="en-GB" sz="1400" i="0" u="none" strike="noStrike" kern="0" cap="none" spc="0" normalizeH="0" baseline="0" noProof="0" dirty="0">
+                <a:ln>
+                  <a:noFill/>
+                </a:ln>
+                <a:solidFill>
+                  <a:prstClr val="black"/>
+                </a:solidFill>
+                <a:effectLst/>
+                <a:uLnTx/>
+                <a:uFillTx/>
+                <a:latin typeface="Calibri" panose="020F0502020204030204" pitchFamily="34" charset="0"/>
+                <a:cs typeface="Calibri" panose="020F0502020204030204" pitchFamily="34" charset="0"/>
+              </a:rPr>
+              <a:t>XDP</a:t>
+            </a:r>
+          </a:p>
+        </p:txBody>
+      </p:sp>
+      <p:sp>
+        <p:nvSpPr>
+          <p:cNvPr id="17" name="CasellaDiTesto 8">
+            <a:extLst>
+              <a:ext uri="{FF2B5EF4-FFF2-40B4-BE49-F238E27FC236}">
+                <a16:creationId xmlns:a16="http://schemas.microsoft.com/office/drawing/2014/main" id="{E97BF14D-1531-6846-99C8-D6A8C69C11E1}"/>
+              </a:ext>
+            </a:extLst>
+          </p:cNvPr>
+          <p:cNvSpPr txBox="1"/>
+          <p:nvPr/>
+        </p:nvSpPr>
+        <p:spPr>
+          <a:xfrm>
+            <a:off x="2620697" y="4724638"/>
+            <a:ext cx="451662" cy="246221"/>
+          </a:xfrm>
+          <a:prstGeom prst="rect">
+            <a:avLst/>
+          </a:prstGeom>
+          <a:solidFill>
+            <a:srgbClr val="FFFF99"/>
+          </a:solidFill>
+          <a:ln w="12700">
+            <a:noFill/>
+          </a:ln>
+        </p:spPr>
+        <p:txBody>
+          <a:bodyPr wrap="none" lIns="0" tIns="0" rIns="0" bIns="0" rtlCol="0">
+            <a:spAutoFit/>
+          </a:bodyPr>
+          <a:lstStyle/>
+          <a:p>
+            <a:pPr defTabSz="914400"/>
+            <a:r>
+              <a:rPr lang="en-GB" sz="1600" dirty="0">
+                <a:solidFill>
+                  <a:prstClr val="black"/>
+                </a:solidFill>
+                <a:latin typeface="Calibri" panose="020F0502020204030204" pitchFamily="34" charset="0"/>
+                <a:cs typeface="Calibri" panose="020F0502020204030204" pitchFamily="34" charset="0"/>
+              </a:rPr>
+              <a:t>Linux</a:t>
+            </a:r>
+          </a:p>
+        </p:txBody>
+      </p:sp>
+      <p:sp>
+        <p:nvSpPr>
+          <p:cNvPr id="18" name="CasellaDiTesto 2">
+            <a:extLst>
+              <a:ext uri="{FF2B5EF4-FFF2-40B4-BE49-F238E27FC236}">
+                <a16:creationId xmlns:a16="http://schemas.microsoft.com/office/drawing/2014/main" id="{52FB5BF3-20ED-664F-9051-4E77A8AF2876}"/>
+              </a:ext>
+            </a:extLst>
+          </p:cNvPr>
+          <p:cNvSpPr txBox="1"/>
+          <p:nvPr/>
+        </p:nvSpPr>
+        <p:spPr>
+          <a:xfrm>
+            <a:off x="4196129" y="794851"/>
+            <a:ext cx="1017907" cy="246221"/>
+          </a:xfrm>
+          <a:prstGeom prst="rect">
+            <a:avLst/>
+          </a:prstGeom>
+          <a:noFill/>
+          <a:ln w="12700">
+            <a:noFill/>
+          </a:ln>
+        </p:spPr>
+        <p:txBody>
+          <a:bodyPr wrap="none" lIns="0" tIns="0" rIns="0" bIns="0" rtlCol="0">
+            <a:spAutoFit/>
+          </a:bodyPr>
+          <a:lstStyle/>
+          <a:p>
+            <a:pPr defTabSz="914400"/>
+            <a:r>
+              <a:rPr lang="en-GB" sz="1600" dirty="0">
+                <a:solidFill>
+                  <a:prstClr val="black"/>
+                </a:solidFill>
+                <a:latin typeface="Calibri" panose="020F0502020204030204" pitchFamily="34" charset="0"/>
+                <a:cs typeface="Calibri" panose="020F0502020204030204" pitchFamily="34" charset="0"/>
+              </a:rPr>
+              <a:t>Applications</a:t>
+            </a:r>
+          </a:p>
+        </p:txBody>
+      </p:sp>
+      <p:sp>
+        <p:nvSpPr>
+          <p:cNvPr id="19" name="CasellaDiTesto 22">
+            <a:extLst>
+              <a:ext uri="{FF2B5EF4-FFF2-40B4-BE49-F238E27FC236}">
+                <a16:creationId xmlns:a16="http://schemas.microsoft.com/office/drawing/2014/main" id="{3B7A7988-B228-2B44-B1DB-CB8A0B753612}"/>
+              </a:ext>
+            </a:extLst>
+          </p:cNvPr>
+          <p:cNvSpPr txBox="1"/>
+          <p:nvPr/>
+        </p:nvSpPr>
+        <p:spPr>
+          <a:xfrm>
+            <a:off x="4886559" y="2524214"/>
+            <a:ext cx="506549" cy="246221"/>
+          </a:xfrm>
+          <a:prstGeom prst="rect">
+            <a:avLst/>
+          </a:prstGeom>
+          <a:solidFill>
+            <a:srgbClr val="CCFFFF"/>
+          </a:solidFill>
+          <a:ln w="12700">
+            <a:noFill/>
+          </a:ln>
+        </p:spPr>
+        <p:txBody>
+          <a:bodyPr wrap="none" lIns="0" tIns="0" rIns="0" bIns="0" rtlCol="0">
+            <a:spAutoFit/>
+          </a:bodyPr>
+          <a:lstStyle/>
+          <a:p>
+            <a:pPr defTabSz="914400"/>
+            <a:r>
+              <a:rPr lang="en-GB" sz="1600" dirty="0">
+                <a:solidFill>
+                  <a:prstClr val="black"/>
+                </a:solidFill>
+                <a:latin typeface="Calibri" panose="020F0502020204030204" pitchFamily="34" charset="0"/>
+                <a:cs typeface="Calibri" panose="020F0502020204030204" pitchFamily="34" charset="0"/>
+              </a:rPr>
+              <a:t>Cubes</a:t>
+            </a:r>
+          </a:p>
+        </p:txBody>
+      </p:sp>
+      <p:sp>
+        <p:nvSpPr>
+          <p:cNvPr id="20" name="Rettangolo arrotondato 23">
+            <a:extLst>
+              <a:ext uri="{FF2B5EF4-FFF2-40B4-BE49-F238E27FC236}">
+                <a16:creationId xmlns:a16="http://schemas.microsoft.com/office/drawing/2014/main" id="{B1C54F06-B22C-D744-8E4E-DC6A0C0B6A84}"/>
+              </a:ext>
+            </a:extLst>
+          </p:cNvPr>
+          <p:cNvSpPr/>
+          <p:nvPr/>
+        </p:nvSpPr>
+        <p:spPr>
+          <a:xfrm>
+            <a:off x="643686" y="1137649"/>
+            <a:ext cx="1826697" cy="562630"/>
+          </a:xfrm>
+          <a:prstGeom prst="roundRect">
+            <a:avLst/>
+          </a:prstGeom>
+          <a:solidFill>
+            <a:schemeClr val="bg1">
+              <a:lumMod val="85000"/>
+            </a:schemeClr>
+          </a:solidFill>
+          <a:ln w="12700" cap="flat" cmpd="sng" algn="ctr">
+            <a:solidFill>
+              <a:srgbClr val="A5A5A5"/>
+            </a:solidFill>
+            <a:prstDash val="solid"/>
+            <a:miter lim="800000"/>
+          </a:ln>
+          <a:effectLst/>
+        </p:spPr>
+        <p:txBody>
+          <a:bodyPr lIns="0" tIns="0" rIns="0" bIns="0" rtlCol="0" anchor="ctr"/>
+          <a:lstStyle/>
+          <a:p>
+            <a:pPr marL="0" marR="0" lvl="0" indent="0" algn="ctr" defTabSz="914400" eaLnBrk="1" fontAlgn="auto" latinLnBrk="0" hangingPunct="1">
+              <a:lnSpc>
+                <a:spcPct val="100000"/>
+              </a:lnSpc>
+              <a:spcBef>
+                <a:spcPts val="0"/>
+              </a:spcBef>
+              <a:spcAft>
+                <a:spcPts val="0"/>
+              </a:spcAft>
+              <a:buClrTx/>
+              <a:buSzTx/>
+              <a:buFontTx/>
+              <a:buNone/>
+              <a:tabLst/>
+              <a:defRPr/>
+            </a:pPr>
+            <a:r>
+              <a:rPr kumimoji="0" lang="en-GB" sz="1600" i="0" u="none" strike="noStrike" kern="0" cap="none" spc="0" normalizeH="0" baseline="0" noProof="0" dirty="0">
+                <a:ln>
+                  <a:noFill/>
+                </a:ln>
+                <a:solidFill>
+                  <a:prstClr val="black"/>
+                </a:solidFill>
+                <a:effectLst/>
+                <a:uLnTx/>
+                <a:uFillTx/>
+                <a:latin typeface="Calibri" panose="020F0502020204030204" pitchFamily="34" charset="0"/>
+                <a:cs typeface="Calibri" panose="020F0502020204030204" pitchFamily="34" charset="0"/>
+              </a:rPr>
+              <a:t>CLI</a:t>
+            </a:r>
+          </a:p>
+        </p:txBody>
+      </p:sp>
+      <p:sp>
+        <p:nvSpPr>
+          <p:cNvPr id="22" name="Rettangolo arrotondato 16">
+            <a:extLst>
+              <a:ext uri="{FF2B5EF4-FFF2-40B4-BE49-F238E27FC236}">
+                <a16:creationId xmlns:a16="http://schemas.microsoft.com/office/drawing/2014/main" id="{33758A28-DF5E-BC4F-B6CB-1D70B38F22AA}"/>
+              </a:ext>
+            </a:extLst>
+          </p:cNvPr>
+          <p:cNvSpPr/>
+          <p:nvPr/>
+        </p:nvSpPr>
+        <p:spPr>
+          <a:xfrm>
+            <a:off x="4842103" y="3075220"/>
+            <a:ext cx="523888" cy="360000"/>
+          </a:xfrm>
+          <a:prstGeom prst="roundRect">
+            <a:avLst/>
+          </a:prstGeom>
+          <a:solidFill>
+            <a:srgbClr val="CCFFFF"/>
+          </a:solidFill>
+          <a:ln w="12700" cap="flat" cmpd="sng" algn="ctr">
+            <a:solidFill>
+              <a:schemeClr val="accent5">
+                <a:lumMod val="60000"/>
+                <a:lumOff val="40000"/>
+              </a:schemeClr>
+            </a:solidFill>
+            <a:prstDash val="solid"/>
+            <a:round/>
+            <a:headEnd type="none" w="med" len="med"/>
+            <a:tailEnd type="none" w="med" len="med"/>
+          </a:ln>
+          <a:effectLst/>
+        </p:spPr>
+        <p:txBody>
+          <a:bodyPr lIns="0" tIns="0" rIns="0" bIns="0" rtlCol="0" anchor="ctr"/>
+          <a:lstStyle/>
+          <a:p>
+            <a:pPr marL="0" marR="0" lvl="0" indent="0" algn="ctr" defTabSz="914400" eaLnBrk="1" fontAlgn="auto" latinLnBrk="0" hangingPunct="1">
+              <a:lnSpc>
+                <a:spcPct val="100000"/>
+              </a:lnSpc>
+              <a:spcBef>
+                <a:spcPts val="0"/>
+              </a:spcBef>
+              <a:spcAft>
+                <a:spcPts val="0"/>
+              </a:spcAft>
+              <a:buClrTx/>
+              <a:buSzTx/>
+              <a:buFontTx/>
+              <a:buNone/>
+              <a:tabLst/>
+              <a:defRPr/>
+            </a:pPr>
+            <a:r>
+              <a:rPr kumimoji="0" lang="en-GB" sz="1400" i="0" u="none" strike="noStrike" kern="0" cap="none" spc="0" normalizeH="0" baseline="0" noProof="0" dirty="0">
+                <a:ln>
+                  <a:noFill/>
+                </a:ln>
+                <a:solidFill>
+                  <a:prstClr val="black"/>
+                </a:solidFill>
+                <a:effectLst/>
+                <a:uLnTx/>
+                <a:uFillTx/>
+                <a:latin typeface="Calibri" panose="020F0502020204030204" pitchFamily="34" charset="0"/>
+                <a:cs typeface="Calibri" panose="020F0502020204030204" pitchFamily="34" charset="0"/>
+              </a:rPr>
+              <a:t>. . .</a:t>
+            </a:r>
+          </a:p>
+        </p:txBody>
+      </p:sp>
+      <p:sp>
+        <p:nvSpPr>
+          <p:cNvPr id="23" name="Rettangolo arrotondato 13">
+            <a:extLst>
+              <a:ext uri="{FF2B5EF4-FFF2-40B4-BE49-F238E27FC236}">
+                <a16:creationId xmlns:a16="http://schemas.microsoft.com/office/drawing/2014/main" id="{32CE114C-0B20-304A-88FA-FB974438FFBD}"/>
+              </a:ext>
+            </a:extLst>
+          </p:cNvPr>
+          <p:cNvSpPr/>
+          <p:nvPr/>
+        </p:nvSpPr>
+        <p:spPr>
+          <a:xfrm>
+            <a:off x="1242936" y="3075220"/>
+            <a:ext cx="805904" cy="360000"/>
+          </a:xfrm>
+          <a:prstGeom prst="roundRect">
+            <a:avLst/>
+          </a:prstGeom>
+          <a:solidFill>
+            <a:srgbClr val="CCFFFF"/>
+          </a:solidFill>
+          <a:ln w="12700" cap="flat" cmpd="sng" algn="ctr">
+            <a:solidFill>
+              <a:schemeClr val="accent5">
+                <a:lumMod val="60000"/>
+                <a:lumOff val="40000"/>
+              </a:schemeClr>
+            </a:solidFill>
+            <a:prstDash val="solid"/>
+            <a:round/>
+            <a:headEnd type="none" w="med" len="med"/>
+            <a:tailEnd type="none" w="med" len="med"/>
+          </a:ln>
+          <a:effectLst/>
+        </p:spPr>
+        <p:txBody>
+          <a:bodyPr lIns="0" tIns="0" rIns="0" bIns="0" rtlCol="0" anchor="ctr"/>
+          <a:lstStyle/>
+          <a:p>
+            <a:pPr marL="0" marR="0" lvl="0" indent="0" algn="ctr" defTabSz="914400" eaLnBrk="1" fontAlgn="auto" latinLnBrk="0" hangingPunct="1">
+              <a:lnSpc>
+                <a:spcPct val="100000"/>
+              </a:lnSpc>
+              <a:spcBef>
+                <a:spcPts val="0"/>
+              </a:spcBef>
+              <a:spcAft>
+                <a:spcPts val="0"/>
+              </a:spcAft>
+              <a:buClrTx/>
+              <a:buSzTx/>
+              <a:buFontTx/>
+              <a:buNone/>
+              <a:tabLst/>
+              <a:defRPr/>
+            </a:pPr>
+            <a:r>
+              <a:rPr kumimoji="0" lang="en-GB" sz="1400" i="0" u="none" strike="noStrike" kern="0" cap="none" spc="0" normalizeH="0" baseline="0" noProof="0" dirty="0">
+                <a:ln>
+                  <a:noFill/>
+                </a:ln>
+                <a:solidFill>
+                  <a:prstClr val="black"/>
+                </a:solidFill>
+                <a:effectLst/>
+                <a:uLnTx/>
+                <a:uFillTx/>
+                <a:latin typeface="Calibri" panose="020F0502020204030204" pitchFamily="34" charset="0"/>
+                <a:cs typeface="Calibri" panose="020F0502020204030204" pitchFamily="34" charset="0"/>
+              </a:rPr>
+              <a:t>Firewall</a:t>
+            </a:r>
+          </a:p>
+        </p:txBody>
+      </p:sp>
+      <p:sp>
+        <p:nvSpPr>
+          <p:cNvPr id="28" name="Freeform 27">
+            <a:extLst>
+              <a:ext uri="{FF2B5EF4-FFF2-40B4-BE49-F238E27FC236}">
+                <a16:creationId xmlns:a16="http://schemas.microsoft.com/office/drawing/2014/main" id="{2DEA9E37-FB17-BB47-A9ED-8D1F778A45D3}"/>
+              </a:ext>
+            </a:extLst>
+          </p:cNvPr>
+          <p:cNvSpPr/>
+          <p:nvPr/>
+        </p:nvSpPr>
+        <p:spPr>
+          <a:xfrm>
+            <a:off x="224565" y="1874249"/>
+            <a:ext cx="5472411" cy="2506053"/>
+          </a:xfrm>
+          <a:custGeom>
+            <a:avLst/>
+            <a:gdLst>
+              <a:gd name="connsiteX0" fmla="*/ 156952 w 5474834"/>
+              <a:gd name="connsiteY0" fmla="*/ 0 h 2506053"/>
+              <a:gd name="connsiteX1" fmla="*/ 5320716 w 5474834"/>
+              <a:gd name="connsiteY1" fmla="*/ 0 h 2506053"/>
+              <a:gd name="connsiteX2" fmla="*/ 5474834 w 5474834"/>
+              <a:gd name="connsiteY2" fmla="*/ 154118 h 2506053"/>
+              <a:gd name="connsiteX3" fmla="*/ 5474834 w 5474834"/>
+              <a:gd name="connsiteY3" fmla="*/ 171368 h 2506053"/>
+              <a:gd name="connsiteX4" fmla="*/ 5320716 w 5474834"/>
+              <a:gd name="connsiteY4" fmla="*/ 325486 h 2506053"/>
+              <a:gd name="connsiteX5" fmla="*/ 843367 w 5474834"/>
+              <a:gd name="connsiteY5" fmla="*/ 325486 h 2506053"/>
+              <a:gd name="connsiteX6" fmla="*/ 843367 w 5474834"/>
+              <a:gd name="connsiteY6" fmla="*/ 328960 h 2506053"/>
+              <a:gd name="connsiteX7" fmla="*/ 838997 w 5474834"/>
+              <a:gd name="connsiteY7" fmla="*/ 328960 h 2506053"/>
+              <a:gd name="connsiteX8" fmla="*/ 649126 w 5474834"/>
+              <a:gd name="connsiteY8" fmla="*/ 518831 h 2506053"/>
+              <a:gd name="connsiteX9" fmla="*/ 649126 w 5474834"/>
+              <a:gd name="connsiteY9" fmla="*/ 1774635 h 2506053"/>
+              <a:gd name="connsiteX10" fmla="*/ 838997 w 5474834"/>
+              <a:gd name="connsiteY10" fmla="*/ 1964506 h 2506053"/>
+              <a:gd name="connsiteX11" fmla="*/ 843367 w 5474834"/>
+              <a:gd name="connsiteY11" fmla="*/ 1964506 h 2506053"/>
+              <a:gd name="connsiteX12" fmla="*/ 843367 w 5474834"/>
+              <a:gd name="connsiteY12" fmla="*/ 1967568 h 2506053"/>
+              <a:gd name="connsiteX13" fmla="*/ 5290193 w 5474834"/>
+              <a:gd name="connsiteY13" fmla="*/ 1967568 h 2506053"/>
+              <a:gd name="connsiteX14" fmla="*/ 5474834 w 5474834"/>
+              <a:gd name="connsiteY14" fmla="*/ 2152209 h 2506053"/>
+              <a:gd name="connsiteX15" fmla="*/ 5474834 w 5474834"/>
+              <a:gd name="connsiteY15" fmla="*/ 2321412 h 2506053"/>
+              <a:gd name="connsiteX16" fmla="*/ 5290193 w 5474834"/>
+              <a:gd name="connsiteY16" fmla="*/ 2506053 h 2506053"/>
+              <a:gd name="connsiteX17" fmla="*/ 187475 w 5474834"/>
+              <a:gd name="connsiteY17" fmla="*/ 2506053 h 2506053"/>
+              <a:gd name="connsiteX18" fmla="*/ 2834 w 5474834"/>
+              <a:gd name="connsiteY18" fmla="*/ 2321412 h 2506053"/>
+              <a:gd name="connsiteX19" fmla="*/ 2834 w 5474834"/>
+              <a:gd name="connsiteY19" fmla="*/ 2194262 h 2506053"/>
+              <a:gd name="connsiteX20" fmla="*/ 0 w 5474834"/>
+              <a:gd name="connsiteY20" fmla="*/ 2180225 h 2506053"/>
+              <a:gd name="connsiteX21" fmla="*/ 0 w 5474834"/>
+              <a:gd name="connsiteY21" fmla="*/ 240563 h 2506053"/>
+              <a:gd name="connsiteX22" fmla="*/ 8402 w 5474834"/>
+              <a:gd name="connsiteY22" fmla="*/ 198947 h 2506053"/>
+              <a:gd name="connsiteX23" fmla="*/ 2834 w 5474834"/>
+              <a:gd name="connsiteY23" fmla="*/ 171368 h 2506053"/>
+              <a:gd name="connsiteX24" fmla="*/ 2834 w 5474834"/>
+              <a:gd name="connsiteY24" fmla="*/ 154118 h 2506053"/>
+              <a:gd name="connsiteX25" fmla="*/ 156952 w 5474834"/>
+              <a:gd name="connsiteY25" fmla="*/ 0 h 2506053"/>
+              <a:gd name="connsiteX0" fmla="*/ 156952 w 5474834"/>
+              <a:gd name="connsiteY0" fmla="*/ 0 h 2506053"/>
+              <a:gd name="connsiteX1" fmla="*/ 5320716 w 5474834"/>
+              <a:gd name="connsiteY1" fmla="*/ 0 h 2506053"/>
+              <a:gd name="connsiteX2" fmla="*/ 5474834 w 5474834"/>
+              <a:gd name="connsiteY2" fmla="*/ 154118 h 2506053"/>
+              <a:gd name="connsiteX3" fmla="*/ 5474834 w 5474834"/>
+              <a:gd name="connsiteY3" fmla="*/ 171368 h 2506053"/>
+              <a:gd name="connsiteX4" fmla="*/ 5320716 w 5474834"/>
+              <a:gd name="connsiteY4" fmla="*/ 325486 h 2506053"/>
+              <a:gd name="connsiteX5" fmla="*/ 843367 w 5474834"/>
+              <a:gd name="connsiteY5" fmla="*/ 325486 h 2506053"/>
+              <a:gd name="connsiteX6" fmla="*/ 843367 w 5474834"/>
+              <a:gd name="connsiteY6" fmla="*/ 328960 h 2506053"/>
+              <a:gd name="connsiteX7" fmla="*/ 838997 w 5474834"/>
+              <a:gd name="connsiteY7" fmla="*/ 328960 h 2506053"/>
+              <a:gd name="connsiteX8" fmla="*/ 649126 w 5474834"/>
+              <a:gd name="connsiteY8" fmla="*/ 518831 h 2506053"/>
+              <a:gd name="connsiteX9" fmla="*/ 649126 w 5474834"/>
+              <a:gd name="connsiteY9" fmla="*/ 1774635 h 2506053"/>
+              <a:gd name="connsiteX10" fmla="*/ 838997 w 5474834"/>
+              <a:gd name="connsiteY10" fmla="*/ 1964506 h 2506053"/>
+              <a:gd name="connsiteX11" fmla="*/ 843367 w 5474834"/>
+              <a:gd name="connsiteY11" fmla="*/ 1964506 h 2506053"/>
+              <a:gd name="connsiteX12" fmla="*/ 843367 w 5474834"/>
+              <a:gd name="connsiteY12" fmla="*/ 1967568 h 2506053"/>
+              <a:gd name="connsiteX13" fmla="*/ 5290193 w 5474834"/>
+              <a:gd name="connsiteY13" fmla="*/ 1967568 h 2506053"/>
+              <a:gd name="connsiteX14" fmla="*/ 5474834 w 5474834"/>
+              <a:gd name="connsiteY14" fmla="*/ 2152209 h 2506053"/>
+              <a:gd name="connsiteX15" fmla="*/ 5474834 w 5474834"/>
+              <a:gd name="connsiteY15" fmla="*/ 2321412 h 2506053"/>
+              <a:gd name="connsiteX16" fmla="*/ 5290193 w 5474834"/>
+              <a:gd name="connsiteY16" fmla="*/ 2506053 h 2506053"/>
+              <a:gd name="connsiteX17" fmla="*/ 187475 w 5474834"/>
+              <a:gd name="connsiteY17" fmla="*/ 2506053 h 2506053"/>
+              <a:gd name="connsiteX18" fmla="*/ 2834 w 5474834"/>
+              <a:gd name="connsiteY18" fmla="*/ 2321412 h 2506053"/>
+              <a:gd name="connsiteX19" fmla="*/ 2834 w 5474834"/>
+              <a:gd name="connsiteY19" fmla="*/ 2194262 h 2506053"/>
+              <a:gd name="connsiteX20" fmla="*/ 0 w 5474834"/>
+              <a:gd name="connsiteY20" fmla="*/ 2180225 h 2506053"/>
+              <a:gd name="connsiteX21" fmla="*/ 0 w 5474834"/>
+              <a:gd name="connsiteY21" fmla="*/ 240563 h 2506053"/>
+              <a:gd name="connsiteX22" fmla="*/ 8402 w 5474834"/>
+              <a:gd name="connsiteY22" fmla="*/ 198947 h 2506053"/>
+              <a:gd name="connsiteX23" fmla="*/ 2834 w 5474834"/>
+              <a:gd name="connsiteY23" fmla="*/ 154118 h 2506053"/>
+              <a:gd name="connsiteX24" fmla="*/ 156952 w 5474834"/>
+              <a:gd name="connsiteY24" fmla="*/ 0 h 2506053"/>
+              <a:gd name="connsiteX0" fmla="*/ 156952 w 5474834"/>
+              <a:gd name="connsiteY0" fmla="*/ 0 h 2506053"/>
+              <a:gd name="connsiteX1" fmla="*/ 5320716 w 5474834"/>
+              <a:gd name="connsiteY1" fmla="*/ 0 h 2506053"/>
+              <a:gd name="connsiteX2" fmla="*/ 5474834 w 5474834"/>
+              <a:gd name="connsiteY2" fmla="*/ 154118 h 2506053"/>
+              <a:gd name="connsiteX3" fmla="*/ 5474834 w 5474834"/>
+              <a:gd name="connsiteY3" fmla="*/ 171368 h 2506053"/>
+              <a:gd name="connsiteX4" fmla="*/ 5320716 w 5474834"/>
+              <a:gd name="connsiteY4" fmla="*/ 325486 h 2506053"/>
+              <a:gd name="connsiteX5" fmla="*/ 843367 w 5474834"/>
+              <a:gd name="connsiteY5" fmla="*/ 325486 h 2506053"/>
+              <a:gd name="connsiteX6" fmla="*/ 843367 w 5474834"/>
+              <a:gd name="connsiteY6" fmla="*/ 328960 h 2506053"/>
+              <a:gd name="connsiteX7" fmla="*/ 838997 w 5474834"/>
+              <a:gd name="connsiteY7" fmla="*/ 328960 h 2506053"/>
+              <a:gd name="connsiteX8" fmla="*/ 649126 w 5474834"/>
+              <a:gd name="connsiteY8" fmla="*/ 518831 h 2506053"/>
+              <a:gd name="connsiteX9" fmla="*/ 649126 w 5474834"/>
+              <a:gd name="connsiteY9" fmla="*/ 1774635 h 2506053"/>
+              <a:gd name="connsiteX10" fmla="*/ 838997 w 5474834"/>
+              <a:gd name="connsiteY10" fmla="*/ 1964506 h 2506053"/>
+              <a:gd name="connsiteX11" fmla="*/ 843367 w 5474834"/>
+              <a:gd name="connsiteY11" fmla="*/ 1964506 h 2506053"/>
+              <a:gd name="connsiteX12" fmla="*/ 843367 w 5474834"/>
+              <a:gd name="connsiteY12" fmla="*/ 1967568 h 2506053"/>
+              <a:gd name="connsiteX13" fmla="*/ 5290193 w 5474834"/>
+              <a:gd name="connsiteY13" fmla="*/ 1967568 h 2506053"/>
+              <a:gd name="connsiteX14" fmla="*/ 5474834 w 5474834"/>
+              <a:gd name="connsiteY14" fmla="*/ 2152209 h 2506053"/>
+              <a:gd name="connsiteX15" fmla="*/ 5474834 w 5474834"/>
+              <a:gd name="connsiteY15" fmla="*/ 2321412 h 2506053"/>
+              <a:gd name="connsiteX16" fmla="*/ 5290193 w 5474834"/>
+              <a:gd name="connsiteY16" fmla="*/ 2506053 h 2506053"/>
+              <a:gd name="connsiteX17" fmla="*/ 187475 w 5474834"/>
+              <a:gd name="connsiteY17" fmla="*/ 2506053 h 2506053"/>
+              <a:gd name="connsiteX18" fmla="*/ 2834 w 5474834"/>
+              <a:gd name="connsiteY18" fmla="*/ 2321412 h 2506053"/>
+              <a:gd name="connsiteX19" fmla="*/ 2834 w 5474834"/>
+              <a:gd name="connsiteY19" fmla="*/ 2194262 h 2506053"/>
+              <a:gd name="connsiteX20" fmla="*/ 0 w 5474834"/>
+              <a:gd name="connsiteY20" fmla="*/ 2180225 h 2506053"/>
+              <a:gd name="connsiteX21" fmla="*/ 0 w 5474834"/>
+              <a:gd name="connsiteY21" fmla="*/ 240563 h 2506053"/>
+              <a:gd name="connsiteX22" fmla="*/ 2834 w 5474834"/>
+              <a:gd name="connsiteY22" fmla="*/ 154118 h 2506053"/>
+              <a:gd name="connsiteX23" fmla="*/ 156952 w 5474834"/>
+              <a:gd name="connsiteY23" fmla="*/ 0 h 2506053"/>
+              <a:gd name="connsiteX0" fmla="*/ 156952 w 5474834"/>
+              <a:gd name="connsiteY0" fmla="*/ 0 h 2506053"/>
+              <a:gd name="connsiteX1" fmla="*/ 5320716 w 5474834"/>
+              <a:gd name="connsiteY1" fmla="*/ 0 h 2506053"/>
+              <a:gd name="connsiteX2" fmla="*/ 5474834 w 5474834"/>
+              <a:gd name="connsiteY2" fmla="*/ 154118 h 2506053"/>
+              <a:gd name="connsiteX3" fmla="*/ 5474834 w 5474834"/>
+              <a:gd name="connsiteY3" fmla="*/ 171368 h 2506053"/>
+              <a:gd name="connsiteX4" fmla="*/ 5320716 w 5474834"/>
+              <a:gd name="connsiteY4" fmla="*/ 325486 h 2506053"/>
+              <a:gd name="connsiteX5" fmla="*/ 843367 w 5474834"/>
+              <a:gd name="connsiteY5" fmla="*/ 325486 h 2506053"/>
+              <a:gd name="connsiteX6" fmla="*/ 843367 w 5474834"/>
+              <a:gd name="connsiteY6" fmla="*/ 328960 h 2506053"/>
+              <a:gd name="connsiteX7" fmla="*/ 838997 w 5474834"/>
+              <a:gd name="connsiteY7" fmla="*/ 328960 h 2506053"/>
+              <a:gd name="connsiteX8" fmla="*/ 649126 w 5474834"/>
+              <a:gd name="connsiteY8" fmla="*/ 518831 h 2506053"/>
+              <a:gd name="connsiteX9" fmla="*/ 649126 w 5474834"/>
+              <a:gd name="connsiteY9" fmla="*/ 1774635 h 2506053"/>
+              <a:gd name="connsiteX10" fmla="*/ 838997 w 5474834"/>
+              <a:gd name="connsiteY10" fmla="*/ 1964506 h 2506053"/>
+              <a:gd name="connsiteX11" fmla="*/ 843367 w 5474834"/>
+              <a:gd name="connsiteY11" fmla="*/ 1964506 h 2506053"/>
+              <a:gd name="connsiteX12" fmla="*/ 843367 w 5474834"/>
+              <a:gd name="connsiteY12" fmla="*/ 1967568 h 2506053"/>
+              <a:gd name="connsiteX13" fmla="*/ 5290193 w 5474834"/>
+              <a:gd name="connsiteY13" fmla="*/ 1967568 h 2506053"/>
+              <a:gd name="connsiteX14" fmla="*/ 5474834 w 5474834"/>
+              <a:gd name="connsiteY14" fmla="*/ 2152209 h 2506053"/>
+              <a:gd name="connsiteX15" fmla="*/ 5474834 w 5474834"/>
+              <a:gd name="connsiteY15" fmla="*/ 2321412 h 2506053"/>
+              <a:gd name="connsiteX16" fmla="*/ 5290193 w 5474834"/>
+              <a:gd name="connsiteY16" fmla="*/ 2506053 h 2506053"/>
+              <a:gd name="connsiteX17" fmla="*/ 187475 w 5474834"/>
+              <a:gd name="connsiteY17" fmla="*/ 2506053 h 2506053"/>
+              <a:gd name="connsiteX18" fmla="*/ 2834 w 5474834"/>
+              <a:gd name="connsiteY18" fmla="*/ 2321412 h 2506053"/>
+              <a:gd name="connsiteX19" fmla="*/ 0 w 5474834"/>
+              <a:gd name="connsiteY19" fmla="*/ 2180225 h 2506053"/>
+              <a:gd name="connsiteX20" fmla="*/ 0 w 5474834"/>
+              <a:gd name="connsiteY20" fmla="*/ 240563 h 2506053"/>
+              <a:gd name="connsiteX21" fmla="*/ 2834 w 5474834"/>
+              <a:gd name="connsiteY21" fmla="*/ 154118 h 2506053"/>
+              <a:gd name="connsiteX22" fmla="*/ 156952 w 5474834"/>
+              <a:gd name="connsiteY22" fmla="*/ 0 h 2506053"/>
+              <a:gd name="connsiteX0" fmla="*/ 168779 w 5486661"/>
+              <a:gd name="connsiteY0" fmla="*/ 0 h 2506053"/>
+              <a:gd name="connsiteX1" fmla="*/ 5332543 w 5486661"/>
+              <a:gd name="connsiteY1" fmla="*/ 0 h 2506053"/>
+              <a:gd name="connsiteX2" fmla="*/ 5486661 w 5486661"/>
+              <a:gd name="connsiteY2" fmla="*/ 154118 h 2506053"/>
+              <a:gd name="connsiteX3" fmla="*/ 5486661 w 5486661"/>
+              <a:gd name="connsiteY3" fmla="*/ 171368 h 2506053"/>
+              <a:gd name="connsiteX4" fmla="*/ 5332543 w 5486661"/>
+              <a:gd name="connsiteY4" fmla="*/ 325486 h 2506053"/>
+              <a:gd name="connsiteX5" fmla="*/ 855194 w 5486661"/>
+              <a:gd name="connsiteY5" fmla="*/ 325486 h 2506053"/>
+              <a:gd name="connsiteX6" fmla="*/ 855194 w 5486661"/>
+              <a:gd name="connsiteY6" fmla="*/ 328960 h 2506053"/>
+              <a:gd name="connsiteX7" fmla="*/ 850824 w 5486661"/>
+              <a:gd name="connsiteY7" fmla="*/ 328960 h 2506053"/>
+              <a:gd name="connsiteX8" fmla="*/ 660953 w 5486661"/>
+              <a:gd name="connsiteY8" fmla="*/ 518831 h 2506053"/>
+              <a:gd name="connsiteX9" fmla="*/ 660953 w 5486661"/>
+              <a:gd name="connsiteY9" fmla="*/ 1774635 h 2506053"/>
+              <a:gd name="connsiteX10" fmla="*/ 850824 w 5486661"/>
+              <a:gd name="connsiteY10" fmla="*/ 1964506 h 2506053"/>
+              <a:gd name="connsiteX11" fmla="*/ 855194 w 5486661"/>
+              <a:gd name="connsiteY11" fmla="*/ 1964506 h 2506053"/>
+              <a:gd name="connsiteX12" fmla="*/ 855194 w 5486661"/>
+              <a:gd name="connsiteY12" fmla="*/ 1967568 h 2506053"/>
+              <a:gd name="connsiteX13" fmla="*/ 5302020 w 5486661"/>
+              <a:gd name="connsiteY13" fmla="*/ 1967568 h 2506053"/>
+              <a:gd name="connsiteX14" fmla="*/ 5486661 w 5486661"/>
+              <a:gd name="connsiteY14" fmla="*/ 2152209 h 2506053"/>
+              <a:gd name="connsiteX15" fmla="*/ 5486661 w 5486661"/>
+              <a:gd name="connsiteY15" fmla="*/ 2321412 h 2506053"/>
+              <a:gd name="connsiteX16" fmla="*/ 5302020 w 5486661"/>
+              <a:gd name="connsiteY16" fmla="*/ 2506053 h 2506053"/>
+              <a:gd name="connsiteX17" fmla="*/ 199302 w 5486661"/>
+              <a:gd name="connsiteY17" fmla="*/ 2506053 h 2506053"/>
+              <a:gd name="connsiteX18" fmla="*/ 14661 w 5486661"/>
+              <a:gd name="connsiteY18" fmla="*/ 2321412 h 2506053"/>
+              <a:gd name="connsiteX19" fmla="*/ 11827 w 5486661"/>
+              <a:gd name="connsiteY19" fmla="*/ 240563 h 2506053"/>
+              <a:gd name="connsiteX20" fmla="*/ 14661 w 5486661"/>
+              <a:gd name="connsiteY20" fmla="*/ 154118 h 2506053"/>
+              <a:gd name="connsiteX21" fmla="*/ 168779 w 5486661"/>
+              <a:gd name="connsiteY21" fmla="*/ 0 h 2506053"/>
+              <a:gd name="connsiteX0" fmla="*/ 175332 w 5493214"/>
+              <a:gd name="connsiteY0" fmla="*/ 0 h 2506053"/>
+              <a:gd name="connsiteX1" fmla="*/ 5339096 w 5493214"/>
+              <a:gd name="connsiteY1" fmla="*/ 0 h 2506053"/>
+              <a:gd name="connsiteX2" fmla="*/ 5493214 w 5493214"/>
+              <a:gd name="connsiteY2" fmla="*/ 154118 h 2506053"/>
+              <a:gd name="connsiteX3" fmla="*/ 5493214 w 5493214"/>
+              <a:gd name="connsiteY3" fmla="*/ 171368 h 2506053"/>
+              <a:gd name="connsiteX4" fmla="*/ 5339096 w 5493214"/>
+              <a:gd name="connsiteY4" fmla="*/ 325486 h 2506053"/>
+              <a:gd name="connsiteX5" fmla="*/ 861747 w 5493214"/>
+              <a:gd name="connsiteY5" fmla="*/ 325486 h 2506053"/>
+              <a:gd name="connsiteX6" fmla="*/ 861747 w 5493214"/>
+              <a:gd name="connsiteY6" fmla="*/ 328960 h 2506053"/>
+              <a:gd name="connsiteX7" fmla="*/ 857377 w 5493214"/>
+              <a:gd name="connsiteY7" fmla="*/ 328960 h 2506053"/>
+              <a:gd name="connsiteX8" fmla="*/ 667506 w 5493214"/>
+              <a:gd name="connsiteY8" fmla="*/ 518831 h 2506053"/>
+              <a:gd name="connsiteX9" fmla="*/ 667506 w 5493214"/>
+              <a:gd name="connsiteY9" fmla="*/ 1774635 h 2506053"/>
+              <a:gd name="connsiteX10" fmla="*/ 857377 w 5493214"/>
+              <a:gd name="connsiteY10" fmla="*/ 1964506 h 2506053"/>
+              <a:gd name="connsiteX11" fmla="*/ 861747 w 5493214"/>
+              <a:gd name="connsiteY11" fmla="*/ 1964506 h 2506053"/>
+              <a:gd name="connsiteX12" fmla="*/ 861747 w 5493214"/>
+              <a:gd name="connsiteY12" fmla="*/ 1967568 h 2506053"/>
+              <a:gd name="connsiteX13" fmla="*/ 5308573 w 5493214"/>
+              <a:gd name="connsiteY13" fmla="*/ 1967568 h 2506053"/>
+              <a:gd name="connsiteX14" fmla="*/ 5493214 w 5493214"/>
+              <a:gd name="connsiteY14" fmla="*/ 2152209 h 2506053"/>
+              <a:gd name="connsiteX15" fmla="*/ 5493214 w 5493214"/>
+              <a:gd name="connsiteY15" fmla="*/ 2321412 h 2506053"/>
+              <a:gd name="connsiteX16" fmla="*/ 5308573 w 5493214"/>
+              <a:gd name="connsiteY16" fmla="*/ 2506053 h 2506053"/>
+              <a:gd name="connsiteX17" fmla="*/ 205855 w 5493214"/>
+              <a:gd name="connsiteY17" fmla="*/ 2506053 h 2506053"/>
+              <a:gd name="connsiteX18" fmla="*/ 21214 w 5493214"/>
+              <a:gd name="connsiteY18" fmla="*/ 2321412 h 2506053"/>
+              <a:gd name="connsiteX19" fmla="*/ 21214 w 5493214"/>
+              <a:gd name="connsiteY19" fmla="*/ 154118 h 2506053"/>
+              <a:gd name="connsiteX20" fmla="*/ 175332 w 5493214"/>
+              <a:gd name="connsiteY20" fmla="*/ 0 h 2506053"/>
+              <a:gd name="connsiteX0" fmla="*/ 168205 w 5486087"/>
+              <a:gd name="connsiteY0" fmla="*/ 0 h 2506053"/>
+              <a:gd name="connsiteX1" fmla="*/ 5331969 w 5486087"/>
+              <a:gd name="connsiteY1" fmla="*/ 0 h 2506053"/>
+              <a:gd name="connsiteX2" fmla="*/ 5486087 w 5486087"/>
+              <a:gd name="connsiteY2" fmla="*/ 154118 h 2506053"/>
+              <a:gd name="connsiteX3" fmla="*/ 5486087 w 5486087"/>
+              <a:gd name="connsiteY3" fmla="*/ 171368 h 2506053"/>
+              <a:gd name="connsiteX4" fmla="*/ 5331969 w 5486087"/>
+              <a:gd name="connsiteY4" fmla="*/ 325486 h 2506053"/>
+              <a:gd name="connsiteX5" fmla="*/ 854620 w 5486087"/>
+              <a:gd name="connsiteY5" fmla="*/ 325486 h 2506053"/>
+              <a:gd name="connsiteX6" fmla="*/ 854620 w 5486087"/>
+              <a:gd name="connsiteY6" fmla="*/ 328960 h 2506053"/>
+              <a:gd name="connsiteX7" fmla="*/ 850250 w 5486087"/>
+              <a:gd name="connsiteY7" fmla="*/ 328960 h 2506053"/>
+              <a:gd name="connsiteX8" fmla="*/ 660379 w 5486087"/>
+              <a:gd name="connsiteY8" fmla="*/ 518831 h 2506053"/>
+              <a:gd name="connsiteX9" fmla="*/ 660379 w 5486087"/>
+              <a:gd name="connsiteY9" fmla="*/ 1774635 h 2506053"/>
+              <a:gd name="connsiteX10" fmla="*/ 850250 w 5486087"/>
+              <a:gd name="connsiteY10" fmla="*/ 1964506 h 2506053"/>
+              <a:gd name="connsiteX11" fmla="*/ 854620 w 5486087"/>
+              <a:gd name="connsiteY11" fmla="*/ 1964506 h 2506053"/>
+              <a:gd name="connsiteX12" fmla="*/ 854620 w 5486087"/>
+              <a:gd name="connsiteY12" fmla="*/ 1967568 h 2506053"/>
+              <a:gd name="connsiteX13" fmla="*/ 5301446 w 5486087"/>
+              <a:gd name="connsiteY13" fmla="*/ 1967568 h 2506053"/>
+              <a:gd name="connsiteX14" fmla="*/ 5486087 w 5486087"/>
+              <a:gd name="connsiteY14" fmla="*/ 2152209 h 2506053"/>
+              <a:gd name="connsiteX15" fmla="*/ 5486087 w 5486087"/>
+              <a:gd name="connsiteY15" fmla="*/ 2321412 h 2506053"/>
+              <a:gd name="connsiteX16" fmla="*/ 5301446 w 5486087"/>
+              <a:gd name="connsiteY16" fmla="*/ 2506053 h 2506053"/>
+              <a:gd name="connsiteX17" fmla="*/ 198728 w 5486087"/>
+              <a:gd name="connsiteY17" fmla="*/ 2506053 h 2506053"/>
+              <a:gd name="connsiteX18" fmla="*/ 14087 w 5486087"/>
+              <a:gd name="connsiteY18" fmla="*/ 2321412 h 2506053"/>
+              <a:gd name="connsiteX19" fmla="*/ 14087 w 5486087"/>
+              <a:gd name="connsiteY19" fmla="*/ 154118 h 2506053"/>
+              <a:gd name="connsiteX20" fmla="*/ 168205 w 5486087"/>
+              <a:gd name="connsiteY20" fmla="*/ 0 h 2506053"/>
+              <a:gd name="connsiteX0" fmla="*/ 159124 w 5477006"/>
+              <a:gd name="connsiteY0" fmla="*/ 0 h 2506053"/>
+              <a:gd name="connsiteX1" fmla="*/ 5322888 w 5477006"/>
+              <a:gd name="connsiteY1" fmla="*/ 0 h 2506053"/>
+              <a:gd name="connsiteX2" fmla="*/ 5477006 w 5477006"/>
+              <a:gd name="connsiteY2" fmla="*/ 154118 h 2506053"/>
+              <a:gd name="connsiteX3" fmla="*/ 5477006 w 5477006"/>
+              <a:gd name="connsiteY3" fmla="*/ 171368 h 2506053"/>
+              <a:gd name="connsiteX4" fmla="*/ 5322888 w 5477006"/>
+              <a:gd name="connsiteY4" fmla="*/ 325486 h 2506053"/>
+              <a:gd name="connsiteX5" fmla="*/ 845539 w 5477006"/>
+              <a:gd name="connsiteY5" fmla="*/ 325486 h 2506053"/>
+              <a:gd name="connsiteX6" fmla="*/ 845539 w 5477006"/>
+              <a:gd name="connsiteY6" fmla="*/ 328960 h 2506053"/>
+              <a:gd name="connsiteX7" fmla="*/ 841169 w 5477006"/>
+              <a:gd name="connsiteY7" fmla="*/ 328960 h 2506053"/>
+              <a:gd name="connsiteX8" fmla="*/ 651298 w 5477006"/>
+              <a:gd name="connsiteY8" fmla="*/ 518831 h 2506053"/>
+              <a:gd name="connsiteX9" fmla="*/ 651298 w 5477006"/>
+              <a:gd name="connsiteY9" fmla="*/ 1774635 h 2506053"/>
+              <a:gd name="connsiteX10" fmla="*/ 841169 w 5477006"/>
+              <a:gd name="connsiteY10" fmla="*/ 1964506 h 2506053"/>
+              <a:gd name="connsiteX11" fmla="*/ 845539 w 5477006"/>
+              <a:gd name="connsiteY11" fmla="*/ 1964506 h 2506053"/>
+              <a:gd name="connsiteX12" fmla="*/ 845539 w 5477006"/>
+              <a:gd name="connsiteY12" fmla="*/ 1967568 h 2506053"/>
+              <a:gd name="connsiteX13" fmla="*/ 5292365 w 5477006"/>
+              <a:gd name="connsiteY13" fmla="*/ 1967568 h 2506053"/>
+              <a:gd name="connsiteX14" fmla="*/ 5477006 w 5477006"/>
+              <a:gd name="connsiteY14" fmla="*/ 2152209 h 2506053"/>
+              <a:gd name="connsiteX15" fmla="*/ 5477006 w 5477006"/>
+              <a:gd name="connsiteY15" fmla="*/ 2321412 h 2506053"/>
+              <a:gd name="connsiteX16" fmla="*/ 5292365 w 5477006"/>
+              <a:gd name="connsiteY16" fmla="*/ 2506053 h 2506053"/>
+              <a:gd name="connsiteX17" fmla="*/ 189647 w 5477006"/>
+              <a:gd name="connsiteY17" fmla="*/ 2506053 h 2506053"/>
+              <a:gd name="connsiteX18" fmla="*/ 5006 w 5477006"/>
+              <a:gd name="connsiteY18" fmla="*/ 2321412 h 2506053"/>
+              <a:gd name="connsiteX19" fmla="*/ 5006 w 5477006"/>
+              <a:gd name="connsiteY19" fmla="*/ 154118 h 2506053"/>
+              <a:gd name="connsiteX20" fmla="*/ 159124 w 5477006"/>
+              <a:gd name="connsiteY20" fmla="*/ 0 h 2506053"/>
+              <a:gd name="connsiteX0" fmla="*/ 156146 w 5474028"/>
+              <a:gd name="connsiteY0" fmla="*/ 0 h 2506053"/>
+              <a:gd name="connsiteX1" fmla="*/ 5319910 w 5474028"/>
+              <a:gd name="connsiteY1" fmla="*/ 0 h 2506053"/>
+              <a:gd name="connsiteX2" fmla="*/ 5474028 w 5474028"/>
+              <a:gd name="connsiteY2" fmla="*/ 154118 h 2506053"/>
+              <a:gd name="connsiteX3" fmla="*/ 5474028 w 5474028"/>
+              <a:gd name="connsiteY3" fmla="*/ 171368 h 2506053"/>
+              <a:gd name="connsiteX4" fmla="*/ 5319910 w 5474028"/>
+              <a:gd name="connsiteY4" fmla="*/ 325486 h 2506053"/>
+              <a:gd name="connsiteX5" fmla="*/ 842561 w 5474028"/>
+              <a:gd name="connsiteY5" fmla="*/ 325486 h 2506053"/>
+              <a:gd name="connsiteX6" fmla="*/ 842561 w 5474028"/>
+              <a:gd name="connsiteY6" fmla="*/ 328960 h 2506053"/>
+              <a:gd name="connsiteX7" fmla="*/ 838191 w 5474028"/>
+              <a:gd name="connsiteY7" fmla="*/ 328960 h 2506053"/>
+              <a:gd name="connsiteX8" fmla="*/ 648320 w 5474028"/>
+              <a:gd name="connsiteY8" fmla="*/ 518831 h 2506053"/>
+              <a:gd name="connsiteX9" fmla="*/ 648320 w 5474028"/>
+              <a:gd name="connsiteY9" fmla="*/ 1774635 h 2506053"/>
+              <a:gd name="connsiteX10" fmla="*/ 838191 w 5474028"/>
+              <a:gd name="connsiteY10" fmla="*/ 1964506 h 2506053"/>
+              <a:gd name="connsiteX11" fmla="*/ 842561 w 5474028"/>
+              <a:gd name="connsiteY11" fmla="*/ 1964506 h 2506053"/>
+              <a:gd name="connsiteX12" fmla="*/ 842561 w 5474028"/>
+              <a:gd name="connsiteY12" fmla="*/ 1967568 h 2506053"/>
+              <a:gd name="connsiteX13" fmla="*/ 5289387 w 5474028"/>
+              <a:gd name="connsiteY13" fmla="*/ 1967568 h 2506053"/>
+              <a:gd name="connsiteX14" fmla="*/ 5474028 w 5474028"/>
+              <a:gd name="connsiteY14" fmla="*/ 2152209 h 2506053"/>
+              <a:gd name="connsiteX15" fmla="*/ 5474028 w 5474028"/>
+              <a:gd name="connsiteY15" fmla="*/ 2321412 h 2506053"/>
+              <a:gd name="connsiteX16" fmla="*/ 5289387 w 5474028"/>
+              <a:gd name="connsiteY16" fmla="*/ 2506053 h 2506053"/>
+              <a:gd name="connsiteX17" fmla="*/ 186669 w 5474028"/>
+              <a:gd name="connsiteY17" fmla="*/ 2506053 h 2506053"/>
+              <a:gd name="connsiteX18" fmla="*/ 2028 w 5474028"/>
+              <a:gd name="connsiteY18" fmla="*/ 2321412 h 2506053"/>
+              <a:gd name="connsiteX19" fmla="*/ 2028 w 5474028"/>
+              <a:gd name="connsiteY19" fmla="*/ 154118 h 2506053"/>
+              <a:gd name="connsiteX20" fmla="*/ 156146 w 5474028"/>
+              <a:gd name="connsiteY20" fmla="*/ 0 h 2506053"/>
+              <a:gd name="connsiteX0" fmla="*/ 156146 w 5474028"/>
+              <a:gd name="connsiteY0" fmla="*/ 0 h 2506053"/>
+              <a:gd name="connsiteX1" fmla="*/ 5319910 w 5474028"/>
+              <a:gd name="connsiteY1" fmla="*/ 0 h 2506053"/>
+              <a:gd name="connsiteX2" fmla="*/ 5474028 w 5474028"/>
+              <a:gd name="connsiteY2" fmla="*/ 154118 h 2506053"/>
+              <a:gd name="connsiteX3" fmla="*/ 5474028 w 5474028"/>
+              <a:gd name="connsiteY3" fmla="*/ 171368 h 2506053"/>
+              <a:gd name="connsiteX4" fmla="*/ 5319910 w 5474028"/>
+              <a:gd name="connsiteY4" fmla="*/ 325486 h 2506053"/>
+              <a:gd name="connsiteX5" fmla="*/ 842561 w 5474028"/>
+              <a:gd name="connsiteY5" fmla="*/ 325486 h 2506053"/>
+              <a:gd name="connsiteX6" fmla="*/ 842561 w 5474028"/>
+              <a:gd name="connsiteY6" fmla="*/ 328960 h 2506053"/>
+              <a:gd name="connsiteX7" fmla="*/ 838191 w 5474028"/>
+              <a:gd name="connsiteY7" fmla="*/ 328960 h 2506053"/>
+              <a:gd name="connsiteX8" fmla="*/ 648320 w 5474028"/>
+              <a:gd name="connsiteY8" fmla="*/ 518831 h 2506053"/>
+              <a:gd name="connsiteX9" fmla="*/ 648320 w 5474028"/>
+              <a:gd name="connsiteY9" fmla="*/ 1774635 h 2506053"/>
+              <a:gd name="connsiteX10" fmla="*/ 838191 w 5474028"/>
+              <a:gd name="connsiteY10" fmla="*/ 1964506 h 2506053"/>
+              <a:gd name="connsiteX11" fmla="*/ 842561 w 5474028"/>
+              <a:gd name="connsiteY11" fmla="*/ 1964506 h 2506053"/>
+              <a:gd name="connsiteX12" fmla="*/ 842561 w 5474028"/>
+              <a:gd name="connsiteY12" fmla="*/ 1967568 h 2506053"/>
+              <a:gd name="connsiteX13" fmla="*/ 5289387 w 5474028"/>
+              <a:gd name="connsiteY13" fmla="*/ 1967568 h 2506053"/>
+              <a:gd name="connsiteX14" fmla="*/ 5474028 w 5474028"/>
+              <a:gd name="connsiteY14" fmla="*/ 2152209 h 2506053"/>
+              <a:gd name="connsiteX15" fmla="*/ 5474028 w 5474028"/>
+              <a:gd name="connsiteY15" fmla="*/ 2321412 h 2506053"/>
+              <a:gd name="connsiteX16" fmla="*/ 5289387 w 5474028"/>
+              <a:gd name="connsiteY16" fmla="*/ 2506053 h 2506053"/>
+              <a:gd name="connsiteX17" fmla="*/ 186669 w 5474028"/>
+              <a:gd name="connsiteY17" fmla="*/ 2506053 h 2506053"/>
+              <a:gd name="connsiteX18" fmla="*/ 2028 w 5474028"/>
+              <a:gd name="connsiteY18" fmla="*/ 2321412 h 2506053"/>
+              <a:gd name="connsiteX19" fmla="*/ 2028 w 5474028"/>
+              <a:gd name="connsiteY19" fmla="*/ 154118 h 2506053"/>
+              <a:gd name="connsiteX20" fmla="*/ 156146 w 5474028"/>
+              <a:gd name="connsiteY20" fmla="*/ 0 h 2506053"/>
+              <a:gd name="connsiteX0" fmla="*/ 154529 w 5472411"/>
+              <a:gd name="connsiteY0" fmla="*/ 0 h 2506053"/>
+              <a:gd name="connsiteX1" fmla="*/ 5318293 w 5472411"/>
+              <a:gd name="connsiteY1" fmla="*/ 0 h 2506053"/>
+              <a:gd name="connsiteX2" fmla="*/ 5472411 w 5472411"/>
+              <a:gd name="connsiteY2" fmla="*/ 154118 h 2506053"/>
+              <a:gd name="connsiteX3" fmla="*/ 5472411 w 5472411"/>
+              <a:gd name="connsiteY3" fmla="*/ 171368 h 2506053"/>
+              <a:gd name="connsiteX4" fmla="*/ 5318293 w 5472411"/>
+              <a:gd name="connsiteY4" fmla="*/ 325486 h 2506053"/>
+              <a:gd name="connsiteX5" fmla="*/ 840944 w 5472411"/>
+              <a:gd name="connsiteY5" fmla="*/ 325486 h 2506053"/>
+              <a:gd name="connsiteX6" fmla="*/ 840944 w 5472411"/>
+              <a:gd name="connsiteY6" fmla="*/ 328960 h 2506053"/>
+              <a:gd name="connsiteX7" fmla="*/ 836574 w 5472411"/>
+              <a:gd name="connsiteY7" fmla="*/ 328960 h 2506053"/>
+              <a:gd name="connsiteX8" fmla="*/ 646703 w 5472411"/>
+              <a:gd name="connsiteY8" fmla="*/ 518831 h 2506053"/>
+              <a:gd name="connsiteX9" fmla="*/ 646703 w 5472411"/>
+              <a:gd name="connsiteY9" fmla="*/ 1774635 h 2506053"/>
+              <a:gd name="connsiteX10" fmla="*/ 836574 w 5472411"/>
+              <a:gd name="connsiteY10" fmla="*/ 1964506 h 2506053"/>
+              <a:gd name="connsiteX11" fmla="*/ 840944 w 5472411"/>
+              <a:gd name="connsiteY11" fmla="*/ 1964506 h 2506053"/>
+              <a:gd name="connsiteX12" fmla="*/ 840944 w 5472411"/>
+              <a:gd name="connsiteY12" fmla="*/ 1967568 h 2506053"/>
+              <a:gd name="connsiteX13" fmla="*/ 5287770 w 5472411"/>
+              <a:gd name="connsiteY13" fmla="*/ 1967568 h 2506053"/>
+              <a:gd name="connsiteX14" fmla="*/ 5472411 w 5472411"/>
+              <a:gd name="connsiteY14" fmla="*/ 2152209 h 2506053"/>
+              <a:gd name="connsiteX15" fmla="*/ 5472411 w 5472411"/>
+              <a:gd name="connsiteY15" fmla="*/ 2321412 h 2506053"/>
+              <a:gd name="connsiteX16" fmla="*/ 5287770 w 5472411"/>
+              <a:gd name="connsiteY16" fmla="*/ 2506053 h 2506053"/>
+              <a:gd name="connsiteX17" fmla="*/ 185052 w 5472411"/>
+              <a:gd name="connsiteY17" fmla="*/ 2506053 h 2506053"/>
+              <a:gd name="connsiteX18" fmla="*/ 411 w 5472411"/>
+              <a:gd name="connsiteY18" fmla="*/ 2321412 h 2506053"/>
+              <a:gd name="connsiteX19" fmla="*/ 411 w 5472411"/>
+              <a:gd name="connsiteY19" fmla="*/ 154118 h 2506053"/>
+              <a:gd name="connsiteX20" fmla="*/ 154529 w 5472411"/>
+              <a:gd name="connsiteY20" fmla="*/ 0 h 2506053"/>
+            </a:gdLst>
+            <a:ahLst/>
+            <a:cxnLst>
+              <a:cxn ang="0">
+                <a:pos x="connsiteX0" y="connsiteY0"/>
+              </a:cxn>
+              <a:cxn ang="0">
+                <a:pos x="connsiteX1" y="connsiteY1"/>
+              </a:cxn>
+              <a:cxn ang="0">
+                <a:pos x="connsiteX2" y="connsiteY2"/>
+              </a:cxn>
+              <a:cxn ang="0">
+                <a:pos x="connsiteX3" y="connsiteY3"/>
+              </a:cxn>
+              <a:cxn ang="0">
+                <a:pos x="connsiteX4" y="connsiteY4"/>
+              </a:cxn>
+              <a:cxn ang="0">
+                <a:pos x="connsiteX5" y="connsiteY5"/>
+              </a:cxn>
+              <a:cxn ang="0">
+                <a:pos x="connsiteX6" y="connsiteY6"/>
+              </a:cxn>
+              <a:cxn ang="0">
+                <a:pos x="connsiteX7" y="connsiteY7"/>
+              </a:cxn>
+              <a:cxn ang="0">
+                <a:pos x="connsiteX8" y="connsiteY8"/>
+              </a:cxn>
+              <a:cxn ang="0">
+                <a:pos x="connsiteX9" y="connsiteY9"/>
+              </a:cxn>
+              <a:cxn ang="0">
+                <a:pos x="connsiteX10" y="connsiteY10"/>
+              </a:cxn>
+              <a:cxn ang="0">
+                <a:pos x="connsiteX11" y="connsiteY11"/>
+              </a:cxn>
+              <a:cxn ang="0">
+                <a:pos x="connsiteX12" y="connsiteY12"/>
+              </a:cxn>
+              <a:cxn ang="0">
+                <a:pos x="connsiteX13" y="connsiteY13"/>
+              </a:cxn>
+              <a:cxn ang="0">
+                <a:pos x="connsiteX14" y="connsiteY14"/>
+              </a:cxn>
+              <a:cxn ang="0">
+                <a:pos x="connsiteX15" y="connsiteY15"/>
+              </a:cxn>
+              <a:cxn ang="0">
+                <a:pos x="connsiteX16" y="connsiteY16"/>
+              </a:cxn>
+              <a:cxn ang="0">
+                <a:pos x="connsiteX17" y="connsiteY17"/>
+              </a:cxn>
+              <a:cxn ang="0">
+                <a:pos x="connsiteX18" y="connsiteY18"/>
+              </a:cxn>
+              <a:cxn ang="0">
+                <a:pos x="connsiteX19" y="connsiteY19"/>
+              </a:cxn>
+              <a:cxn ang="0">
+                <a:pos x="connsiteX20" y="connsiteY20"/>
+              </a:cxn>
+            </a:cxnLst>
+            <a:rect l="l" t="t" r="r" b="b"/>
+            <a:pathLst>
+              <a:path w="5472411" h="2506053">
+                <a:moveTo>
+                  <a:pt x="154529" y="0"/>
+                </a:moveTo>
+                <a:lnTo>
+                  <a:pt x="5318293" y="0"/>
+                </a:lnTo>
+                <a:cubicBezTo>
+                  <a:pt x="5403410" y="0"/>
+                  <a:pt x="5472411" y="69001"/>
+                  <a:pt x="5472411" y="154118"/>
+                </a:cubicBezTo>
+                <a:lnTo>
+                  <a:pt x="5472411" y="171368"/>
+                </a:lnTo>
+                <a:cubicBezTo>
+                  <a:pt x="5472411" y="256485"/>
+                  <a:pt x="5403410" y="325486"/>
+                  <a:pt x="5318293" y="325486"/>
+                </a:cubicBezTo>
+                <a:lnTo>
+                  <a:pt x="840944" y="325486"/>
+                </a:lnTo>
+                <a:lnTo>
+                  <a:pt x="840944" y="328960"/>
+                </a:lnTo>
+                <a:lnTo>
+                  <a:pt x="836574" y="328960"/>
+                </a:lnTo>
+                <a:cubicBezTo>
+                  <a:pt x="731711" y="328960"/>
+                  <a:pt x="646703" y="413968"/>
+                  <a:pt x="646703" y="518831"/>
+                </a:cubicBezTo>
+                <a:lnTo>
+                  <a:pt x="646703" y="1774635"/>
+                </a:lnTo>
+                <a:cubicBezTo>
+                  <a:pt x="646703" y="1879498"/>
+                  <a:pt x="731711" y="1964506"/>
+                  <a:pt x="836574" y="1964506"/>
+                </a:cubicBezTo>
+                <a:lnTo>
+                  <a:pt x="840944" y="1964506"/>
+                </a:lnTo>
+                <a:lnTo>
+                  <a:pt x="840944" y="1967568"/>
+                </a:lnTo>
+                <a:lnTo>
+                  <a:pt x="5287770" y="1967568"/>
+                </a:lnTo>
+                <a:cubicBezTo>
+                  <a:pt x="5389744" y="1967568"/>
+                  <a:pt x="5472411" y="2050235"/>
+                  <a:pt x="5472411" y="2152209"/>
+                </a:cubicBezTo>
+                <a:lnTo>
+                  <a:pt x="5472411" y="2321412"/>
+                </a:lnTo>
+                <a:cubicBezTo>
+                  <a:pt x="5472411" y="2423386"/>
+                  <a:pt x="5389744" y="2506053"/>
+                  <a:pt x="5287770" y="2506053"/>
+                </a:cubicBezTo>
+                <a:lnTo>
+                  <a:pt x="185052" y="2506053"/>
+                </a:lnTo>
+                <a:cubicBezTo>
+                  <a:pt x="83078" y="2506053"/>
+                  <a:pt x="411" y="2423386"/>
+                  <a:pt x="411" y="2321412"/>
+                </a:cubicBezTo>
+                <a:cubicBezTo>
+                  <a:pt x="3512" y="1928932"/>
+                  <a:pt x="-1392" y="558079"/>
+                  <a:pt x="411" y="154118"/>
+                </a:cubicBezTo>
+                <a:cubicBezTo>
+                  <a:pt x="411" y="69001"/>
+                  <a:pt x="69412" y="0"/>
+                  <a:pt x="154529" y="0"/>
+                </a:cubicBezTo>
+                <a:close/>
+              </a:path>
+            </a:pathLst>
+          </a:custGeom>
+          <a:solidFill>
+            <a:srgbClr val="CCFFCC"/>
+          </a:solidFill>
+          <a:ln w="12700" cap="flat" cmpd="sng" algn="ctr">
+            <a:solidFill>
+              <a:srgbClr val="70AD47"/>
+            </a:solidFill>
+            <a:prstDash val="solid"/>
+            <a:miter lim="800000"/>
+          </a:ln>
+          <a:effectLst/>
+        </p:spPr>
+        <p:txBody>
+          <a:bodyPr lIns="0" tIns="0" rIns="0" bIns="0" rtlCol="0" anchor="ctr"/>
+          <a:lstStyle/>
+          <a:p>
+            <a:pPr algn="ctr"/>
+            <a:endParaRPr lang="en-GB" sz="1600" kern="0" dirty="0">
+              <a:solidFill>
+                <a:prstClr val="black"/>
+              </a:solidFill>
+              <a:latin typeface="Calibri" panose="020F0502020204030204" pitchFamily="34" charset="0"/>
+              <a:cs typeface="Calibri" panose="020F0502020204030204" pitchFamily="34" charset="0"/>
+            </a:endParaRPr>
+          </a:p>
+        </p:txBody>
+      </p:sp>
+      <p:sp>
+        <p:nvSpPr>
+          <p:cNvPr id="123" name="Rectangle 122"/>
+          <p:cNvSpPr/>
+          <p:nvPr/>
+        </p:nvSpPr>
+        <p:spPr>
+          <a:xfrm>
+            <a:off x="2337762" y="3910126"/>
+            <a:ext cx="942887" cy="338554"/>
+          </a:xfrm>
+          <a:prstGeom prst="rect">
+            <a:avLst/>
+          </a:prstGeom>
+          <a:ln w="12700">
+            <a:noFill/>
+          </a:ln>
+        </p:spPr>
+        <p:txBody>
+          <a:bodyPr wrap="none">
+            <a:spAutoFit/>
+          </a:bodyPr>
+          <a:lstStyle/>
+          <a:p>
+            <a:r>
+              <a:rPr lang="en-GB" sz="1600" kern="0" dirty="0" err="1">
+                <a:solidFill>
+                  <a:prstClr val="black"/>
+                </a:solidFill>
+                <a:latin typeface="Calibri" panose="020F0502020204030204" pitchFamily="34" charset="0"/>
+                <a:cs typeface="Calibri" panose="020F0502020204030204" pitchFamily="34" charset="0"/>
+              </a:rPr>
+              <a:t>Polycube</a:t>
+            </a:r>
+            <a:endParaRPr lang="en-US" sz="1600" dirty="0">
+              <a:latin typeface="Calibri" panose="020F0502020204030204" pitchFamily="34" charset="0"/>
+              <a:cs typeface="Calibri" panose="020F0502020204030204" pitchFamily="34" charset="0"/>
+            </a:endParaRPr>
+          </a:p>
+        </p:txBody>
+      </p:sp>
+      <p:grpSp>
+        <p:nvGrpSpPr>
+          <p:cNvPr id="21" name="Group 20"/>
+          <p:cNvGrpSpPr>
+            <a:grpSpLocks noChangeAspect="1"/>
+          </p:cNvGrpSpPr>
+          <p:nvPr/>
+        </p:nvGrpSpPr>
+        <p:grpSpPr>
+          <a:xfrm>
+            <a:off x="7254638" y="2068138"/>
+            <a:ext cx="3283200" cy="2615226"/>
+            <a:chOff x="6446975" y="732506"/>
+            <a:chExt cx="5472412" cy="4359039"/>
+          </a:xfrm>
+        </p:grpSpPr>
+        <p:sp>
+          <p:nvSpPr>
+            <p:cNvPr id="111" name="Rettangolo arrotondato 29">
+              <a:extLst>
+                <a:ext uri="{FF2B5EF4-FFF2-40B4-BE49-F238E27FC236}">
+                  <a16:creationId xmlns:a16="http://schemas.microsoft.com/office/drawing/2014/main" id="{2007C69B-7EA2-1445-BF19-1AF93AF7BCA4}"/>
+                </a:ext>
+              </a:extLst>
+            </p:cNvPr>
+            <p:cNvSpPr/>
+            <p:nvPr/>
+          </p:nvSpPr>
+          <p:spPr>
+            <a:xfrm>
+              <a:off x="7283460" y="2432708"/>
+              <a:ext cx="4421678" cy="1176136"/>
+            </a:xfrm>
+            <a:prstGeom prst="roundRect">
+              <a:avLst/>
+            </a:prstGeom>
+            <a:solidFill>
+              <a:srgbClr val="CCFFFF"/>
+            </a:solidFill>
+            <a:ln w="12700" cap="flat" cmpd="sng" algn="ctr">
+              <a:solidFill>
+                <a:schemeClr val="accent5">
+                  <a:lumMod val="60000"/>
+                  <a:lumOff val="40000"/>
+                </a:schemeClr>
+              </a:solidFill>
+              <a:prstDash val="solid"/>
+              <a:miter lim="800000"/>
+            </a:ln>
+            <a:effectLst/>
+          </p:spPr>
+          <p:txBody>
+            <a:bodyPr lIns="0" tIns="0" rIns="0" bIns="0" rtlCol="0" anchor="ctr"/>
+            <a:lstStyle/>
+            <a:p>
+              <a:pPr marL="0" marR="0" lvl="0" indent="0" algn="ctr" defTabSz="914400" eaLnBrk="1" fontAlgn="auto" latinLnBrk="0" hangingPunct="1">
+                <a:lnSpc>
+                  <a:spcPct val="100000"/>
+                </a:lnSpc>
+                <a:spcBef>
+                  <a:spcPts val="0"/>
+                </a:spcBef>
+                <a:spcAft>
+                  <a:spcPts val="0"/>
+                </a:spcAft>
+                <a:buClrTx/>
+                <a:buSzTx/>
+                <a:buFontTx/>
+                <a:buNone/>
+                <a:tabLst/>
+                <a:defRPr/>
+              </a:pPr>
+              <a:endParaRPr kumimoji="0" lang="en-GB" sz="1050" i="0" u="none" strike="noStrike" kern="0" cap="none" spc="0" normalizeH="0" baseline="0" noProof="0" dirty="0">
+                <a:ln>
+                  <a:noFill/>
+                </a:ln>
+                <a:solidFill>
+                  <a:prstClr val="black"/>
+                </a:solidFill>
+                <a:effectLst/>
+                <a:uLnTx/>
+                <a:uFillTx/>
+                <a:latin typeface="Calibri" panose="020F0502020204030204" pitchFamily="34" charset="0"/>
+                <a:cs typeface="Calibri" panose="020F0502020204030204" pitchFamily="34" charset="0"/>
+              </a:endParaRPr>
+            </a:p>
+            <a:p>
+              <a:pPr marL="0" marR="0" lvl="0" indent="0" algn="ctr" defTabSz="914400" eaLnBrk="1" fontAlgn="auto" latinLnBrk="0" hangingPunct="1">
+                <a:lnSpc>
+                  <a:spcPct val="100000"/>
+                </a:lnSpc>
+                <a:spcBef>
+                  <a:spcPts val="0"/>
+                </a:spcBef>
+                <a:spcAft>
+                  <a:spcPts val="0"/>
+                </a:spcAft>
+                <a:buClrTx/>
+                <a:buSzTx/>
+                <a:buFontTx/>
+                <a:buNone/>
+                <a:tabLst/>
+                <a:defRPr/>
+              </a:pPr>
+              <a:endParaRPr kumimoji="0" lang="en-GB" sz="1050" i="0" u="none" strike="noStrike" kern="0" cap="none" spc="0" normalizeH="0" baseline="0" noProof="0" dirty="0">
+                <a:ln>
+                  <a:noFill/>
+                </a:ln>
+                <a:solidFill>
+                  <a:prstClr val="black"/>
+                </a:solidFill>
+                <a:effectLst/>
+                <a:uLnTx/>
+                <a:uFillTx/>
+                <a:latin typeface="Calibri" panose="020F0502020204030204" pitchFamily="34" charset="0"/>
+                <a:cs typeface="Calibri" panose="020F0502020204030204" pitchFamily="34" charset="0"/>
+              </a:endParaRPr>
+            </a:p>
+            <a:p>
+              <a:pPr marL="0" marR="0" lvl="0" indent="0" algn="ctr" defTabSz="914400" eaLnBrk="1" fontAlgn="auto" latinLnBrk="0" hangingPunct="1">
+                <a:lnSpc>
+                  <a:spcPct val="100000"/>
+                </a:lnSpc>
+                <a:spcBef>
+                  <a:spcPts val="0"/>
+                </a:spcBef>
+                <a:spcAft>
+                  <a:spcPts val="0"/>
+                </a:spcAft>
+                <a:buClrTx/>
+                <a:buSzTx/>
+                <a:buFontTx/>
+                <a:buNone/>
+                <a:tabLst/>
+                <a:defRPr/>
+              </a:pPr>
+              <a:endParaRPr kumimoji="0" lang="en-GB" sz="1050" i="0" u="none" strike="noStrike" kern="0" cap="none" spc="0" normalizeH="0" baseline="0" noProof="0" dirty="0">
+                <a:ln>
+                  <a:noFill/>
+                </a:ln>
+                <a:solidFill>
+                  <a:prstClr val="black"/>
+                </a:solidFill>
+                <a:effectLst/>
+                <a:uLnTx/>
+                <a:uFillTx/>
+                <a:latin typeface="Calibri" panose="020F0502020204030204" pitchFamily="34" charset="0"/>
+                <a:cs typeface="Calibri" panose="020F0502020204030204" pitchFamily="34" charset="0"/>
+              </a:endParaRPr>
+            </a:p>
+          </p:txBody>
+        </p:sp>
+        <p:sp>
+          <p:nvSpPr>
+            <p:cNvPr id="112" name="Rettangolo arrotondato 41">
+              <a:extLst>
+                <a:ext uri="{FF2B5EF4-FFF2-40B4-BE49-F238E27FC236}">
+                  <a16:creationId xmlns:a16="http://schemas.microsoft.com/office/drawing/2014/main" id="{B9B53821-8AB7-C04C-83C4-8240C4ED65D2}"/>
+                </a:ext>
+              </a:extLst>
+            </p:cNvPr>
+            <p:cNvSpPr/>
+            <p:nvPr/>
+          </p:nvSpPr>
+          <p:spPr>
+            <a:xfrm>
+              <a:off x="9185188" y="732506"/>
+              <a:ext cx="2395546" cy="963558"/>
+            </a:xfrm>
+            <a:prstGeom prst="roundRect">
+              <a:avLst/>
+            </a:prstGeom>
+            <a:solidFill>
+              <a:srgbClr val="FFDB93"/>
+            </a:solidFill>
+            <a:ln w="12700" cap="flat" cmpd="sng" algn="ctr">
+              <a:solidFill>
+                <a:schemeClr val="accent4">
+                  <a:lumMod val="75000"/>
+                </a:schemeClr>
+              </a:solidFill>
+              <a:prstDash val="solid"/>
+              <a:miter lim="800000"/>
+            </a:ln>
+            <a:effectLst/>
+          </p:spPr>
+          <p:txBody>
+            <a:bodyPr lIns="0" tIns="0" rIns="0" bIns="0" rtlCol="0" anchor="ctr"/>
+            <a:lstStyle/>
+            <a:p>
+              <a:pPr algn="ctr"/>
+              <a:endParaRPr lang="en-GB" sz="1050" kern="0" dirty="0">
+                <a:solidFill>
+                  <a:prstClr val="black"/>
+                </a:solidFill>
+                <a:latin typeface="Calibri" panose="020F0502020204030204" pitchFamily="34" charset="0"/>
+                <a:cs typeface="Calibri" panose="020F0502020204030204" pitchFamily="34" charset="0"/>
+              </a:endParaRPr>
+            </a:p>
+          </p:txBody>
+        </p:sp>
+        <p:sp>
+          <p:nvSpPr>
+            <p:cNvPr id="113" name="Rettangolo arrotondato 13">
+              <a:extLst>
+                <a:ext uri="{FF2B5EF4-FFF2-40B4-BE49-F238E27FC236}">
+                  <a16:creationId xmlns:a16="http://schemas.microsoft.com/office/drawing/2014/main" id="{32CE114C-0B20-304A-88FA-FB974438FFBD}"/>
+                </a:ext>
+              </a:extLst>
+            </p:cNvPr>
+            <p:cNvSpPr/>
+            <p:nvPr/>
+          </p:nvSpPr>
+          <p:spPr>
+            <a:xfrm>
+              <a:off x="8473179" y="3075220"/>
+              <a:ext cx="739857" cy="360000"/>
+            </a:xfrm>
+            <a:prstGeom prst="roundRect">
+              <a:avLst/>
+            </a:prstGeom>
+            <a:solidFill>
+              <a:srgbClr val="CCFFFF"/>
+            </a:solidFill>
+            <a:ln w="12700" cap="flat" cmpd="sng" algn="ctr">
+              <a:solidFill>
+                <a:schemeClr val="accent5">
+                  <a:lumMod val="60000"/>
+                  <a:lumOff val="40000"/>
+                </a:schemeClr>
+              </a:solidFill>
+              <a:prstDash val="solid"/>
+              <a:round/>
+              <a:headEnd type="none" w="med" len="med"/>
+              <a:tailEnd type="none" w="med" len="med"/>
+            </a:ln>
+            <a:effectLst/>
+          </p:spPr>
+          <p:txBody>
+            <a:bodyPr lIns="0" tIns="0" rIns="0" bIns="0" rtlCol="0" anchor="ctr"/>
+            <a:lstStyle/>
+            <a:p>
+              <a:pPr marL="0" marR="0" lvl="0" indent="0" algn="ctr" defTabSz="914400" eaLnBrk="1" fontAlgn="auto" latinLnBrk="0" hangingPunct="1">
+                <a:lnSpc>
+                  <a:spcPct val="100000"/>
+                </a:lnSpc>
+                <a:spcBef>
+                  <a:spcPts val="0"/>
+                </a:spcBef>
+                <a:spcAft>
+                  <a:spcPts val="0"/>
+                </a:spcAft>
+                <a:buClrTx/>
+                <a:buSzTx/>
+                <a:buFontTx/>
+                <a:buNone/>
+                <a:tabLst/>
+                <a:defRPr/>
+              </a:pPr>
+              <a:r>
+                <a:rPr kumimoji="0" lang="en-GB" sz="1000" i="0" u="none" strike="noStrike" kern="0" cap="none" spc="0" normalizeH="0" baseline="0" noProof="0" dirty="0">
+                  <a:ln>
+                    <a:noFill/>
+                  </a:ln>
+                  <a:solidFill>
+                    <a:prstClr val="black"/>
+                  </a:solidFill>
+                  <a:effectLst/>
+                  <a:uLnTx/>
+                  <a:uFillTx/>
+                  <a:latin typeface="Calibri" panose="020F0502020204030204" pitchFamily="34" charset="0"/>
+                  <a:cs typeface="Calibri" panose="020F0502020204030204" pitchFamily="34" charset="0"/>
+                </a:rPr>
+                <a:t>Bridge</a:t>
+              </a:r>
+            </a:p>
+          </p:txBody>
+        </p:sp>
+        <p:sp>
+          <p:nvSpPr>
+            <p:cNvPr id="114" name="Rettangolo arrotondato 15">
+              <a:extLst>
+                <a:ext uri="{FF2B5EF4-FFF2-40B4-BE49-F238E27FC236}">
+                  <a16:creationId xmlns:a16="http://schemas.microsoft.com/office/drawing/2014/main" id="{E755A4E8-0EDC-2E4F-8522-1841DED670D7}"/>
+                </a:ext>
+              </a:extLst>
+            </p:cNvPr>
+            <p:cNvSpPr/>
+            <p:nvPr/>
+          </p:nvSpPr>
+          <p:spPr>
+            <a:xfrm>
+              <a:off x="7596326" y="2571915"/>
+              <a:ext cx="896309" cy="360000"/>
+            </a:xfrm>
+            <a:prstGeom prst="roundRect">
+              <a:avLst/>
+            </a:prstGeom>
+            <a:solidFill>
+              <a:srgbClr val="CCFFFF"/>
+            </a:solidFill>
+            <a:ln w="12700" cap="flat" cmpd="sng" algn="ctr">
+              <a:solidFill>
+                <a:schemeClr val="accent5">
+                  <a:lumMod val="60000"/>
+                  <a:lumOff val="40000"/>
+                </a:schemeClr>
+              </a:solidFill>
+              <a:prstDash val="solid"/>
+              <a:round/>
+              <a:headEnd type="none" w="med" len="med"/>
+              <a:tailEnd type="none" w="med" len="med"/>
+            </a:ln>
+            <a:effectLst/>
+          </p:spPr>
+          <p:txBody>
+            <a:bodyPr lIns="0" tIns="0" rIns="0" bIns="0" rtlCol="0" anchor="ctr"/>
+            <a:lstStyle/>
+            <a:p>
+              <a:pPr marL="0" marR="0" lvl="0" indent="0" algn="ctr" defTabSz="914400" eaLnBrk="1" fontAlgn="auto" latinLnBrk="0" hangingPunct="1">
+                <a:lnSpc>
+                  <a:spcPct val="100000"/>
+                </a:lnSpc>
+                <a:spcBef>
+                  <a:spcPts val="0"/>
+                </a:spcBef>
+                <a:spcAft>
+                  <a:spcPts val="0"/>
+                </a:spcAft>
+                <a:buClrTx/>
+                <a:buSzTx/>
+                <a:buFontTx/>
+                <a:buNone/>
+                <a:tabLst/>
+                <a:defRPr/>
+              </a:pPr>
+              <a:r>
+                <a:rPr kumimoji="0" lang="en-GB" sz="1000" i="0" u="none" strike="noStrike" kern="0" cap="none" spc="0" normalizeH="0" baseline="0" noProof="0" dirty="0">
+                  <a:ln>
+                    <a:noFill/>
+                  </a:ln>
+                  <a:solidFill>
+                    <a:prstClr val="black"/>
+                  </a:solidFill>
+                  <a:effectLst/>
+                  <a:uLnTx/>
+                  <a:uFillTx/>
+                  <a:latin typeface="Calibri" panose="020F0502020204030204" pitchFamily="34" charset="0"/>
+                  <a:cs typeface="Calibri" panose="020F0502020204030204" pitchFamily="34" charset="0"/>
+                </a:rPr>
+                <a:t>Router</a:t>
+              </a:r>
+            </a:p>
+          </p:txBody>
+        </p:sp>
+        <p:sp>
+          <p:nvSpPr>
+            <p:cNvPr id="115" name="Rettangolo arrotondato 16">
+              <a:extLst>
+                <a:ext uri="{FF2B5EF4-FFF2-40B4-BE49-F238E27FC236}">
+                  <a16:creationId xmlns:a16="http://schemas.microsoft.com/office/drawing/2014/main" id="{33758A28-DF5E-BC4F-B6CB-1D70B38F22AA}"/>
+                </a:ext>
+              </a:extLst>
+            </p:cNvPr>
+            <p:cNvSpPr/>
+            <p:nvPr/>
+          </p:nvSpPr>
+          <p:spPr>
+            <a:xfrm>
+              <a:off x="10305137" y="2571915"/>
+              <a:ext cx="612782" cy="360000"/>
+            </a:xfrm>
+            <a:prstGeom prst="roundRect">
+              <a:avLst/>
+            </a:prstGeom>
+            <a:solidFill>
+              <a:srgbClr val="CCFFFF"/>
+            </a:solidFill>
+            <a:ln w="12700" cap="flat" cmpd="sng" algn="ctr">
+              <a:solidFill>
+                <a:schemeClr val="accent5">
+                  <a:lumMod val="60000"/>
+                  <a:lumOff val="40000"/>
+                </a:schemeClr>
+              </a:solidFill>
+              <a:prstDash val="solid"/>
+              <a:round/>
+              <a:headEnd type="none" w="med" len="med"/>
+              <a:tailEnd type="none" w="med" len="med"/>
+            </a:ln>
+            <a:effectLst/>
+          </p:spPr>
+          <p:txBody>
+            <a:bodyPr lIns="0" tIns="0" rIns="0" bIns="0" rtlCol="0" anchor="ctr"/>
+            <a:lstStyle/>
+            <a:p>
+              <a:pPr marL="0" marR="0" lvl="0" indent="0" algn="ctr" defTabSz="914400" eaLnBrk="1" fontAlgn="auto" latinLnBrk="0" hangingPunct="1">
+                <a:lnSpc>
+                  <a:spcPct val="100000"/>
+                </a:lnSpc>
+                <a:spcBef>
+                  <a:spcPts val="0"/>
+                </a:spcBef>
+                <a:spcAft>
+                  <a:spcPts val="0"/>
+                </a:spcAft>
+                <a:buClrTx/>
+                <a:buSzTx/>
+                <a:buFontTx/>
+                <a:buNone/>
+                <a:tabLst/>
+                <a:defRPr/>
+              </a:pPr>
+              <a:r>
+                <a:rPr kumimoji="0" lang="en-GB" sz="1000" i="0" u="none" strike="noStrike" kern="0" cap="none" spc="0" normalizeH="0" baseline="0" noProof="0" dirty="0" smtClean="0">
+                  <a:ln>
+                    <a:noFill/>
+                  </a:ln>
+                  <a:solidFill>
+                    <a:prstClr val="black"/>
+                  </a:solidFill>
+                  <a:effectLst/>
+                  <a:uLnTx/>
+                  <a:uFillTx/>
+                  <a:latin typeface="Calibri" panose="020F0502020204030204" pitchFamily="34" charset="0"/>
+                  <a:cs typeface="Calibri" panose="020F0502020204030204" pitchFamily="34" charset="0"/>
+                </a:rPr>
+                <a:t>NAT</a:t>
+              </a:r>
+              <a:endParaRPr kumimoji="0" lang="en-GB" sz="1000" i="0" u="none" strike="noStrike" kern="0" cap="none" spc="0" normalizeH="0" baseline="0" noProof="0" dirty="0">
+                <a:ln>
+                  <a:noFill/>
+                </a:ln>
+                <a:solidFill>
+                  <a:prstClr val="black"/>
+                </a:solidFill>
+                <a:effectLst/>
+                <a:uLnTx/>
+                <a:uFillTx/>
+                <a:latin typeface="Calibri" panose="020F0502020204030204" pitchFamily="34" charset="0"/>
+                <a:cs typeface="Calibri" panose="020F0502020204030204" pitchFamily="34" charset="0"/>
+              </a:endParaRPr>
+            </a:p>
+          </p:txBody>
+        </p:sp>
+        <p:sp>
+          <p:nvSpPr>
+            <p:cNvPr id="116" name="Rettangolo arrotondato 17">
+              <a:extLst>
+                <a:ext uri="{FF2B5EF4-FFF2-40B4-BE49-F238E27FC236}">
+                  <a16:creationId xmlns:a16="http://schemas.microsoft.com/office/drawing/2014/main" id="{5B58146D-E9D0-E043-88BB-5FAD27DF2B4A}"/>
+                </a:ext>
+              </a:extLst>
+            </p:cNvPr>
+            <p:cNvSpPr/>
+            <p:nvPr/>
+          </p:nvSpPr>
+          <p:spPr>
+            <a:xfrm>
+              <a:off x="9406041" y="3075220"/>
+              <a:ext cx="1476000" cy="360000"/>
+            </a:xfrm>
+            <a:prstGeom prst="roundRect">
+              <a:avLst/>
+            </a:prstGeom>
+            <a:solidFill>
+              <a:srgbClr val="CCFFFF"/>
+            </a:solidFill>
+            <a:ln w="12700" cap="flat" cmpd="sng" algn="ctr">
+              <a:solidFill>
+                <a:schemeClr val="accent5">
+                  <a:lumMod val="60000"/>
+                  <a:lumOff val="40000"/>
+                </a:schemeClr>
+              </a:solidFill>
+              <a:prstDash val="solid"/>
+              <a:round/>
+              <a:headEnd type="none" w="med" len="med"/>
+              <a:tailEnd type="none" w="med" len="med"/>
+            </a:ln>
+            <a:effectLst/>
+          </p:spPr>
+          <p:txBody>
+            <a:bodyPr lIns="0" tIns="0" rIns="0" bIns="0" rtlCol="0" anchor="ctr"/>
+            <a:lstStyle/>
+            <a:p>
+              <a:pPr marL="0" marR="0" lvl="0" indent="0" algn="ctr" defTabSz="914400" eaLnBrk="1" fontAlgn="auto" latinLnBrk="0" hangingPunct="1">
+                <a:lnSpc>
+                  <a:spcPct val="100000"/>
+                </a:lnSpc>
+                <a:spcBef>
+                  <a:spcPts val="0"/>
+                </a:spcBef>
+                <a:spcAft>
+                  <a:spcPts val="0"/>
+                </a:spcAft>
+                <a:buClrTx/>
+                <a:buSzTx/>
+                <a:buFontTx/>
+                <a:buNone/>
+                <a:tabLst/>
+                <a:defRPr/>
+              </a:pPr>
+              <a:r>
+                <a:rPr kumimoji="0" lang="en-GB" sz="1000" i="0" u="none" strike="noStrike" kern="0" cap="none" spc="0" normalizeH="0" baseline="0" noProof="0" dirty="0">
+                  <a:ln>
+                    <a:noFill/>
+                  </a:ln>
+                  <a:solidFill>
+                    <a:prstClr val="black"/>
+                  </a:solidFill>
+                  <a:effectLst/>
+                  <a:uLnTx/>
+                  <a:uFillTx/>
+                  <a:latin typeface="Calibri" panose="020F0502020204030204" pitchFamily="34" charset="0"/>
+                  <a:cs typeface="Calibri" panose="020F0502020204030204" pitchFamily="34" charset="0"/>
+                </a:rPr>
+                <a:t>DDoS </a:t>
+              </a:r>
+              <a:r>
+                <a:rPr kumimoji="0" lang="en-GB" sz="1000" i="0" u="none" strike="noStrike" kern="0" cap="none" spc="0" normalizeH="0" baseline="0" noProof="0" dirty="0" err="1">
+                  <a:ln>
+                    <a:noFill/>
+                  </a:ln>
+                  <a:solidFill>
+                    <a:prstClr val="black"/>
+                  </a:solidFill>
+                  <a:effectLst/>
+                  <a:uLnTx/>
+                  <a:uFillTx/>
+                  <a:latin typeface="Calibri" panose="020F0502020204030204" pitchFamily="34" charset="0"/>
+                  <a:cs typeface="Calibri" panose="020F0502020204030204" pitchFamily="34" charset="0"/>
+                </a:rPr>
+                <a:t>Mitigator</a:t>
+              </a:r>
+              <a:endParaRPr kumimoji="0" lang="en-GB" sz="1000" i="0" u="none" strike="noStrike" kern="0" cap="none" spc="0" normalizeH="0" baseline="0" noProof="0" dirty="0">
+                <a:ln>
+                  <a:noFill/>
+                </a:ln>
+                <a:solidFill>
+                  <a:prstClr val="black"/>
+                </a:solidFill>
+                <a:effectLst/>
+                <a:uLnTx/>
+                <a:uFillTx/>
+                <a:latin typeface="Calibri" panose="020F0502020204030204" pitchFamily="34" charset="0"/>
+                <a:cs typeface="Calibri" panose="020F0502020204030204" pitchFamily="34" charset="0"/>
+              </a:endParaRPr>
+            </a:p>
+          </p:txBody>
+        </p:sp>
+        <p:sp>
+          <p:nvSpPr>
+            <p:cNvPr id="117" name="Rettangolo arrotondato 18">
+              <a:extLst>
+                <a:ext uri="{FF2B5EF4-FFF2-40B4-BE49-F238E27FC236}">
+                  <a16:creationId xmlns:a16="http://schemas.microsoft.com/office/drawing/2014/main" id="{4931C160-BB41-E643-88D2-CCCE4511A3AC}"/>
+                </a:ext>
+              </a:extLst>
+            </p:cNvPr>
+            <p:cNvSpPr/>
+            <p:nvPr/>
+          </p:nvSpPr>
+          <p:spPr>
+            <a:xfrm>
+              <a:off x="8721549" y="2571915"/>
+              <a:ext cx="1379809" cy="360000"/>
+            </a:xfrm>
+            <a:prstGeom prst="roundRect">
+              <a:avLst/>
+            </a:prstGeom>
+            <a:solidFill>
+              <a:srgbClr val="CCFFFF"/>
+            </a:solidFill>
+            <a:ln w="12700" cap="flat" cmpd="sng" algn="ctr">
+              <a:solidFill>
+                <a:schemeClr val="accent5">
+                  <a:lumMod val="60000"/>
+                  <a:lumOff val="40000"/>
+                </a:schemeClr>
+              </a:solidFill>
+              <a:prstDash val="solid"/>
+              <a:round/>
+              <a:headEnd type="none" w="med" len="med"/>
+              <a:tailEnd type="none" w="med" len="med"/>
+            </a:ln>
+            <a:effectLst/>
+          </p:spPr>
+          <p:txBody>
+            <a:bodyPr lIns="0" tIns="0" rIns="0" bIns="0" rtlCol="0" anchor="ctr"/>
+            <a:lstStyle/>
+            <a:p>
+              <a:pPr marL="0" marR="0" lvl="0" indent="0" algn="ctr" defTabSz="914400" eaLnBrk="1" fontAlgn="auto" latinLnBrk="0" hangingPunct="1">
+                <a:lnSpc>
+                  <a:spcPct val="100000"/>
+                </a:lnSpc>
+                <a:spcBef>
+                  <a:spcPts val="0"/>
+                </a:spcBef>
+                <a:spcAft>
+                  <a:spcPts val="0"/>
+                </a:spcAft>
+                <a:buClrTx/>
+                <a:buSzTx/>
+                <a:buFontTx/>
+                <a:buNone/>
+                <a:tabLst/>
+                <a:defRPr/>
+              </a:pPr>
+              <a:r>
+                <a:rPr kumimoji="0" lang="en-GB" sz="1000" i="0" u="none" strike="noStrike" kern="0" cap="none" spc="0" normalizeH="0" baseline="0" noProof="0" dirty="0">
+                  <a:ln>
+                    <a:noFill/>
+                  </a:ln>
+                  <a:solidFill>
+                    <a:prstClr val="black"/>
+                  </a:solidFill>
+                  <a:effectLst/>
+                  <a:uLnTx/>
+                  <a:uFillTx/>
+                  <a:latin typeface="Calibri" panose="020F0502020204030204" pitchFamily="34" charset="0"/>
+                  <a:cs typeface="Calibri" panose="020F0502020204030204" pitchFamily="34" charset="0"/>
+                </a:rPr>
+                <a:t>Load Balancer</a:t>
+              </a:r>
+            </a:p>
+          </p:txBody>
+        </p:sp>
+        <p:sp>
+          <p:nvSpPr>
+            <p:cNvPr id="118" name="Rettangolo arrotondato 27">
+              <a:extLst>
+                <a:ext uri="{FF2B5EF4-FFF2-40B4-BE49-F238E27FC236}">
+                  <a16:creationId xmlns:a16="http://schemas.microsoft.com/office/drawing/2014/main" id="{6C240745-9D1E-CB42-AC90-1BF748A0FFB4}"/>
+                </a:ext>
+              </a:extLst>
+            </p:cNvPr>
+            <p:cNvSpPr/>
+            <p:nvPr/>
+          </p:nvSpPr>
+          <p:spPr>
+            <a:xfrm>
+              <a:off x="10297645" y="1173253"/>
+              <a:ext cx="1168791" cy="360000"/>
+            </a:xfrm>
+            <a:prstGeom prst="roundRect">
+              <a:avLst/>
+            </a:prstGeom>
+            <a:noFill/>
+            <a:ln w="12700" cap="flat" cmpd="sng" algn="ctr">
+              <a:solidFill>
+                <a:schemeClr val="accent4">
+                  <a:lumMod val="75000"/>
+                </a:schemeClr>
+              </a:solidFill>
+              <a:prstDash val="solid"/>
+              <a:round/>
+              <a:headEnd type="none" w="med" len="med"/>
+              <a:tailEnd type="none" w="med" len="med"/>
+            </a:ln>
+            <a:effectLst/>
+          </p:spPr>
+          <p:txBody>
+            <a:bodyPr lIns="0" tIns="0" rIns="0" bIns="0" rtlCol="0" anchor="ctr"/>
+            <a:lstStyle/>
+            <a:p>
+              <a:pPr marL="0" marR="0" lvl="0" indent="0" algn="ctr" defTabSz="914400" eaLnBrk="1" fontAlgn="auto" latinLnBrk="0" hangingPunct="1">
+                <a:lnSpc>
+                  <a:spcPct val="100000"/>
+                </a:lnSpc>
+                <a:spcBef>
+                  <a:spcPts val="0"/>
+                </a:spcBef>
+                <a:spcAft>
+                  <a:spcPts val="0"/>
+                </a:spcAft>
+                <a:buClrTx/>
+                <a:buSzTx/>
+                <a:buFontTx/>
+                <a:buNone/>
+                <a:tabLst/>
+                <a:defRPr/>
+              </a:pPr>
+              <a:r>
+                <a:rPr kumimoji="0" lang="en-GB" sz="1000" i="0" u="none" strike="noStrike" kern="0" cap="none" spc="0" normalizeH="0" baseline="0" noProof="0" dirty="0" err="1">
+                  <a:ln>
+                    <a:noFill/>
+                  </a:ln>
+                  <a:solidFill>
+                    <a:prstClr val="black"/>
+                  </a:solidFill>
+                  <a:effectLst/>
+                  <a:uLnTx/>
+                  <a:uFillTx/>
+                  <a:latin typeface="Calibri" panose="020F0502020204030204" pitchFamily="34" charset="0"/>
+                  <a:cs typeface="Calibri" panose="020F0502020204030204" pitchFamily="34" charset="0"/>
+                </a:rPr>
+                <a:t>pcn-iptables</a:t>
+              </a:r>
+              <a:endParaRPr kumimoji="0" lang="en-GB" sz="1000" i="0" u="none" strike="noStrike" kern="0" cap="none" spc="0" normalizeH="0" baseline="0" noProof="0" dirty="0">
+                <a:ln>
+                  <a:noFill/>
+                </a:ln>
+                <a:solidFill>
+                  <a:prstClr val="black"/>
+                </a:solidFill>
+                <a:effectLst/>
+                <a:uLnTx/>
+                <a:uFillTx/>
+                <a:latin typeface="Calibri" panose="020F0502020204030204" pitchFamily="34" charset="0"/>
+                <a:cs typeface="Calibri" panose="020F0502020204030204" pitchFamily="34" charset="0"/>
+              </a:endParaRPr>
+            </a:p>
+          </p:txBody>
+        </p:sp>
+        <p:sp>
+          <p:nvSpPr>
+            <p:cNvPr id="119" name="Rettangolo arrotondato 30">
+              <a:extLst>
+                <a:ext uri="{FF2B5EF4-FFF2-40B4-BE49-F238E27FC236}">
+                  <a16:creationId xmlns:a16="http://schemas.microsoft.com/office/drawing/2014/main" id="{92ABD1DF-4F25-2C48-B784-2BD34AE65A90}"/>
+                </a:ext>
+              </a:extLst>
+            </p:cNvPr>
+            <p:cNvSpPr/>
+            <p:nvPr/>
+          </p:nvSpPr>
+          <p:spPr>
+            <a:xfrm>
+              <a:off x="9391355" y="1173253"/>
+              <a:ext cx="752609" cy="360000"/>
+            </a:xfrm>
+            <a:prstGeom prst="roundRect">
+              <a:avLst/>
+            </a:prstGeom>
+            <a:noFill/>
+            <a:ln w="12700" cap="flat" cmpd="sng" algn="ctr">
+              <a:solidFill>
+                <a:schemeClr val="accent4">
+                  <a:lumMod val="75000"/>
+                </a:schemeClr>
+              </a:solidFill>
+              <a:prstDash val="solid"/>
+              <a:round/>
+              <a:headEnd type="none" w="med" len="med"/>
+              <a:tailEnd type="none" w="med" len="med"/>
+            </a:ln>
+            <a:effectLst/>
+          </p:spPr>
+          <p:txBody>
+            <a:bodyPr lIns="0" tIns="0" rIns="0" bIns="0" rtlCol="0" anchor="ctr"/>
+            <a:lstStyle/>
+            <a:p>
+              <a:pPr marL="0" marR="0" lvl="0" indent="0" algn="ctr" defTabSz="914400" eaLnBrk="1" fontAlgn="auto" latinLnBrk="0" hangingPunct="1">
+                <a:lnSpc>
+                  <a:spcPct val="100000"/>
+                </a:lnSpc>
+                <a:spcBef>
+                  <a:spcPts val="0"/>
+                </a:spcBef>
+                <a:spcAft>
+                  <a:spcPts val="0"/>
+                </a:spcAft>
+                <a:buClrTx/>
+                <a:buSzTx/>
+                <a:buFontTx/>
+                <a:buNone/>
+                <a:tabLst/>
+                <a:defRPr/>
+              </a:pPr>
+              <a:r>
+                <a:rPr kumimoji="0" lang="en-GB" sz="1000" i="0" u="none" strike="noStrike" kern="0" cap="none" spc="0" normalizeH="0" baseline="0" noProof="0" dirty="0">
+                  <a:ln>
+                    <a:noFill/>
+                  </a:ln>
+                  <a:solidFill>
+                    <a:prstClr val="black"/>
+                  </a:solidFill>
+                  <a:effectLst/>
+                  <a:uLnTx/>
+                  <a:uFillTx/>
+                  <a:latin typeface="Calibri" panose="020F0502020204030204" pitchFamily="34" charset="0"/>
+                  <a:cs typeface="Calibri" panose="020F0502020204030204" pitchFamily="34" charset="0"/>
+                </a:rPr>
+                <a:t>pcn-k8s</a:t>
+              </a:r>
+            </a:p>
+          </p:txBody>
+        </p:sp>
+        <p:sp>
+          <p:nvSpPr>
+            <p:cNvPr id="120" name="Rettangolo arrotondato 1">
+              <a:extLst>
+                <a:ext uri="{FF2B5EF4-FFF2-40B4-BE49-F238E27FC236}">
+                  <a16:creationId xmlns:a16="http://schemas.microsoft.com/office/drawing/2014/main" id="{2DEA9E37-FB17-BB47-A9ED-8D1F778A45D3}"/>
+                </a:ext>
+              </a:extLst>
+            </p:cNvPr>
+            <p:cNvSpPr/>
+            <p:nvPr/>
+          </p:nvSpPr>
+          <p:spPr>
+            <a:xfrm>
+              <a:off x="6447387" y="4561319"/>
+              <a:ext cx="5472000" cy="530226"/>
+            </a:xfrm>
+            <a:prstGeom prst="roundRect">
+              <a:avLst>
+                <a:gd name="adj" fmla="val 20909"/>
+              </a:avLst>
+            </a:prstGeom>
+            <a:solidFill>
+              <a:srgbClr val="FFFF99"/>
+            </a:solidFill>
+            <a:ln w="12700" cap="flat" cmpd="sng" algn="ctr">
+              <a:solidFill>
+                <a:srgbClr val="ED7D31"/>
+              </a:solidFill>
+              <a:prstDash val="solid"/>
+              <a:miter lim="800000"/>
+              <a:headEnd type="none" w="med" len="med"/>
+              <a:tailEnd type="none" w="med" len="med"/>
+            </a:ln>
+            <a:effectLst/>
+          </p:spPr>
+          <p:txBody>
+            <a:bodyPr lIns="0" tIns="0" rIns="0" bIns="0" rtlCol="0" anchor="ctr"/>
+            <a:lstStyle/>
+            <a:p>
+              <a:pPr marL="0" marR="0" lvl="0" indent="0" algn="ctr" defTabSz="914400" eaLnBrk="1" fontAlgn="auto" latinLnBrk="0" hangingPunct="1">
+                <a:lnSpc>
+                  <a:spcPct val="100000"/>
+                </a:lnSpc>
+                <a:spcBef>
+                  <a:spcPts val="0"/>
+                </a:spcBef>
+                <a:spcAft>
+                  <a:spcPts val="0"/>
+                </a:spcAft>
+                <a:buClrTx/>
+                <a:buSzTx/>
+                <a:buFontTx/>
+                <a:buNone/>
+                <a:tabLst/>
+                <a:defRPr/>
+              </a:pPr>
+              <a:endParaRPr kumimoji="0" lang="en-GB" sz="1050" i="0" u="none" strike="noStrike" kern="0" cap="none" spc="0" normalizeH="0" baseline="0" noProof="0" dirty="0">
+                <a:ln>
+                  <a:noFill/>
+                </a:ln>
+                <a:solidFill>
+                  <a:prstClr val="black"/>
+                </a:solidFill>
+                <a:effectLst/>
+                <a:uLnTx/>
+                <a:uFillTx/>
+                <a:latin typeface="Calibri" panose="020F0502020204030204" pitchFamily="34" charset="0"/>
+                <a:cs typeface="Calibri" panose="020F0502020204030204" pitchFamily="34" charset="0"/>
+              </a:endParaRPr>
+            </a:p>
+          </p:txBody>
+        </p:sp>
+        <p:sp>
+          <p:nvSpPr>
+            <p:cNvPr id="121" name="Rettangolo arrotondato 24">
+              <a:extLst>
+                <a:ext uri="{FF2B5EF4-FFF2-40B4-BE49-F238E27FC236}">
+                  <a16:creationId xmlns:a16="http://schemas.microsoft.com/office/drawing/2014/main" id="{5E678B7A-7D20-F046-A80C-8041B6979125}"/>
+                </a:ext>
+              </a:extLst>
+            </p:cNvPr>
+            <p:cNvSpPr/>
+            <p:nvPr/>
+          </p:nvSpPr>
+          <p:spPr>
+            <a:xfrm>
+              <a:off x="7678870" y="4690841"/>
+              <a:ext cx="759371" cy="290409"/>
+            </a:xfrm>
+            <a:prstGeom prst="roundRect">
+              <a:avLst/>
+            </a:prstGeom>
+            <a:solidFill>
+              <a:srgbClr val="FFFF99"/>
+            </a:solidFill>
+            <a:ln w="12700" cap="flat" cmpd="sng" algn="ctr">
+              <a:solidFill>
+                <a:srgbClr val="ED7D31"/>
+              </a:solidFill>
+              <a:prstDash val="solid"/>
+              <a:round/>
+              <a:headEnd type="none" w="med" len="med"/>
+              <a:tailEnd type="none" w="med" len="med"/>
+            </a:ln>
+            <a:effectLst/>
+          </p:spPr>
+          <p:txBody>
+            <a:bodyPr lIns="0" tIns="0" rIns="0" bIns="0" rtlCol="0" anchor="ctr"/>
+            <a:lstStyle/>
+            <a:p>
+              <a:pPr marL="0" marR="0" lvl="0" indent="0" algn="ctr" defTabSz="914400" eaLnBrk="1" fontAlgn="auto" latinLnBrk="0" hangingPunct="1">
+                <a:lnSpc>
+                  <a:spcPct val="100000"/>
+                </a:lnSpc>
+                <a:spcBef>
+                  <a:spcPts val="0"/>
+                </a:spcBef>
+                <a:spcAft>
+                  <a:spcPts val="0"/>
+                </a:spcAft>
+                <a:buClrTx/>
+                <a:buSzTx/>
+                <a:buFontTx/>
+                <a:buNone/>
+                <a:tabLst/>
+                <a:defRPr/>
+              </a:pPr>
+              <a:r>
+                <a:rPr kumimoji="0" lang="en-GB" sz="1000" i="0" u="none" strike="noStrike" kern="0" cap="none" spc="0" normalizeH="0" baseline="0" noProof="0" dirty="0">
+                  <a:ln>
+                    <a:noFill/>
+                  </a:ln>
+                  <a:solidFill>
+                    <a:prstClr val="black"/>
+                  </a:solidFill>
+                  <a:effectLst/>
+                  <a:uLnTx/>
+                  <a:uFillTx/>
+                  <a:latin typeface="Calibri" panose="020F0502020204030204" pitchFamily="34" charset="0"/>
+                  <a:cs typeface="Calibri" panose="020F0502020204030204" pitchFamily="34" charset="0"/>
+                </a:rPr>
+                <a:t>BPF</a:t>
+              </a:r>
+            </a:p>
+          </p:txBody>
+        </p:sp>
+        <p:sp>
+          <p:nvSpPr>
+            <p:cNvPr id="122" name="Rettangolo arrotondato 25">
+              <a:extLst>
+                <a:ext uri="{FF2B5EF4-FFF2-40B4-BE49-F238E27FC236}">
+                  <a16:creationId xmlns:a16="http://schemas.microsoft.com/office/drawing/2014/main" id="{6B36296E-DDEA-3344-91C8-8D9F3D793D31}"/>
+                </a:ext>
+              </a:extLst>
+            </p:cNvPr>
+            <p:cNvSpPr/>
+            <p:nvPr/>
+          </p:nvSpPr>
+          <p:spPr>
+            <a:xfrm>
+              <a:off x="9823077" y="4683364"/>
+              <a:ext cx="759371" cy="290409"/>
+            </a:xfrm>
+            <a:prstGeom prst="roundRect">
+              <a:avLst/>
+            </a:prstGeom>
+            <a:solidFill>
+              <a:srgbClr val="FFFF99"/>
+            </a:solidFill>
+            <a:ln w="12700" cap="flat" cmpd="sng" algn="ctr">
+              <a:solidFill>
+                <a:srgbClr val="ED7D31"/>
+              </a:solidFill>
+              <a:prstDash val="solid"/>
+              <a:round/>
+              <a:headEnd type="none" w="med" len="med"/>
+              <a:tailEnd type="none" w="med" len="med"/>
+            </a:ln>
+            <a:effectLst/>
+          </p:spPr>
+          <p:txBody>
+            <a:bodyPr lIns="0" tIns="0" rIns="0" bIns="0" rtlCol="0" anchor="ctr"/>
+            <a:lstStyle/>
+            <a:p>
+              <a:pPr marL="0" marR="0" lvl="0" indent="0" algn="ctr" defTabSz="914400" eaLnBrk="1" fontAlgn="auto" latinLnBrk="0" hangingPunct="1">
+                <a:lnSpc>
+                  <a:spcPct val="100000"/>
+                </a:lnSpc>
+                <a:spcBef>
+                  <a:spcPts val="0"/>
+                </a:spcBef>
+                <a:spcAft>
+                  <a:spcPts val="0"/>
+                </a:spcAft>
+                <a:buClrTx/>
+                <a:buSzTx/>
+                <a:buFontTx/>
+                <a:buNone/>
+                <a:tabLst/>
+                <a:defRPr/>
+              </a:pPr>
+              <a:r>
+                <a:rPr kumimoji="0" lang="en-GB" sz="1000" i="0" u="none" strike="noStrike" kern="0" cap="none" spc="0" normalizeH="0" baseline="0" noProof="0" dirty="0">
+                  <a:ln>
+                    <a:noFill/>
+                  </a:ln>
+                  <a:solidFill>
+                    <a:prstClr val="black"/>
+                  </a:solidFill>
+                  <a:effectLst/>
+                  <a:uLnTx/>
+                  <a:uFillTx/>
+                  <a:latin typeface="Calibri" panose="020F0502020204030204" pitchFamily="34" charset="0"/>
+                  <a:cs typeface="Calibri" panose="020F0502020204030204" pitchFamily="34" charset="0"/>
+                </a:rPr>
+                <a:t>XDP</a:t>
+              </a:r>
+            </a:p>
+          </p:txBody>
+        </p:sp>
+        <p:sp>
+          <p:nvSpPr>
+            <p:cNvPr id="124" name="CasellaDiTesto 8">
+              <a:extLst>
+                <a:ext uri="{FF2B5EF4-FFF2-40B4-BE49-F238E27FC236}">
+                  <a16:creationId xmlns:a16="http://schemas.microsoft.com/office/drawing/2014/main" id="{E97BF14D-1531-6846-99C8-D6A8C69C11E1}"/>
+                </a:ext>
+              </a:extLst>
+            </p:cNvPr>
+            <p:cNvSpPr txBox="1"/>
+            <p:nvPr/>
+          </p:nvSpPr>
+          <p:spPr>
+            <a:xfrm>
+              <a:off x="8843107" y="4724637"/>
+              <a:ext cx="475594" cy="269325"/>
+            </a:xfrm>
+            <a:prstGeom prst="rect">
+              <a:avLst/>
+            </a:prstGeom>
+            <a:solidFill>
+              <a:srgbClr val="FFFF99"/>
+            </a:solidFill>
+            <a:ln w="12700">
+              <a:noFill/>
+            </a:ln>
+          </p:spPr>
+          <p:txBody>
+            <a:bodyPr wrap="none" lIns="0" tIns="0" rIns="0" bIns="0" rtlCol="0">
+              <a:spAutoFit/>
+            </a:bodyPr>
+            <a:lstStyle/>
+            <a:p>
+              <a:pPr defTabSz="914400"/>
+              <a:r>
+                <a:rPr lang="en-GB" sz="1050" dirty="0">
+                  <a:solidFill>
+                    <a:prstClr val="black"/>
+                  </a:solidFill>
+                  <a:latin typeface="Calibri" panose="020F0502020204030204" pitchFamily="34" charset="0"/>
+                  <a:cs typeface="Calibri" panose="020F0502020204030204" pitchFamily="34" charset="0"/>
+                </a:rPr>
+                <a:t>Linux</a:t>
+              </a:r>
+            </a:p>
+          </p:txBody>
+        </p:sp>
+        <p:sp>
+          <p:nvSpPr>
+            <p:cNvPr id="125" name="CasellaDiTesto 2">
+              <a:extLst>
+                <a:ext uri="{FF2B5EF4-FFF2-40B4-BE49-F238E27FC236}">
+                  <a16:creationId xmlns:a16="http://schemas.microsoft.com/office/drawing/2014/main" id="{52FB5BF3-20ED-664F-9051-4E77A8AF2876}"/>
+                </a:ext>
+              </a:extLst>
+            </p:cNvPr>
+            <p:cNvSpPr txBox="1"/>
+            <p:nvPr/>
+          </p:nvSpPr>
+          <p:spPr>
+            <a:xfrm>
+              <a:off x="10418539" y="794851"/>
+              <a:ext cx="1119516" cy="269325"/>
+            </a:xfrm>
+            <a:prstGeom prst="rect">
+              <a:avLst/>
+            </a:prstGeom>
+            <a:noFill/>
+            <a:ln w="12700">
+              <a:noFill/>
+            </a:ln>
+          </p:spPr>
+          <p:txBody>
+            <a:bodyPr wrap="none" lIns="0" tIns="0" rIns="0" bIns="0" rtlCol="0">
+              <a:spAutoFit/>
+            </a:bodyPr>
+            <a:lstStyle/>
+            <a:p>
+              <a:pPr defTabSz="914400"/>
+              <a:r>
+                <a:rPr lang="en-GB" sz="1050" dirty="0">
+                  <a:solidFill>
+                    <a:prstClr val="black"/>
+                  </a:solidFill>
+                  <a:latin typeface="Calibri" panose="020F0502020204030204" pitchFamily="34" charset="0"/>
+                  <a:cs typeface="Calibri" panose="020F0502020204030204" pitchFamily="34" charset="0"/>
+                </a:rPr>
+                <a:t>Applications</a:t>
+              </a:r>
+            </a:p>
+          </p:txBody>
+        </p:sp>
+        <p:sp>
+          <p:nvSpPr>
+            <p:cNvPr id="126" name="CasellaDiTesto 22">
+              <a:extLst>
+                <a:ext uri="{FF2B5EF4-FFF2-40B4-BE49-F238E27FC236}">
+                  <a16:creationId xmlns:a16="http://schemas.microsoft.com/office/drawing/2014/main" id="{3B7A7988-B228-2B44-B1DB-CB8A0B753612}"/>
+                </a:ext>
+              </a:extLst>
+            </p:cNvPr>
+            <p:cNvSpPr txBox="1"/>
+            <p:nvPr/>
+          </p:nvSpPr>
+          <p:spPr>
+            <a:xfrm>
+              <a:off x="11108969" y="2524215"/>
+              <a:ext cx="555750" cy="269325"/>
+            </a:xfrm>
+            <a:prstGeom prst="rect">
+              <a:avLst/>
+            </a:prstGeom>
+            <a:solidFill>
+              <a:srgbClr val="CCFFFF"/>
+            </a:solidFill>
+            <a:ln w="12700">
+              <a:noFill/>
+            </a:ln>
+          </p:spPr>
+          <p:txBody>
+            <a:bodyPr wrap="none" lIns="0" tIns="0" rIns="0" bIns="0" rtlCol="0">
+              <a:spAutoFit/>
+            </a:bodyPr>
+            <a:lstStyle/>
+            <a:p>
+              <a:pPr defTabSz="914400"/>
+              <a:r>
+                <a:rPr lang="en-GB" sz="1050" dirty="0">
+                  <a:solidFill>
+                    <a:prstClr val="black"/>
+                  </a:solidFill>
+                  <a:latin typeface="Calibri" panose="020F0502020204030204" pitchFamily="34" charset="0"/>
+                  <a:cs typeface="Calibri" panose="020F0502020204030204" pitchFamily="34" charset="0"/>
+                </a:rPr>
+                <a:t>Cubes</a:t>
+              </a:r>
+            </a:p>
+          </p:txBody>
+        </p:sp>
+        <p:sp>
+          <p:nvSpPr>
+            <p:cNvPr id="127" name="Rettangolo arrotondato 23">
+              <a:extLst>
+                <a:ext uri="{FF2B5EF4-FFF2-40B4-BE49-F238E27FC236}">
+                  <a16:creationId xmlns:a16="http://schemas.microsoft.com/office/drawing/2014/main" id="{B1C54F06-B22C-D744-8E4E-DC6A0C0B6A84}"/>
+                </a:ext>
+              </a:extLst>
+            </p:cNvPr>
+            <p:cNvSpPr/>
+            <p:nvPr/>
+          </p:nvSpPr>
+          <p:spPr>
+            <a:xfrm>
+              <a:off x="6866096" y="1137649"/>
+              <a:ext cx="1826697" cy="562630"/>
+            </a:xfrm>
+            <a:prstGeom prst="roundRect">
+              <a:avLst/>
+            </a:prstGeom>
+            <a:solidFill>
+              <a:schemeClr val="bg1">
+                <a:lumMod val="85000"/>
+              </a:schemeClr>
+            </a:solidFill>
+            <a:ln w="12700" cap="flat" cmpd="sng" algn="ctr">
+              <a:solidFill>
+                <a:srgbClr val="A5A5A5"/>
+              </a:solidFill>
+              <a:prstDash val="solid"/>
+              <a:miter lim="800000"/>
+            </a:ln>
+            <a:effectLst/>
+          </p:spPr>
+          <p:txBody>
+            <a:bodyPr lIns="0" tIns="0" rIns="0" bIns="0" rtlCol="0" anchor="ctr"/>
+            <a:lstStyle/>
+            <a:p>
+              <a:pPr marL="0" marR="0" lvl="0" indent="0" algn="ctr" defTabSz="914400" eaLnBrk="1" fontAlgn="auto" latinLnBrk="0" hangingPunct="1">
+                <a:lnSpc>
+                  <a:spcPct val="100000"/>
+                </a:lnSpc>
+                <a:spcBef>
+                  <a:spcPts val="0"/>
+                </a:spcBef>
+                <a:spcAft>
+                  <a:spcPts val="0"/>
+                </a:spcAft>
+                <a:buClrTx/>
+                <a:buSzTx/>
+                <a:buFontTx/>
+                <a:buNone/>
+                <a:tabLst/>
+                <a:defRPr/>
+              </a:pPr>
+              <a:r>
+                <a:rPr kumimoji="0" lang="en-GB" sz="1050" i="0" u="none" strike="noStrike" kern="0" cap="none" spc="0" normalizeH="0" baseline="0" noProof="0" dirty="0">
+                  <a:ln>
+                    <a:noFill/>
+                  </a:ln>
+                  <a:solidFill>
+                    <a:prstClr val="black"/>
+                  </a:solidFill>
+                  <a:effectLst/>
+                  <a:uLnTx/>
+                  <a:uFillTx/>
+                  <a:latin typeface="Calibri" panose="020F0502020204030204" pitchFamily="34" charset="0"/>
+                  <a:cs typeface="Calibri" panose="020F0502020204030204" pitchFamily="34" charset="0"/>
+                </a:rPr>
+                <a:t>CLI</a:t>
+              </a:r>
+            </a:p>
+          </p:txBody>
+        </p:sp>
+        <p:sp>
+          <p:nvSpPr>
+            <p:cNvPr id="128" name="Rettangolo arrotondato 16">
+              <a:extLst>
+                <a:ext uri="{FF2B5EF4-FFF2-40B4-BE49-F238E27FC236}">
+                  <a16:creationId xmlns:a16="http://schemas.microsoft.com/office/drawing/2014/main" id="{33758A28-DF5E-BC4F-B6CB-1D70B38F22AA}"/>
+                </a:ext>
+              </a:extLst>
+            </p:cNvPr>
+            <p:cNvSpPr/>
+            <p:nvPr/>
+          </p:nvSpPr>
+          <p:spPr>
+            <a:xfrm>
+              <a:off x="11064513" y="3075220"/>
+              <a:ext cx="523888" cy="360000"/>
+            </a:xfrm>
+            <a:prstGeom prst="roundRect">
+              <a:avLst/>
+            </a:prstGeom>
+            <a:solidFill>
+              <a:srgbClr val="CCFFFF"/>
+            </a:solidFill>
+            <a:ln w="12700" cap="flat" cmpd="sng" algn="ctr">
+              <a:solidFill>
+                <a:schemeClr val="accent5">
+                  <a:lumMod val="60000"/>
+                  <a:lumOff val="40000"/>
+                </a:schemeClr>
+              </a:solidFill>
+              <a:prstDash val="solid"/>
+              <a:round/>
+              <a:headEnd type="none" w="med" len="med"/>
+              <a:tailEnd type="none" w="med" len="med"/>
+            </a:ln>
+            <a:effectLst/>
+          </p:spPr>
+          <p:txBody>
+            <a:bodyPr lIns="0" tIns="0" rIns="0" bIns="0" rtlCol="0" anchor="ctr"/>
+            <a:lstStyle/>
+            <a:p>
+              <a:pPr marL="0" marR="0" lvl="0" indent="0" algn="ctr" defTabSz="914400" eaLnBrk="1" fontAlgn="auto" latinLnBrk="0" hangingPunct="1">
+                <a:lnSpc>
+                  <a:spcPct val="100000"/>
+                </a:lnSpc>
+                <a:spcBef>
+                  <a:spcPts val="0"/>
+                </a:spcBef>
+                <a:spcAft>
+                  <a:spcPts val="0"/>
+                </a:spcAft>
+                <a:buClrTx/>
+                <a:buSzTx/>
+                <a:buFontTx/>
+                <a:buNone/>
+                <a:tabLst/>
+                <a:defRPr/>
+              </a:pPr>
+              <a:r>
+                <a:rPr kumimoji="0" lang="en-GB" sz="1000" i="0" u="none" strike="noStrike" kern="0" cap="none" spc="0" normalizeH="0" baseline="0" noProof="0" dirty="0">
+                  <a:ln>
+                    <a:noFill/>
+                  </a:ln>
+                  <a:solidFill>
+                    <a:prstClr val="black"/>
+                  </a:solidFill>
+                  <a:effectLst/>
+                  <a:uLnTx/>
+                  <a:uFillTx/>
+                  <a:latin typeface="Calibri" panose="020F0502020204030204" pitchFamily="34" charset="0"/>
+                  <a:cs typeface="Calibri" panose="020F0502020204030204" pitchFamily="34" charset="0"/>
+                </a:rPr>
+                <a:t>. . .</a:t>
+              </a:r>
+            </a:p>
+          </p:txBody>
+        </p:sp>
+        <p:sp>
+          <p:nvSpPr>
+            <p:cNvPr id="129" name="Rettangolo arrotondato 13">
+              <a:extLst>
+                <a:ext uri="{FF2B5EF4-FFF2-40B4-BE49-F238E27FC236}">
+                  <a16:creationId xmlns:a16="http://schemas.microsoft.com/office/drawing/2014/main" id="{32CE114C-0B20-304A-88FA-FB974438FFBD}"/>
+                </a:ext>
+              </a:extLst>
+            </p:cNvPr>
+            <p:cNvSpPr/>
+            <p:nvPr/>
+          </p:nvSpPr>
+          <p:spPr>
+            <a:xfrm>
+              <a:off x="7465346" y="3075220"/>
+              <a:ext cx="805904" cy="360000"/>
+            </a:xfrm>
+            <a:prstGeom prst="roundRect">
+              <a:avLst/>
+            </a:prstGeom>
+            <a:solidFill>
+              <a:srgbClr val="CCFFFF"/>
+            </a:solidFill>
+            <a:ln w="12700" cap="flat" cmpd="sng" algn="ctr">
+              <a:solidFill>
+                <a:schemeClr val="accent5">
+                  <a:lumMod val="60000"/>
+                  <a:lumOff val="40000"/>
+                </a:schemeClr>
+              </a:solidFill>
+              <a:prstDash val="solid"/>
+              <a:round/>
+              <a:headEnd type="none" w="med" len="med"/>
+              <a:tailEnd type="none" w="med" len="med"/>
+            </a:ln>
+            <a:effectLst/>
+          </p:spPr>
+          <p:txBody>
+            <a:bodyPr lIns="0" tIns="0" rIns="0" bIns="0" rtlCol="0" anchor="ctr"/>
+            <a:lstStyle/>
+            <a:p>
+              <a:pPr marL="0" marR="0" lvl="0" indent="0" algn="ctr" defTabSz="914400" eaLnBrk="1" fontAlgn="auto" latinLnBrk="0" hangingPunct="1">
+                <a:lnSpc>
+                  <a:spcPct val="100000"/>
+                </a:lnSpc>
+                <a:spcBef>
+                  <a:spcPts val="0"/>
+                </a:spcBef>
+                <a:spcAft>
+                  <a:spcPts val="0"/>
+                </a:spcAft>
+                <a:buClrTx/>
+                <a:buSzTx/>
+                <a:buFontTx/>
+                <a:buNone/>
+                <a:tabLst/>
+                <a:defRPr/>
+              </a:pPr>
+              <a:r>
+                <a:rPr kumimoji="0" lang="en-GB" sz="1000" i="0" u="none" strike="noStrike" kern="0" cap="none" spc="0" normalizeH="0" baseline="0" noProof="0" dirty="0">
+                  <a:ln>
+                    <a:noFill/>
+                  </a:ln>
+                  <a:solidFill>
+                    <a:prstClr val="black"/>
+                  </a:solidFill>
+                  <a:effectLst/>
+                  <a:uLnTx/>
+                  <a:uFillTx/>
+                  <a:latin typeface="Calibri" panose="020F0502020204030204" pitchFamily="34" charset="0"/>
+                  <a:cs typeface="Calibri" panose="020F0502020204030204" pitchFamily="34" charset="0"/>
+                </a:rPr>
+                <a:t>Firewall</a:t>
+              </a:r>
+            </a:p>
+          </p:txBody>
+        </p:sp>
+        <p:sp>
+          <p:nvSpPr>
+            <p:cNvPr id="130" name="Freeform 129">
+              <a:extLst>
+                <a:ext uri="{FF2B5EF4-FFF2-40B4-BE49-F238E27FC236}">
+                  <a16:creationId xmlns:a16="http://schemas.microsoft.com/office/drawing/2014/main" id="{2DEA9E37-FB17-BB47-A9ED-8D1F778A45D3}"/>
+                </a:ext>
+              </a:extLst>
+            </p:cNvPr>
+            <p:cNvSpPr/>
+            <p:nvPr/>
+          </p:nvSpPr>
+          <p:spPr>
+            <a:xfrm>
+              <a:off x="6446975" y="1874249"/>
+              <a:ext cx="5472411" cy="2506053"/>
+            </a:xfrm>
+            <a:custGeom>
+              <a:avLst/>
+              <a:gdLst>
+                <a:gd name="connsiteX0" fmla="*/ 156952 w 5474834"/>
+                <a:gd name="connsiteY0" fmla="*/ 0 h 2506053"/>
+                <a:gd name="connsiteX1" fmla="*/ 5320716 w 5474834"/>
+                <a:gd name="connsiteY1" fmla="*/ 0 h 2506053"/>
+                <a:gd name="connsiteX2" fmla="*/ 5474834 w 5474834"/>
+                <a:gd name="connsiteY2" fmla="*/ 154118 h 2506053"/>
+                <a:gd name="connsiteX3" fmla="*/ 5474834 w 5474834"/>
+                <a:gd name="connsiteY3" fmla="*/ 171368 h 2506053"/>
+                <a:gd name="connsiteX4" fmla="*/ 5320716 w 5474834"/>
+                <a:gd name="connsiteY4" fmla="*/ 325486 h 2506053"/>
+                <a:gd name="connsiteX5" fmla="*/ 843367 w 5474834"/>
+                <a:gd name="connsiteY5" fmla="*/ 325486 h 2506053"/>
+                <a:gd name="connsiteX6" fmla="*/ 843367 w 5474834"/>
+                <a:gd name="connsiteY6" fmla="*/ 328960 h 2506053"/>
+                <a:gd name="connsiteX7" fmla="*/ 838997 w 5474834"/>
+                <a:gd name="connsiteY7" fmla="*/ 328960 h 2506053"/>
+                <a:gd name="connsiteX8" fmla="*/ 649126 w 5474834"/>
+                <a:gd name="connsiteY8" fmla="*/ 518831 h 2506053"/>
+                <a:gd name="connsiteX9" fmla="*/ 649126 w 5474834"/>
+                <a:gd name="connsiteY9" fmla="*/ 1774635 h 2506053"/>
+                <a:gd name="connsiteX10" fmla="*/ 838997 w 5474834"/>
+                <a:gd name="connsiteY10" fmla="*/ 1964506 h 2506053"/>
+                <a:gd name="connsiteX11" fmla="*/ 843367 w 5474834"/>
+                <a:gd name="connsiteY11" fmla="*/ 1964506 h 2506053"/>
+                <a:gd name="connsiteX12" fmla="*/ 843367 w 5474834"/>
+                <a:gd name="connsiteY12" fmla="*/ 1967568 h 2506053"/>
+                <a:gd name="connsiteX13" fmla="*/ 5290193 w 5474834"/>
+                <a:gd name="connsiteY13" fmla="*/ 1967568 h 2506053"/>
+                <a:gd name="connsiteX14" fmla="*/ 5474834 w 5474834"/>
+                <a:gd name="connsiteY14" fmla="*/ 2152209 h 2506053"/>
+                <a:gd name="connsiteX15" fmla="*/ 5474834 w 5474834"/>
+                <a:gd name="connsiteY15" fmla="*/ 2321412 h 2506053"/>
+                <a:gd name="connsiteX16" fmla="*/ 5290193 w 5474834"/>
+                <a:gd name="connsiteY16" fmla="*/ 2506053 h 2506053"/>
+                <a:gd name="connsiteX17" fmla="*/ 187475 w 5474834"/>
+                <a:gd name="connsiteY17" fmla="*/ 2506053 h 2506053"/>
+                <a:gd name="connsiteX18" fmla="*/ 2834 w 5474834"/>
+                <a:gd name="connsiteY18" fmla="*/ 2321412 h 2506053"/>
+                <a:gd name="connsiteX19" fmla="*/ 2834 w 5474834"/>
+                <a:gd name="connsiteY19" fmla="*/ 2194262 h 2506053"/>
+                <a:gd name="connsiteX20" fmla="*/ 0 w 5474834"/>
+                <a:gd name="connsiteY20" fmla="*/ 2180225 h 2506053"/>
+                <a:gd name="connsiteX21" fmla="*/ 0 w 5474834"/>
+                <a:gd name="connsiteY21" fmla="*/ 240563 h 2506053"/>
+                <a:gd name="connsiteX22" fmla="*/ 8402 w 5474834"/>
+                <a:gd name="connsiteY22" fmla="*/ 198947 h 2506053"/>
+                <a:gd name="connsiteX23" fmla="*/ 2834 w 5474834"/>
+                <a:gd name="connsiteY23" fmla="*/ 171368 h 2506053"/>
+                <a:gd name="connsiteX24" fmla="*/ 2834 w 5474834"/>
+                <a:gd name="connsiteY24" fmla="*/ 154118 h 2506053"/>
+                <a:gd name="connsiteX25" fmla="*/ 156952 w 5474834"/>
+                <a:gd name="connsiteY25" fmla="*/ 0 h 2506053"/>
+                <a:gd name="connsiteX0" fmla="*/ 156952 w 5474834"/>
+                <a:gd name="connsiteY0" fmla="*/ 0 h 2506053"/>
+                <a:gd name="connsiteX1" fmla="*/ 5320716 w 5474834"/>
+                <a:gd name="connsiteY1" fmla="*/ 0 h 2506053"/>
+                <a:gd name="connsiteX2" fmla="*/ 5474834 w 5474834"/>
+                <a:gd name="connsiteY2" fmla="*/ 154118 h 2506053"/>
+                <a:gd name="connsiteX3" fmla="*/ 5474834 w 5474834"/>
+                <a:gd name="connsiteY3" fmla="*/ 171368 h 2506053"/>
+                <a:gd name="connsiteX4" fmla="*/ 5320716 w 5474834"/>
+                <a:gd name="connsiteY4" fmla="*/ 325486 h 2506053"/>
+                <a:gd name="connsiteX5" fmla="*/ 843367 w 5474834"/>
+                <a:gd name="connsiteY5" fmla="*/ 325486 h 2506053"/>
+                <a:gd name="connsiteX6" fmla="*/ 843367 w 5474834"/>
+                <a:gd name="connsiteY6" fmla="*/ 328960 h 2506053"/>
+                <a:gd name="connsiteX7" fmla="*/ 838997 w 5474834"/>
+                <a:gd name="connsiteY7" fmla="*/ 328960 h 2506053"/>
+                <a:gd name="connsiteX8" fmla="*/ 649126 w 5474834"/>
+                <a:gd name="connsiteY8" fmla="*/ 518831 h 2506053"/>
+                <a:gd name="connsiteX9" fmla="*/ 649126 w 5474834"/>
+                <a:gd name="connsiteY9" fmla="*/ 1774635 h 2506053"/>
+                <a:gd name="connsiteX10" fmla="*/ 838997 w 5474834"/>
+                <a:gd name="connsiteY10" fmla="*/ 1964506 h 2506053"/>
+                <a:gd name="connsiteX11" fmla="*/ 843367 w 5474834"/>
+                <a:gd name="connsiteY11" fmla="*/ 1964506 h 2506053"/>
+                <a:gd name="connsiteX12" fmla="*/ 843367 w 5474834"/>
+                <a:gd name="connsiteY12" fmla="*/ 1967568 h 2506053"/>
+                <a:gd name="connsiteX13" fmla="*/ 5290193 w 5474834"/>
+                <a:gd name="connsiteY13" fmla="*/ 1967568 h 2506053"/>
+                <a:gd name="connsiteX14" fmla="*/ 5474834 w 5474834"/>
+                <a:gd name="connsiteY14" fmla="*/ 2152209 h 2506053"/>
+                <a:gd name="connsiteX15" fmla="*/ 5474834 w 5474834"/>
+                <a:gd name="connsiteY15" fmla="*/ 2321412 h 2506053"/>
+                <a:gd name="connsiteX16" fmla="*/ 5290193 w 5474834"/>
+                <a:gd name="connsiteY16" fmla="*/ 2506053 h 2506053"/>
+                <a:gd name="connsiteX17" fmla="*/ 187475 w 5474834"/>
+                <a:gd name="connsiteY17" fmla="*/ 2506053 h 2506053"/>
+                <a:gd name="connsiteX18" fmla="*/ 2834 w 5474834"/>
+                <a:gd name="connsiteY18" fmla="*/ 2321412 h 2506053"/>
+                <a:gd name="connsiteX19" fmla="*/ 2834 w 5474834"/>
+                <a:gd name="connsiteY19" fmla="*/ 2194262 h 2506053"/>
+                <a:gd name="connsiteX20" fmla="*/ 0 w 5474834"/>
+                <a:gd name="connsiteY20" fmla="*/ 2180225 h 2506053"/>
+                <a:gd name="connsiteX21" fmla="*/ 0 w 5474834"/>
+                <a:gd name="connsiteY21" fmla="*/ 240563 h 2506053"/>
+                <a:gd name="connsiteX22" fmla="*/ 8402 w 5474834"/>
+                <a:gd name="connsiteY22" fmla="*/ 198947 h 2506053"/>
+                <a:gd name="connsiteX23" fmla="*/ 2834 w 5474834"/>
+                <a:gd name="connsiteY23" fmla="*/ 154118 h 2506053"/>
+                <a:gd name="connsiteX24" fmla="*/ 156952 w 5474834"/>
+                <a:gd name="connsiteY24" fmla="*/ 0 h 2506053"/>
+                <a:gd name="connsiteX0" fmla="*/ 156952 w 5474834"/>
+                <a:gd name="connsiteY0" fmla="*/ 0 h 2506053"/>
+                <a:gd name="connsiteX1" fmla="*/ 5320716 w 5474834"/>
+                <a:gd name="connsiteY1" fmla="*/ 0 h 2506053"/>
+                <a:gd name="connsiteX2" fmla="*/ 5474834 w 5474834"/>
+                <a:gd name="connsiteY2" fmla="*/ 154118 h 2506053"/>
+                <a:gd name="connsiteX3" fmla="*/ 5474834 w 5474834"/>
+                <a:gd name="connsiteY3" fmla="*/ 171368 h 2506053"/>
+                <a:gd name="connsiteX4" fmla="*/ 5320716 w 5474834"/>
+                <a:gd name="connsiteY4" fmla="*/ 325486 h 2506053"/>
+                <a:gd name="connsiteX5" fmla="*/ 843367 w 5474834"/>
+                <a:gd name="connsiteY5" fmla="*/ 325486 h 2506053"/>
+                <a:gd name="connsiteX6" fmla="*/ 843367 w 5474834"/>
+                <a:gd name="connsiteY6" fmla="*/ 328960 h 2506053"/>
+                <a:gd name="connsiteX7" fmla="*/ 838997 w 5474834"/>
+                <a:gd name="connsiteY7" fmla="*/ 328960 h 2506053"/>
+                <a:gd name="connsiteX8" fmla="*/ 649126 w 5474834"/>
+                <a:gd name="connsiteY8" fmla="*/ 518831 h 2506053"/>
+                <a:gd name="connsiteX9" fmla="*/ 649126 w 5474834"/>
+                <a:gd name="connsiteY9" fmla="*/ 1774635 h 2506053"/>
+                <a:gd name="connsiteX10" fmla="*/ 838997 w 5474834"/>
+                <a:gd name="connsiteY10" fmla="*/ 1964506 h 2506053"/>
+                <a:gd name="connsiteX11" fmla="*/ 843367 w 5474834"/>
+                <a:gd name="connsiteY11" fmla="*/ 1964506 h 2506053"/>
+                <a:gd name="connsiteX12" fmla="*/ 843367 w 5474834"/>
+                <a:gd name="connsiteY12" fmla="*/ 1967568 h 2506053"/>
+                <a:gd name="connsiteX13" fmla="*/ 5290193 w 5474834"/>
+                <a:gd name="connsiteY13" fmla="*/ 1967568 h 2506053"/>
+                <a:gd name="connsiteX14" fmla="*/ 5474834 w 5474834"/>
+                <a:gd name="connsiteY14" fmla="*/ 2152209 h 2506053"/>
+                <a:gd name="connsiteX15" fmla="*/ 5474834 w 5474834"/>
+                <a:gd name="connsiteY15" fmla="*/ 2321412 h 2506053"/>
+                <a:gd name="connsiteX16" fmla="*/ 5290193 w 5474834"/>
+                <a:gd name="connsiteY16" fmla="*/ 2506053 h 2506053"/>
+                <a:gd name="connsiteX17" fmla="*/ 187475 w 5474834"/>
+                <a:gd name="connsiteY17" fmla="*/ 2506053 h 2506053"/>
+                <a:gd name="connsiteX18" fmla="*/ 2834 w 5474834"/>
+                <a:gd name="connsiteY18" fmla="*/ 2321412 h 2506053"/>
+                <a:gd name="connsiteX19" fmla="*/ 2834 w 5474834"/>
+                <a:gd name="connsiteY19" fmla="*/ 2194262 h 2506053"/>
+                <a:gd name="connsiteX20" fmla="*/ 0 w 5474834"/>
+                <a:gd name="connsiteY20" fmla="*/ 2180225 h 2506053"/>
+                <a:gd name="connsiteX21" fmla="*/ 0 w 5474834"/>
+                <a:gd name="connsiteY21" fmla="*/ 240563 h 2506053"/>
+                <a:gd name="connsiteX22" fmla="*/ 2834 w 5474834"/>
+                <a:gd name="connsiteY22" fmla="*/ 154118 h 2506053"/>
+                <a:gd name="connsiteX23" fmla="*/ 156952 w 5474834"/>
+                <a:gd name="connsiteY23" fmla="*/ 0 h 2506053"/>
+                <a:gd name="connsiteX0" fmla="*/ 156952 w 5474834"/>
+                <a:gd name="connsiteY0" fmla="*/ 0 h 2506053"/>
+                <a:gd name="connsiteX1" fmla="*/ 5320716 w 5474834"/>
+                <a:gd name="connsiteY1" fmla="*/ 0 h 2506053"/>
+                <a:gd name="connsiteX2" fmla="*/ 5474834 w 5474834"/>
+                <a:gd name="connsiteY2" fmla="*/ 154118 h 2506053"/>
+                <a:gd name="connsiteX3" fmla="*/ 5474834 w 5474834"/>
+                <a:gd name="connsiteY3" fmla="*/ 171368 h 2506053"/>
+                <a:gd name="connsiteX4" fmla="*/ 5320716 w 5474834"/>
+                <a:gd name="connsiteY4" fmla="*/ 325486 h 2506053"/>
+                <a:gd name="connsiteX5" fmla="*/ 843367 w 5474834"/>
+                <a:gd name="connsiteY5" fmla="*/ 325486 h 2506053"/>
+                <a:gd name="connsiteX6" fmla="*/ 843367 w 5474834"/>
+                <a:gd name="connsiteY6" fmla="*/ 328960 h 2506053"/>
+                <a:gd name="connsiteX7" fmla="*/ 838997 w 5474834"/>
+                <a:gd name="connsiteY7" fmla="*/ 328960 h 2506053"/>
+                <a:gd name="connsiteX8" fmla="*/ 649126 w 5474834"/>
+                <a:gd name="connsiteY8" fmla="*/ 518831 h 2506053"/>
+                <a:gd name="connsiteX9" fmla="*/ 649126 w 5474834"/>
+                <a:gd name="connsiteY9" fmla="*/ 1774635 h 2506053"/>
+                <a:gd name="connsiteX10" fmla="*/ 838997 w 5474834"/>
+                <a:gd name="connsiteY10" fmla="*/ 1964506 h 2506053"/>
+                <a:gd name="connsiteX11" fmla="*/ 843367 w 5474834"/>
+                <a:gd name="connsiteY11" fmla="*/ 1964506 h 2506053"/>
+                <a:gd name="connsiteX12" fmla="*/ 843367 w 5474834"/>
+                <a:gd name="connsiteY12" fmla="*/ 1967568 h 2506053"/>
+                <a:gd name="connsiteX13" fmla="*/ 5290193 w 5474834"/>
+                <a:gd name="connsiteY13" fmla="*/ 1967568 h 2506053"/>
+                <a:gd name="connsiteX14" fmla="*/ 5474834 w 5474834"/>
+                <a:gd name="connsiteY14" fmla="*/ 2152209 h 2506053"/>
+                <a:gd name="connsiteX15" fmla="*/ 5474834 w 5474834"/>
+                <a:gd name="connsiteY15" fmla="*/ 2321412 h 2506053"/>
+                <a:gd name="connsiteX16" fmla="*/ 5290193 w 5474834"/>
+                <a:gd name="connsiteY16" fmla="*/ 2506053 h 2506053"/>
+                <a:gd name="connsiteX17" fmla="*/ 187475 w 5474834"/>
+                <a:gd name="connsiteY17" fmla="*/ 2506053 h 2506053"/>
+                <a:gd name="connsiteX18" fmla="*/ 2834 w 5474834"/>
+                <a:gd name="connsiteY18" fmla="*/ 2321412 h 2506053"/>
+                <a:gd name="connsiteX19" fmla="*/ 0 w 5474834"/>
+                <a:gd name="connsiteY19" fmla="*/ 2180225 h 2506053"/>
+                <a:gd name="connsiteX20" fmla="*/ 0 w 5474834"/>
+                <a:gd name="connsiteY20" fmla="*/ 240563 h 2506053"/>
+                <a:gd name="connsiteX21" fmla="*/ 2834 w 5474834"/>
+                <a:gd name="connsiteY21" fmla="*/ 154118 h 2506053"/>
+                <a:gd name="connsiteX22" fmla="*/ 156952 w 5474834"/>
+                <a:gd name="connsiteY22" fmla="*/ 0 h 2506053"/>
+                <a:gd name="connsiteX0" fmla="*/ 168779 w 5486661"/>
+                <a:gd name="connsiteY0" fmla="*/ 0 h 2506053"/>
+                <a:gd name="connsiteX1" fmla="*/ 5332543 w 5486661"/>
+                <a:gd name="connsiteY1" fmla="*/ 0 h 2506053"/>
+                <a:gd name="connsiteX2" fmla="*/ 5486661 w 5486661"/>
+                <a:gd name="connsiteY2" fmla="*/ 154118 h 2506053"/>
+                <a:gd name="connsiteX3" fmla="*/ 5486661 w 5486661"/>
+                <a:gd name="connsiteY3" fmla="*/ 171368 h 2506053"/>
+                <a:gd name="connsiteX4" fmla="*/ 5332543 w 5486661"/>
+                <a:gd name="connsiteY4" fmla="*/ 325486 h 2506053"/>
+                <a:gd name="connsiteX5" fmla="*/ 855194 w 5486661"/>
+                <a:gd name="connsiteY5" fmla="*/ 325486 h 2506053"/>
+                <a:gd name="connsiteX6" fmla="*/ 855194 w 5486661"/>
+                <a:gd name="connsiteY6" fmla="*/ 328960 h 2506053"/>
+                <a:gd name="connsiteX7" fmla="*/ 850824 w 5486661"/>
+                <a:gd name="connsiteY7" fmla="*/ 328960 h 2506053"/>
+                <a:gd name="connsiteX8" fmla="*/ 660953 w 5486661"/>
+                <a:gd name="connsiteY8" fmla="*/ 518831 h 2506053"/>
+                <a:gd name="connsiteX9" fmla="*/ 660953 w 5486661"/>
+                <a:gd name="connsiteY9" fmla="*/ 1774635 h 2506053"/>
+                <a:gd name="connsiteX10" fmla="*/ 850824 w 5486661"/>
+                <a:gd name="connsiteY10" fmla="*/ 1964506 h 2506053"/>
+                <a:gd name="connsiteX11" fmla="*/ 855194 w 5486661"/>
+                <a:gd name="connsiteY11" fmla="*/ 1964506 h 2506053"/>
+                <a:gd name="connsiteX12" fmla="*/ 855194 w 5486661"/>
+                <a:gd name="connsiteY12" fmla="*/ 1967568 h 2506053"/>
+                <a:gd name="connsiteX13" fmla="*/ 5302020 w 5486661"/>
+                <a:gd name="connsiteY13" fmla="*/ 1967568 h 2506053"/>
+                <a:gd name="connsiteX14" fmla="*/ 5486661 w 5486661"/>
+                <a:gd name="connsiteY14" fmla="*/ 2152209 h 2506053"/>
+                <a:gd name="connsiteX15" fmla="*/ 5486661 w 5486661"/>
+                <a:gd name="connsiteY15" fmla="*/ 2321412 h 2506053"/>
+                <a:gd name="connsiteX16" fmla="*/ 5302020 w 5486661"/>
+                <a:gd name="connsiteY16" fmla="*/ 2506053 h 2506053"/>
+                <a:gd name="connsiteX17" fmla="*/ 199302 w 5486661"/>
+                <a:gd name="connsiteY17" fmla="*/ 2506053 h 2506053"/>
+                <a:gd name="connsiteX18" fmla="*/ 14661 w 5486661"/>
+                <a:gd name="connsiteY18" fmla="*/ 2321412 h 2506053"/>
+                <a:gd name="connsiteX19" fmla="*/ 11827 w 5486661"/>
+                <a:gd name="connsiteY19" fmla="*/ 240563 h 2506053"/>
+                <a:gd name="connsiteX20" fmla="*/ 14661 w 5486661"/>
+                <a:gd name="connsiteY20" fmla="*/ 154118 h 2506053"/>
+                <a:gd name="connsiteX21" fmla="*/ 168779 w 5486661"/>
+                <a:gd name="connsiteY21" fmla="*/ 0 h 2506053"/>
+                <a:gd name="connsiteX0" fmla="*/ 175332 w 5493214"/>
+                <a:gd name="connsiteY0" fmla="*/ 0 h 2506053"/>
+                <a:gd name="connsiteX1" fmla="*/ 5339096 w 5493214"/>
+                <a:gd name="connsiteY1" fmla="*/ 0 h 2506053"/>
+                <a:gd name="connsiteX2" fmla="*/ 5493214 w 5493214"/>
+                <a:gd name="connsiteY2" fmla="*/ 154118 h 2506053"/>
+                <a:gd name="connsiteX3" fmla="*/ 5493214 w 5493214"/>
+                <a:gd name="connsiteY3" fmla="*/ 171368 h 2506053"/>
+                <a:gd name="connsiteX4" fmla="*/ 5339096 w 5493214"/>
+                <a:gd name="connsiteY4" fmla="*/ 325486 h 2506053"/>
+                <a:gd name="connsiteX5" fmla="*/ 861747 w 5493214"/>
+                <a:gd name="connsiteY5" fmla="*/ 325486 h 2506053"/>
+                <a:gd name="connsiteX6" fmla="*/ 861747 w 5493214"/>
+                <a:gd name="connsiteY6" fmla="*/ 328960 h 2506053"/>
+                <a:gd name="connsiteX7" fmla="*/ 857377 w 5493214"/>
+                <a:gd name="connsiteY7" fmla="*/ 328960 h 2506053"/>
+                <a:gd name="connsiteX8" fmla="*/ 667506 w 5493214"/>
+                <a:gd name="connsiteY8" fmla="*/ 518831 h 2506053"/>
+                <a:gd name="connsiteX9" fmla="*/ 667506 w 5493214"/>
+                <a:gd name="connsiteY9" fmla="*/ 1774635 h 2506053"/>
+                <a:gd name="connsiteX10" fmla="*/ 857377 w 5493214"/>
+                <a:gd name="connsiteY10" fmla="*/ 1964506 h 2506053"/>
+                <a:gd name="connsiteX11" fmla="*/ 861747 w 5493214"/>
+                <a:gd name="connsiteY11" fmla="*/ 1964506 h 2506053"/>
+                <a:gd name="connsiteX12" fmla="*/ 861747 w 5493214"/>
+                <a:gd name="connsiteY12" fmla="*/ 1967568 h 2506053"/>
+                <a:gd name="connsiteX13" fmla="*/ 5308573 w 5493214"/>
+                <a:gd name="connsiteY13" fmla="*/ 1967568 h 2506053"/>
+                <a:gd name="connsiteX14" fmla="*/ 5493214 w 5493214"/>
+                <a:gd name="connsiteY14" fmla="*/ 2152209 h 2506053"/>
+                <a:gd name="connsiteX15" fmla="*/ 5493214 w 5493214"/>
+                <a:gd name="connsiteY15" fmla="*/ 2321412 h 2506053"/>
+                <a:gd name="connsiteX16" fmla="*/ 5308573 w 5493214"/>
+                <a:gd name="connsiteY16" fmla="*/ 2506053 h 2506053"/>
+                <a:gd name="connsiteX17" fmla="*/ 205855 w 5493214"/>
+                <a:gd name="connsiteY17" fmla="*/ 2506053 h 2506053"/>
+                <a:gd name="connsiteX18" fmla="*/ 21214 w 5493214"/>
+                <a:gd name="connsiteY18" fmla="*/ 2321412 h 2506053"/>
+                <a:gd name="connsiteX19" fmla="*/ 21214 w 5493214"/>
+                <a:gd name="connsiteY19" fmla="*/ 154118 h 2506053"/>
+                <a:gd name="connsiteX20" fmla="*/ 175332 w 5493214"/>
+                <a:gd name="connsiteY20" fmla="*/ 0 h 2506053"/>
+                <a:gd name="connsiteX0" fmla="*/ 168205 w 5486087"/>
+                <a:gd name="connsiteY0" fmla="*/ 0 h 2506053"/>
+                <a:gd name="connsiteX1" fmla="*/ 5331969 w 5486087"/>
+                <a:gd name="connsiteY1" fmla="*/ 0 h 2506053"/>
+                <a:gd name="connsiteX2" fmla="*/ 5486087 w 5486087"/>
+                <a:gd name="connsiteY2" fmla="*/ 154118 h 2506053"/>
+                <a:gd name="connsiteX3" fmla="*/ 5486087 w 5486087"/>
+                <a:gd name="connsiteY3" fmla="*/ 171368 h 2506053"/>
+                <a:gd name="connsiteX4" fmla="*/ 5331969 w 5486087"/>
+                <a:gd name="connsiteY4" fmla="*/ 325486 h 2506053"/>
+                <a:gd name="connsiteX5" fmla="*/ 854620 w 5486087"/>
+                <a:gd name="connsiteY5" fmla="*/ 325486 h 2506053"/>
+                <a:gd name="connsiteX6" fmla="*/ 854620 w 5486087"/>
+                <a:gd name="connsiteY6" fmla="*/ 328960 h 2506053"/>
+                <a:gd name="connsiteX7" fmla="*/ 850250 w 5486087"/>
+                <a:gd name="connsiteY7" fmla="*/ 328960 h 2506053"/>
+                <a:gd name="connsiteX8" fmla="*/ 660379 w 5486087"/>
+                <a:gd name="connsiteY8" fmla="*/ 518831 h 2506053"/>
+                <a:gd name="connsiteX9" fmla="*/ 660379 w 5486087"/>
+                <a:gd name="connsiteY9" fmla="*/ 1774635 h 2506053"/>
+                <a:gd name="connsiteX10" fmla="*/ 850250 w 5486087"/>
+                <a:gd name="connsiteY10" fmla="*/ 1964506 h 2506053"/>
+                <a:gd name="connsiteX11" fmla="*/ 854620 w 5486087"/>
+                <a:gd name="connsiteY11" fmla="*/ 1964506 h 2506053"/>
+                <a:gd name="connsiteX12" fmla="*/ 854620 w 5486087"/>
+                <a:gd name="connsiteY12" fmla="*/ 1967568 h 2506053"/>
+                <a:gd name="connsiteX13" fmla="*/ 5301446 w 5486087"/>
+                <a:gd name="connsiteY13" fmla="*/ 1967568 h 2506053"/>
+                <a:gd name="connsiteX14" fmla="*/ 5486087 w 5486087"/>
+                <a:gd name="connsiteY14" fmla="*/ 2152209 h 2506053"/>
+                <a:gd name="connsiteX15" fmla="*/ 5486087 w 5486087"/>
+                <a:gd name="connsiteY15" fmla="*/ 2321412 h 2506053"/>
+                <a:gd name="connsiteX16" fmla="*/ 5301446 w 5486087"/>
+                <a:gd name="connsiteY16" fmla="*/ 2506053 h 2506053"/>
+                <a:gd name="connsiteX17" fmla="*/ 198728 w 5486087"/>
+                <a:gd name="connsiteY17" fmla="*/ 2506053 h 2506053"/>
+                <a:gd name="connsiteX18" fmla="*/ 14087 w 5486087"/>
+                <a:gd name="connsiteY18" fmla="*/ 2321412 h 2506053"/>
+                <a:gd name="connsiteX19" fmla="*/ 14087 w 5486087"/>
+                <a:gd name="connsiteY19" fmla="*/ 154118 h 2506053"/>
+                <a:gd name="connsiteX20" fmla="*/ 168205 w 5486087"/>
+                <a:gd name="connsiteY20" fmla="*/ 0 h 2506053"/>
+                <a:gd name="connsiteX0" fmla="*/ 159124 w 5477006"/>
+                <a:gd name="connsiteY0" fmla="*/ 0 h 2506053"/>
+                <a:gd name="connsiteX1" fmla="*/ 5322888 w 5477006"/>
+                <a:gd name="connsiteY1" fmla="*/ 0 h 2506053"/>
+                <a:gd name="connsiteX2" fmla="*/ 5477006 w 5477006"/>
+                <a:gd name="connsiteY2" fmla="*/ 154118 h 2506053"/>
+                <a:gd name="connsiteX3" fmla="*/ 5477006 w 5477006"/>
+                <a:gd name="connsiteY3" fmla="*/ 171368 h 2506053"/>
+                <a:gd name="connsiteX4" fmla="*/ 5322888 w 5477006"/>
+                <a:gd name="connsiteY4" fmla="*/ 325486 h 2506053"/>
+                <a:gd name="connsiteX5" fmla="*/ 845539 w 5477006"/>
+                <a:gd name="connsiteY5" fmla="*/ 325486 h 2506053"/>
+                <a:gd name="connsiteX6" fmla="*/ 845539 w 5477006"/>
+                <a:gd name="connsiteY6" fmla="*/ 328960 h 2506053"/>
+                <a:gd name="connsiteX7" fmla="*/ 841169 w 5477006"/>
+                <a:gd name="connsiteY7" fmla="*/ 328960 h 2506053"/>
+                <a:gd name="connsiteX8" fmla="*/ 651298 w 5477006"/>
+                <a:gd name="connsiteY8" fmla="*/ 518831 h 2506053"/>
+                <a:gd name="connsiteX9" fmla="*/ 651298 w 5477006"/>
+                <a:gd name="connsiteY9" fmla="*/ 1774635 h 2506053"/>
+                <a:gd name="connsiteX10" fmla="*/ 841169 w 5477006"/>
+                <a:gd name="connsiteY10" fmla="*/ 1964506 h 2506053"/>
+                <a:gd name="connsiteX11" fmla="*/ 845539 w 5477006"/>
+                <a:gd name="connsiteY11" fmla="*/ 1964506 h 2506053"/>
+                <a:gd name="connsiteX12" fmla="*/ 845539 w 5477006"/>
+                <a:gd name="connsiteY12" fmla="*/ 1967568 h 2506053"/>
+                <a:gd name="connsiteX13" fmla="*/ 5292365 w 5477006"/>
+                <a:gd name="connsiteY13" fmla="*/ 1967568 h 2506053"/>
+                <a:gd name="connsiteX14" fmla="*/ 5477006 w 5477006"/>
+                <a:gd name="connsiteY14" fmla="*/ 2152209 h 2506053"/>
+                <a:gd name="connsiteX15" fmla="*/ 5477006 w 5477006"/>
+                <a:gd name="connsiteY15" fmla="*/ 2321412 h 2506053"/>
+                <a:gd name="connsiteX16" fmla="*/ 5292365 w 5477006"/>
+                <a:gd name="connsiteY16" fmla="*/ 2506053 h 2506053"/>
+                <a:gd name="connsiteX17" fmla="*/ 189647 w 5477006"/>
+                <a:gd name="connsiteY17" fmla="*/ 2506053 h 2506053"/>
+                <a:gd name="connsiteX18" fmla="*/ 5006 w 5477006"/>
+                <a:gd name="connsiteY18" fmla="*/ 2321412 h 2506053"/>
+                <a:gd name="connsiteX19" fmla="*/ 5006 w 5477006"/>
+                <a:gd name="connsiteY19" fmla="*/ 154118 h 2506053"/>
+                <a:gd name="connsiteX20" fmla="*/ 159124 w 5477006"/>
+                <a:gd name="connsiteY20" fmla="*/ 0 h 2506053"/>
+                <a:gd name="connsiteX0" fmla="*/ 156146 w 5474028"/>
+                <a:gd name="connsiteY0" fmla="*/ 0 h 2506053"/>
+                <a:gd name="connsiteX1" fmla="*/ 5319910 w 5474028"/>
+                <a:gd name="connsiteY1" fmla="*/ 0 h 2506053"/>
+                <a:gd name="connsiteX2" fmla="*/ 5474028 w 5474028"/>
+                <a:gd name="connsiteY2" fmla="*/ 154118 h 2506053"/>
+                <a:gd name="connsiteX3" fmla="*/ 5474028 w 5474028"/>
+                <a:gd name="connsiteY3" fmla="*/ 171368 h 2506053"/>
+                <a:gd name="connsiteX4" fmla="*/ 5319910 w 5474028"/>
+                <a:gd name="connsiteY4" fmla="*/ 325486 h 2506053"/>
+                <a:gd name="connsiteX5" fmla="*/ 842561 w 5474028"/>
+                <a:gd name="connsiteY5" fmla="*/ 325486 h 2506053"/>
+                <a:gd name="connsiteX6" fmla="*/ 842561 w 5474028"/>
+                <a:gd name="connsiteY6" fmla="*/ 328960 h 2506053"/>
+                <a:gd name="connsiteX7" fmla="*/ 838191 w 5474028"/>
+                <a:gd name="connsiteY7" fmla="*/ 328960 h 2506053"/>
+                <a:gd name="connsiteX8" fmla="*/ 648320 w 5474028"/>
+                <a:gd name="connsiteY8" fmla="*/ 518831 h 2506053"/>
+                <a:gd name="connsiteX9" fmla="*/ 648320 w 5474028"/>
+                <a:gd name="connsiteY9" fmla="*/ 1774635 h 2506053"/>
+                <a:gd name="connsiteX10" fmla="*/ 838191 w 5474028"/>
+                <a:gd name="connsiteY10" fmla="*/ 1964506 h 2506053"/>
+                <a:gd name="connsiteX11" fmla="*/ 842561 w 5474028"/>
+                <a:gd name="connsiteY11" fmla="*/ 1964506 h 2506053"/>
+                <a:gd name="connsiteX12" fmla="*/ 842561 w 5474028"/>
+                <a:gd name="connsiteY12" fmla="*/ 1967568 h 2506053"/>
+                <a:gd name="connsiteX13" fmla="*/ 5289387 w 5474028"/>
+                <a:gd name="connsiteY13" fmla="*/ 1967568 h 2506053"/>
+                <a:gd name="connsiteX14" fmla="*/ 5474028 w 5474028"/>
+                <a:gd name="connsiteY14" fmla="*/ 2152209 h 2506053"/>
+                <a:gd name="connsiteX15" fmla="*/ 5474028 w 5474028"/>
+                <a:gd name="connsiteY15" fmla="*/ 2321412 h 2506053"/>
+                <a:gd name="connsiteX16" fmla="*/ 5289387 w 5474028"/>
+                <a:gd name="connsiteY16" fmla="*/ 2506053 h 2506053"/>
+                <a:gd name="connsiteX17" fmla="*/ 186669 w 5474028"/>
+                <a:gd name="connsiteY17" fmla="*/ 2506053 h 2506053"/>
+                <a:gd name="connsiteX18" fmla="*/ 2028 w 5474028"/>
+                <a:gd name="connsiteY18" fmla="*/ 2321412 h 2506053"/>
+                <a:gd name="connsiteX19" fmla="*/ 2028 w 5474028"/>
+                <a:gd name="connsiteY19" fmla="*/ 154118 h 2506053"/>
+                <a:gd name="connsiteX20" fmla="*/ 156146 w 5474028"/>
+                <a:gd name="connsiteY20" fmla="*/ 0 h 2506053"/>
+                <a:gd name="connsiteX0" fmla="*/ 156146 w 5474028"/>
+                <a:gd name="connsiteY0" fmla="*/ 0 h 2506053"/>
+                <a:gd name="connsiteX1" fmla="*/ 5319910 w 5474028"/>
+                <a:gd name="connsiteY1" fmla="*/ 0 h 2506053"/>
+                <a:gd name="connsiteX2" fmla="*/ 5474028 w 5474028"/>
+                <a:gd name="connsiteY2" fmla="*/ 154118 h 2506053"/>
+                <a:gd name="connsiteX3" fmla="*/ 5474028 w 5474028"/>
+                <a:gd name="connsiteY3" fmla="*/ 171368 h 2506053"/>
+                <a:gd name="connsiteX4" fmla="*/ 5319910 w 5474028"/>
+                <a:gd name="connsiteY4" fmla="*/ 325486 h 2506053"/>
+                <a:gd name="connsiteX5" fmla="*/ 842561 w 5474028"/>
+                <a:gd name="connsiteY5" fmla="*/ 325486 h 2506053"/>
+                <a:gd name="connsiteX6" fmla="*/ 842561 w 5474028"/>
+                <a:gd name="connsiteY6" fmla="*/ 328960 h 2506053"/>
+                <a:gd name="connsiteX7" fmla="*/ 838191 w 5474028"/>
+                <a:gd name="connsiteY7" fmla="*/ 328960 h 2506053"/>
+                <a:gd name="connsiteX8" fmla="*/ 648320 w 5474028"/>
+                <a:gd name="connsiteY8" fmla="*/ 518831 h 2506053"/>
+                <a:gd name="connsiteX9" fmla="*/ 648320 w 5474028"/>
+                <a:gd name="connsiteY9" fmla="*/ 1774635 h 2506053"/>
+                <a:gd name="connsiteX10" fmla="*/ 838191 w 5474028"/>
+                <a:gd name="connsiteY10" fmla="*/ 1964506 h 2506053"/>
+                <a:gd name="connsiteX11" fmla="*/ 842561 w 5474028"/>
+                <a:gd name="connsiteY11" fmla="*/ 1964506 h 2506053"/>
+                <a:gd name="connsiteX12" fmla="*/ 842561 w 5474028"/>
+                <a:gd name="connsiteY12" fmla="*/ 1967568 h 2506053"/>
+                <a:gd name="connsiteX13" fmla="*/ 5289387 w 5474028"/>
+                <a:gd name="connsiteY13" fmla="*/ 1967568 h 2506053"/>
+                <a:gd name="connsiteX14" fmla="*/ 5474028 w 5474028"/>
+                <a:gd name="connsiteY14" fmla="*/ 2152209 h 2506053"/>
+                <a:gd name="connsiteX15" fmla="*/ 5474028 w 5474028"/>
+                <a:gd name="connsiteY15" fmla="*/ 2321412 h 2506053"/>
+                <a:gd name="connsiteX16" fmla="*/ 5289387 w 5474028"/>
+                <a:gd name="connsiteY16" fmla="*/ 2506053 h 2506053"/>
+                <a:gd name="connsiteX17" fmla="*/ 186669 w 5474028"/>
+                <a:gd name="connsiteY17" fmla="*/ 2506053 h 2506053"/>
+                <a:gd name="connsiteX18" fmla="*/ 2028 w 5474028"/>
+                <a:gd name="connsiteY18" fmla="*/ 2321412 h 2506053"/>
+                <a:gd name="connsiteX19" fmla="*/ 2028 w 5474028"/>
+                <a:gd name="connsiteY19" fmla="*/ 154118 h 2506053"/>
+                <a:gd name="connsiteX20" fmla="*/ 156146 w 5474028"/>
+                <a:gd name="connsiteY20" fmla="*/ 0 h 2506053"/>
+                <a:gd name="connsiteX0" fmla="*/ 154529 w 5472411"/>
+                <a:gd name="connsiteY0" fmla="*/ 0 h 2506053"/>
+                <a:gd name="connsiteX1" fmla="*/ 5318293 w 5472411"/>
+                <a:gd name="connsiteY1" fmla="*/ 0 h 2506053"/>
+                <a:gd name="connsiteX2" fmla="*/ 5472411 w 5472411"/>
+                <a:gd name="connsiteY2" fmla="*/ 154118 h 2506053"/>
+                <a:gd name="connsiteX3" fmla="*/ 5472411 w 5472411"/>
+                <a:gd name="connsiteY3" fmla="*/ 171368 h 2506053"/>
+                <a:gd name="connsiteX4" fmla="*/ 5318293 w 5472411"/>
+                <a:gd name="connsiteY4" fmla="*/ 325486 h 2506053"/>
+                <a:gd name="connsiteX5" fmla="*/ 840944 w 5472411"/>
+                <a:gd name="connsiteY5" fmla="*/ 325486 h 2506053"/>
+                <a:gd name="connsiteX6" fmla="*/ 840944 w 5472411"/>
+                <a:gd name="connsiteY6" fmla="*/ 328960 h 2506053"/>
+                <a:gd name="connsiteX7" fmla="*/ 836574 w 5472411"/>
+                <a:gd name="connsiteY7" fmla="*/ 328960 h 2506053"/>
+                <a:gd name="connsiteX8" fmla="*/ 646703 w 5472411"/>
+                <a:gd name="connsiteY8" fmla="*/ 518831 h 2506053"/>
+                <a:gd name="connsiteX9" fmla="*/ 646703 w 5472411"/>
+                <a:gd name="connsiteY9" fmla="*/ 1774635 h 2506053"/>
+                <a:gd name="connsiteX10" fmla="*/ 836574 w 5472411"/>
+                <a:gd name="connsiteY10" fmla="*/ 1964506 h 2506053"/>
+                <a:gd name="connsiteX11" fmla="*/ 840944 w 5472411"/>
+                <a:gd name="connsiteY11" fmla="*/ 1964506 h 2506053"/>
+                <a:gd name="connsiteX12" fmla="*/ 840944 w 5472411"/>
+                <a:gd name="connsiteY12" fmla="*/ 1967568 h 2506053"/>
+                <a:gd name="connsiteX13" fmla="*/ 5287770 w 5472411"/>
+                <a:gd name="connsiteY13" fmla="*/ 1967568 h 2506053"/>
+                <a:gd name="connsiteX14" fmla="*/ 5472411 w 5472411"/>
+                <a:gd name="connsiteY14" fmla="*/ 2152209 h 2506053"/>
+                <a:gd name="connsiteX15" fmla="*/ 5472411 w 5472411"/>
+                <a:gd name="connsiteY15" fmla="*/ 2321412 h 2506053"/>
+                <a:gd name="connsiteX16" fmla="*/ 5287770 w 5472411"/>
+                <a:gd name="connsiteY16" fmla="*/ 2506053 h 2506053"/>
+                <a:gd name="connsiteX17" fmla="*/ 185052 w 5472411"/>
+                <a:gd name="connsiteY17" fmla="*/ 2506053 h 2506053"/>
+                <a:gd name="connsiteX18" fmla="*/ 411 w 5472411"/>
+                <a:gd name="connsiteY18" fmla="*/ 2321412 h 2506053"/>
+                <a:gd name="connsiteX19" fmla="*/ 411 w 5472411"/>
+                <a:gd name="connsiteY19" fmla="*/ 154118 h 2506053"/>
+                <a:gd name="connsiteX20" fmla="*/ 154529 w 5472411"/>
+                <a:gd name="connsiteY20" fmla="*/ 0 h 2506053"/>
+              </a:gdLst>
+              <a:ahLst/>
+              <a:cxnLst>
+                <a:cxn ang="0">
+                  <a:pos x="connsiteX0" y="connsiteY0"/>
+                </a:cxn>
+                <a:cxn ang="0">
+                  <a:pos x="connsiteX1" y="connsiteY1"/>
+                </a:cxn>
+                <a:cxn ang="0">
+                  <a:pos x="connsiteX2" y="connsiteY2"/>
+                </a:cxn>
+                <a:cxn ang="0">
+                  <a:pos x="connsiteX3" y="connsiteY3"/>
+                </a:cxn>
+                <a:cxn ang="0">
+                  <a:pos x="connsiteX4" y="connsiteY4"/>
+                </a:cxn>
+                <a:cxn ang="0">
+                  <a:pos x="connsiteX5" y="connsiteY5"/>
+                </a:cxn>
+                <a:cxn ang="0">
+                  <a:pos x="connsiteX6" y="connsiteY6"/>
+                </a:cxn>
+                <a:cxn ang="0">
+                  <a:pos x="connsiteX7" y="connsiteY7"/>
+                </a:cxn>
+                <a:cxn ang="0">
+                  <a:pos x="connsiteX8" y="connsiteY8"/>
+                </a:cxn>
+                <a:cxn ang="0">
+                  <a:pos x="connsiteX9" y="connsiteY9"/>
+                </a:cxn>
+                <a:cxn ang="0">
+                  <a:pos x="connsiteX10" y="connsiteY10"/>
+                </a:cxn>
+                <a:cxn ang="0">
+                  <a:pos x="connsiteX11" y="connsiteY11"/>
+                </a:cxn>
+                <a:cxn ang="0">
+                  <a:pos x="connsiteX12" y="connsiteY12"/>
+                </a:cxn>
+                <a:cxn ang="0">
+                  <a:pos x="connsiteX13" y="connsiteY13"/>
+                </a:cxn>
+                <a:cxn ang="0">
+                  <a:pos x="connsiteX14" y="connsiteY14"/>
+                </a:cxn>
+                <a:cxn ang="0">
+                  <a:pos x="connsiteX15" y="connsiteY15"/>
+                </a:cxn>
+                <a:cxn ang="0">
+                  <a:pos x="connsiteX16" y="connsiteY16"/>
+                </a:cxn>
+                <a:cxn ang="0">
+                  <a:pos x="connsiteX17" y="connsiteY17"/>
+                </a:cxn>
+                <a:cxn ang="0">
+                  <a:pos x="connsiteX18" y="connsiteY18"/>
+                </a:cxn>
+                <a:cxn ang="0">
+                  <a:pos x="connsiteX19" y="connsiteY19"/>
+                </a:cxn>
+                <a:cxn ang="0">
+                  <a:pos x="connsiteX20" y="connsiteY20"/>
+                </a:cxn>
+              </a:cxnLst>
+              <a:rect l="l" t="t" r="r" b="b"/>
+              <a:pathLst>
+                <a:path w="5472411" h="2506053">
+                  <a:moveTo>
+                    <a:pt x="154529" y="0"/>
+                  </a:moveTo>
+                  <a:lnTo>
+                    <a:pt x="5318293" y="0"/>
+                  </a:lnTo>
+                  <a:cubicBezTo>
+                    <a:pt x="5403410" y="0"/>
+                    <a:pt x="5472411" y="69001"/>
+                    <a:pt x="5472411" y="154118"/>
+                  </a:cubicBezTo>
+                  <a:lnTo>
+                    <a:pt x="5472411" y="171368"/>
+                  </a:lnTo>
+                  <a:cubicBezTo>
+                    <a:pt x="5472411" y="256485"/>
+                    <a:pt x="5403410" y="325486"/>
+                    <a:pt x="5318293" y="325486"/>
+                  </a:cubicBezTo>
+                  <a:lnTo>
+                    <a:pt x="840944" y="325486"/>
+                  </a:lnTo>
+                  <a:lnTo>
+                    <a:pt x="840944" y="328960"/>
+                  </a:lnTo>
+                  <a:lnTo>
+                    <a:pt x="836574" y="328960"/>
+                  </a:lnTo>
+                  <a:cubicBezTo>
+                    <a:pt x="731711" y="328960"/>
+                    <a:pt x="646703" y="413968"/>
+                    <a:pt x="646703" y="518831"/>
+                  </a:cubicBezTo>
+                  <a:lnTo>
+                    <a:pt x="646703" y="1774635"/>
+                  </a:lnTo>
+                  <a:cubicBezTo>
+                    <a:pt x="646703" y="1879498"/>
+                    <a:pt x="731711" y="1964506"/>
+                    <a:pt x="836574" y="1964506"/>
+                  </a:cubicBezTo>
+                  <a:lnTo>
+                    <a:pt x="840944" y="1964506"/>
+                  </a:lnTo>
+                  <a:lnTo>
+                    <a:pt x="840944" y="1967568"/>
+                  </a:lnTo>
+                  <a:lnTo>
+                    <a:pt x="5287770" y="1967568"/>
+                  </a:lnTo>
+                  <a:cubicBezTo>
+                    <a:pt x="5389744" y="1967568"/>
+                    <a:pt x="5472411" y="2050235"/>
+                    <a:pt x="5472411" y="2152209"/>
+                  </a:cubicBezTo>
+                  <a:lnTo>
+                    <a:pt x="5472411" y="2321412"/>
+                  </a:lnTo>
+                  <a:cubicBezTo>
+                    <a:pt x="5472411" y="2423386"/>
+                    <a:pt x="5389744" y="2506053"/>
+                    <a:pt x="5287770" y="2506053"/>
+                  </a:cubicBezTo>
+                  <a:lnTo>
+                    <a:pt x="185052" y="2506053"/>
+                  </a:lnTo>
+                  <a:cubicBezTo>
+                    <a:pt x="83078" y="2506053"/>
+                    <a:pt x="411" y="2423386"/>
+                    <a:pt x="411" y="2321412"/>
+                  </a:cubicBezTo>
+                  <a:cubicBezTo>
+                    <a:pt x="3512" y="1928932"/>
+                    <a:pt x="-1392" y="558079"/>
+                    <a:pt x="411" y="154118"/>
+                  </a:cubicBezTo>
+                  <a:cubicBezTo>
+                    <a:pt x="411" y="69001"/>
+                    <a:pt x="69412" y="0"/>
+                    <a:pt x="154529" y="0"/>
+                  </a:cubicBezTo>
+                  <a:close/>
+                </a:path>
+              </a:pathLst>
+            </a:custGeom>
+            <a:solidFill>
+              <a:srgbClr val="CCFFCC"/>
+            </a:solidFill>
+            <a:ln w="12700" cap="flat" cmpd="sng" algn="ctr">
+              <a:solidFill>
+                <a:srgbClr val="70AD47"/>
+              </a:solidFill>
+              <a:prstDash val="solid"/>
+              <a:miter lim="800000"/>
+            </a:ln>
+            <a:effectLst/>
+          </p:spPr>
+          <p:txBody>
+            <a:bodyPr lIns="0" tIns="0" rIns="0" bIns="0" rtlCol="0" anchor="ctr"/>
+            <a:lstStyle/>
+            <a:p>
+              <a:pPr algn="ctr"/>
+              <a:endParaRPr lang="en-GB" sz="1050" kern="0" dirty="0">
+                <a:solidFill>
+                  <a:prstClr val="black"/>
+                </a:solidFill>
+                <a:latin typeface="Calibri" panose="020F0502020204030204" pitchFamily="34" charset="0"/>
+                <a:cs typeface="Calibri" panose="020F0502020204030204" pitchFamily="34" charset="0"/>
+              </a:endParaRPr>
+            </a:p>
+          </p:txBody>
+        </p:sp>
+        <p:sp>
+          <p:nvSpPr>
+            <p:cNvPr id="131" name="Rectangle 130"/>
+            <p:cNvSpPr/>
+            <p:nvPr/>
+          </p:nvSpPr>
+          <p:spPr>
+            <a:xfrm>
+              <a:off x="8560172" y="3910126"/>
+              <a:ext cx="1173487" cy="436050"/>
+            </a:xfrm>
+            <a:prstGeom prst="rect">
+              <a:avLst/>
+            </a:prstGeom>
+            <a:ln w="12700">
+              <a:noFill/>
+            </a:ln>
+          </p:spPr>
+          <p:txBody>
+            <a:bodyPr wrap="none">
+              <a:spAutoFit/>
+            </a:bodyPr>
+            <a:lstStyle/>
+            <a:p>
+              <a:r>
+                <a:rPr lang="en-GB" sz="1050" kern="0" dirty="0" err="1">
+                  <a:solidFill>
+                    <a:prstClr val="black"/>
+                  </a:solidFill>
+                  <a:latin typeface="Calibri" panose="020F0502020204030204" pitchFamily="34" charset="0"/>
+                  <a:cs typeface="Calibri" panose="020F0502020204030204" pitchFamily="34" charset="0"/>
+                </a:rPr>
+                <a:t>Polycube</a:t>
+              </a:r>
+              <a:endParaRPr lang="en-US" sz="1050" dirty="0">
+                <a:latin typeface="Calibri" panose="020F0502020204030204" pitchFamily="34" charset="0"/>
+                <a:cs typeface="Calibri" panose="020F0502020204030204" pitchFamily="34" charset="0"/>
+              </a:endParaRPr>
+            </a:p>
+          </p:txBody>
+        </p:sp>
+      </p:grpSp>
+    </p:spTree>
+    <p:extLst>
+      <p:ext uri="{BB962C8B-B14F-4D97-AF65-F5344CB8AC3E}">
+        <p14:creationId xmlns:p14="http://schemas.microsoft.com/office/powerpoint/2010/main" val="1166299545"/>
+      </p:ext>
+    </p:extLst>
+  </p:cSld>
+  <p:clrMapOvr>
+    <a:masterClrMapping/>
+  </p:clrMapOvr>
+  <p:timing>
+    <p:tnLst>
+      <p:par>
+        <p:cTn id="1" dur="indefinite" restart="never" nodeType="tmRoot"/>
+      </p:par>
+    </p:tnLst>
+  </p:timing>
+</p:sld>
+</file>
+
+<file path=ppt/slides/slide2.xml><?xml version="1.0" encoding="utf-8"?>
 <p:sld xmlns:a="http://schemas.openxmlformats.org/drawingml/2006/main" xmlns:r="http://schemas.openxmlformats.org/officeDocument/2006/relationships" xmlns:p="http://schemas.openxmlformats.org/presentationml/2006/main">
   <p:cSld>
     <p:spTree>

</xml_diff>